<commit_message>
agenda cuadro comparativo de soluciones
</commit_message>
<xml_diff>
--- a/doc/presentacion/presentacion.pptx
+++ b/doc/presentacion/presentacion.pptx
@@ -207,7 +207,8 @@
           <a:p>
             <a:fld id="{53A9BA33-61B4-4CB5-A056-C0C55B1A2ED8}" type="datetimeFigureOut">
               <a:rPr lang="es-AR" smtClean="0"/>
-              <a:t>05/12/2010</a:t>
+              <a:pPr/>
+              <a:t>06/12/2010</a:t>
             </a:fld>
             <a:endParaRPr lang="es-AR"/>
           </a:p>
@@ -368,7 +369,8 @@
           <a:p>
             <a:fld id="{3BCBAC67-084D-419D-A89D-D7FC2C09E238}" type="slidenum">
               <a:rPr lang="es-AR" smtClean="0"/>
-              <a:t>‹#›</a:t>
+              <a:pPr/>
+              <a:t>‹Nº›</a:t>
             </a:fld>
             <a:endParaRPr lang="es-AR"/>
           </a:p>
@@ -539,6 +541,7 @@
           <a:p>
             <a:fld id="{3BCBAC67-084D-419D-A89D-D7FC2C09E238}" type="slidenum">
               <a:rPr lang="es-AR" smtClean="0"/>
+              <a:pPr/>
               <a:t>3</a:t>
             </a:fld>
             <a:endParaRPr lang="es-AR"/>
@@ -1179,7 +1182,7 @@
             <a:fld id="{47C9B81F-C347-4BEF-BFDF-29C42F48304A}" type="datetimeFigureOut">
               <a:rPr lang="en-US" smtClean="0"/>
               <a:pPr/>
-              <a:t>12/5/2010</a:t>
+              <a:t>12/6/2010</a:t>
             </a:fld>
             <a:endParaRPr lang="en-US" dirty="0">
               <a:solidFill>
@@ -1255,7 +1258,7 @@
             <a:fld id="{042AED99-7FB4-404E-8A97-64753DCE42EC}" type="slidenum">
               <a:rPr kumimoji="0" lang="en-US" smtClean="0"/>
               <a:pPr/>
-              <a:t>‹#›</a:t>
+              <a:t>‹Nº›</a:t>
             </a:fld>
             <a:endParaRPr kumimoji="0" lang="en-US" dirty="0">
               <a:solidFill>
@@ -1396,7 +1399,7 @@
             <a:fld id="{47C9B81F-C347-4BEF-BFDF-29C42F48304A}" type="datetimeFigureOut">
               <a:rPr lang="en-US" smtClean="0"/>
               <a:pPr/>
-              <a:t>12/5/2010</a:t>
+              <a:t>12/6/2010</a:t>
             </a:fld>
             <a:endParaRPr lang="en-US" dirty="0">
               <a:solidFill>
@@ -1456,7 +1459,7 @@
             <a:fld id="{042AED99-7FB4-404E-8A97-64753DCE42EC}" type="slidenum">
               <a:rPr kumimoji="0" lang="en-US" smtClean="0"/>
               <a:pPr/>
-              <a:t>‹#›</a:t>
+              <a:t>‹Nº›</a:t>
             </a:fld>
             <a:endParaRPr kumimoji="0" lang="en-US" dirty="0">
               <a:solidFill>
@@ -1602,7 +1605,7 @@
             <a:fld id="{47C9B81F-C347-4BEF-BFDF-29C42F48304A}" type="datetimeFigureOut">
               <a:rPr lang="en-US" smtClean="0"/>
               <a:pPr/>
-              <a:t>12/5/2010</a:t>
+              <a:t>12/6/2010</a:t>
             </a:fld>
             <a:endParaRPr lang="en-US" dirty="0">
               <a:solidFill>
@@ -1662,7 +1665,7 @@
             <a:fld id="{042AED99-7FB4-404E-8A97-64753DCE42EC}" type="slidenum">
               <a:rPr kumimoji="0" lang="en-US" smtClean="0"/>
               <a:pPr/>
-              <a:t>‹#›</a:t>
+              <a:t>‹Nº›</a:t>
             </a:fld>
             <a:endParaRPr kumimoji="0" lang="en-US" dirty="0">
               <a:solidFill>
@@ -1773,7 +1776,7 @@
             <a:fld id="{47C9B81F-C347-4BEF-BFDF-29C42F48304A}" type="datetimeFigureOut">
               <a:rPr lang="en-US" smtClean="0"/>
               <a:pPr/>
-              <a:t>12/5/2010</a:t>
+              <a:t>12/6/2010</a:t>
             </a:fld>
             <a:endParaRPr lang="en-US" dirty="0">
               <a:solidFill>
@@ -1833,7 +1836,7 @@
             <a:fld id="{042AED99-7FB4-404E-8A97-64753DCE42EC}" type="slidenum">
               <a:rPr kumimoji="0" lang="en-US" smtClean="0"/>
               <a:pPr/>
-              <a:t>‹#›</a:t>
+              <a:t>‹Nº›</a:t>
             </a:fld>
             <a:endParaRPr kumimoji="0" lang="en-US" dirty="0">
               <a:solidFill>
@@ -2049,7 +2052,7 @@
             <a:fld id="{47C9B81F-C347-4BEF-BFDF-29C42F48304A}" type="datetimeFigureOut">
               <a:rPr lang="en-US" smtClean="0"/>
               <a:pPr/>
-              <a:t>12/5/2010</a:t>
+              <a:t>12/6/2010</a:t>
             </a:fld>
             <a:endParaRPr lang="en-US" dirty="0">
               <a:solidFill>
@@ -2109,7 +2112,7 @@
             <a:fld id="{042AED99-7FB4-404E-8A97-64753DCE42EC}" type="slidenum">
               <a:rPr kumimoji="0" lang="en-US" smtClean="0"/>
               <a:pPr/>
-              <a:t>‹#›</a:t>
+              <a:t>‹Nº›</a:t>
             </a:fld>
             <a:endParaRPr kumimoji="0" lang="en-US" dirty="0">
               <a:solidFill>
@@ -2479,7 +2482,7 @@
             <a:fld id="{47C9B81F-C347-4BEF-BFDF-29C42F48304A}" type="datetimeFigureOut">
               <a:rPr lang="en-US" smtClean="0"/>
               <a:pPr/>
-              <a:t>12/5/2010</a:t>
+              <a:t>12/6/2010</a:t>
             </a:fld>
             <a:endParaRPr lang="en-US" dirty="0">
               <a:solidFill>
@@ -2539,7 +2542,7 @@
             <a:fld id="{042AED99-7FB4-404E-8A97-64753DCE42EC}" type="slidenum">
               <a:rPr kumimoji="0" lang="en-US" smtClean="0"/>
               <a:pPr/>
-              <a:t>‹#›</a:t>
+              <a:t>‹Nº›</a:t>
             </a:fld>
             <a:endParaRPr kumimoji="0" lang="en-US" dirty="0">
               <a:solidFill>
@@ -2946,7 +2949,7 @@
             <a:fld id="{47C9B81F-C347-4BEF-BFDF-29C42F48304A}" type="datetimeFigureOut">
               <a:rPr lang="en-US" smtClean="0"/>
               <a:pPr/>
-              <a:t>12/5/2010</a:t>
+              <a:t>12/6/2010</a:t>
             </a:fld>
             <a:endParaRPr lang="en-US" dirty="0">
               <a:solidFill>
@@ -3006,7 +3009,7 @@
             <a:fld id="{042AED99-7FB4-404E-8A97-64753DCE42EC}" type="slidenum">
               <a:rPr kumimoji="0" lang="en-US" smtClean="0"/>
               <a:pPr/>
-              <a:t>‹#›</a:t>
+              <a:t>‹Nº›</a:t>
             </a:fld>
             <a:endParaRPr kumimoji="0" lang="en-US" dirty="0">
               <a:solidFill>
@@ -3068,7 +3071,7 @@
             <a:fld id="{47C9B81F-C347-4BEF-BFDF-29C42F48304A}" type="datetimeFigureOut">
               <a:rPr lang="en-US" smtClean="0"/>
               <a:pPr/>
-              <a:t>12/5/2010</a:t>
+              <a:t>12/6/2010</a:t>
             </a:fld>
             <a:endParaRPr lang="en-US" dirty="0">
               <a:solidFill>
@@ -3128,7 +3131,7 @@
             <a:fld id="{042AED99-7FB4-404E-8A97-64753DCE42EC}" type="slidenum">
               <a:rPr kumimoji="0" lang="en-US" smtClean="0"/>
               <a:pPr/>
-              <a:t>‹#›</a:t>
+              <a:t>‹Nº›</a:t>
             </a:fld>
             <a:endParaRPr kumimoji="0" lang="en-US" dirty="0">
               <a:solidFill>
@@ -3210,7 +3213,7 @@
             <a:fld id="{47C9B81F-C347-4BEF-BFDF-29C42F48304A}" type="datetimeFigureOut">
               <a:rPr lang="en-US" smtClean="0"/>
               <a:pPr/>
-              <a:t>12/5/2010</a:t>
+              <a:t>12/6/2010</a:t>
             </a:fld>
             <a:endParaRPr lang="en-US" dirty="0">
               <a:solidFill>
@@ -3270,7 +3273,7 @@
             <a:fld id="{042AED99-7FB4-404E-8A97-64753DCE42EC}" type="slidenum">
               <a:rPr kumimoji="0" lang="en-US" smtClean="0"/>
               <a:pPr/>
-              <a:t>‹#›</a:t>
+              <a:t>‹Nº›</a:t>
             </a:fld>
             <a:endParaRPr kumimoji="0" lang="en-US" dirty="0">
               <a:solidFill>
@@ -3505,7 +3508,7 @@
             <a:fld id="{47C9B81F-C347-4BEF-BFDF-29C42F48304A}" type="datetimeFigureOut">
               <a:rPr lang="en-US" smtClean="0"/>
               <a:pPr/>
-              <a:t>12/5/2010</a:t>
+              <a:t>12/6/2010</a:t>
             </a:fld>
             <a:endParaRPr lang="en-US" dirty="0">
               <a:solidFill>
@@ -3565,7 +3568,7 @@
             <a:fld id="{042AED99-7FB4-404E-8A97-64753DCE42EC}" type="slidenum">
               <a:rPr kumimoji="0" lang="en-US" smtClean="0"/>
               <a:pPr/>
-              <a:t>‹#›</a:t>
+              <a:t>‹Nº›</a:t>
             </a:fld>
             <a:endParaRPr kumimoji="0" lang="en-US" dirty="0">
               <a:solidFill>
@@ -3731,7 +3734,7 @@
             <a:fld id="{47C9B81F-C347-4BEF-BFDF-29C42F48304A}" type="datetimeFigureOut">
               <a:rPr lang="en-US" smtClean="0"/>
               <a:pPr/>
-              <a:t>12/5/2010</a:t>
+              <a:t>12/6/2010</a:t>
             </a:fld>
             <a:endParaRPr lang="en-US" dirty="0">
               <a:solidFill>
@@ -3810,7 +3813,7 @@
             <a:fld id="{042AED99-7FB4-404E-8A97-64753DCE42EC}" type="slidenum">
               <a:rPr kumimoji="0" lang="en-US" smtClean="0"/>
               <a:pPr/>
-              <a:t>‹#›</a:t>
+              <a:t>‹Nº›</a:t>
             </a:fld>
             <a:endParaRPr kumimoji="0" lang="en-US" dirty="0">
               <a:solidFill>
@@ -4861,7 +4864,7 @@
             <a:fld id="{47C9B81F-C347-4BEF-BFDF-29C42F48304A}" type="datetimeFigureOut">
               <a:rPr lang="en-US" smtClean="0"/>
               <a:pPr/>
-              <a:t>12/5/2010</a:t>
+              <a:t>12/6/2010</a:t>
             </a:fld>
             <a:endParaRPr lang="en-US" dirty="0">
               <a:solidFill>
@@ -4951,7 +4954,7 @@
             <a:fld id="{042AED99-7FB4-404E-8A97-64753DCE42EC}" type="slidenum">
               <a:rPr kumimoji="0" lang="en-US" smtClean="0"/>
               <a:pPr/>
-              <a:t>‹#›</a:t>
+              <a:t>‹Nº›</a:t>
             </a:fld>
             <a:endParaRPr kumimoji="0" lang="en-US" dirty="0">
               <a:solidFill>
@@ -5526,6 +5529,13 @@
   <p:clrMapOvr>
     <a:masterClrMapping/>
   </p:clrMapOvr>
+  <p:timing>
+    <p:tnLst>
+      <p:par>
+        <p:cTn id="1" dur="indefinite" restart="never" nodeType="tmRoot"/>
+      </p:par>
+    </p:tnLst>
+  </p:timing>
 </p:sld>
 </file>
 
@@ -5603,6 +5613,13 @@
   <p:clrMapOvr>
     <a:masterClrMapping/>
   </p:clrMapOvr>
+  <p:timing>
+    <p:tnLst>
+      <p:par>
+        <p:cTn id="1" dur="indefinite" restart="never" nodeType="tmRoot"/>
+      </p:par>
+    </p:tnLst>
+  </p:timing>
 </p:sld>
 </file>
 
@@ -5653,11 +5670,7 @@
           <a:p>
             <a:r>
               <a:rPr lang="es-ES" dirty="0" smtClean="0"/>
-              <a:t>Ejemplos</a:t>
-            </a:r>
-            <a:r>
-              <a:rPr lang="es-ES" dirty="0" smtClean="0"/>
-              <a:t>?</a:t>
+              <a:t>Ejemplos?</a:t>
             </a:r>
           </a:p>
           <a:p>
@@ -5714,6 +5727,13 @@
   <p:clrMapOvr>
     <a:masterClrMapping/>
   </p:clrMapOvr>
+  <p:timing>
+    <p:tnLst>
+      <p:par>
+        <p:cTn id="1" dur="indefinite" restart="never" nodeType="tmRoot"/>
+      </p:par>
+    </p:tnLst>
+  </p:timing>
 </p:sld>
 </file>
 
@@ -5793,11 +5813,7 @@
           <a:p>
             <a:r>
               <a:rPr lang="es-ES" dirty="0" smtClean="0"/>
-              <a:t>Decir como resulto</a:t>
-            </a:r>
-            <a:r>
-              <a:rPr lang="es-ES" dirty="0" smtClean="0"/>
-              <a:t>.</a:t>
+              <a:t>Decir como resulto.</a:t>
             </a:r>
           </a:p>
           <a:p>
@@ -5843,6 +5859,13 @@
   <p:clrMapOvr>
     <a:masterClrMapping/>
   </p:clrMapOvr>
+  <p:timing>
+    <p:tnLst>
+      <p:par>
+        <p:cTn id="1" dur="indefinite" restart="never" nodeType="tmRoot"/>
+      </p:par>
+    </p:tnLst>
+  </p:timing>
 </p:sld>
 </file>
 
@@ -5888,11 +5911,7 @@
             </a:r>
             <a:r>
               <a:rPr lang="es-ES" dirty="0" smtClean="0"/>
-              <a:t> del eclipse con </a:t>
-            </a:r>
-            <a:r>
-              <a:rPr lang="es-ES" dirty="0" smtClean="0"/>
-              <a:t>PE</a:t>
+              <a:t> del eclipse con PE</a:t>
             </a:r>
           </a:p>
           <a:p>
@@ -5935,6 +5954,13 @@
   <p:clrMapOvr>
     <a:masterClrMapping/>
   </p:clrMapOvr>
+  <p:timing>
+    <p:tnLst>
+      <p:par>
+        <p:cTn id="1" dur="indefinite" restart="never" nodeType="tmRoot"/>
+      </p:par>
+    </p:tnLst>
+  </p:timing>
 </p:sld>
 </file>
 
@@ -5972,15 +5998,7 @@
           <a:p>
             <a:r>
               <a:rPr lang="es-ES" dirty="0" smtClean="0"/>
-              <a:t>Esquema de </a:t>
-            </a:r>
-            <a:r>
-              <a:rPr lang="es-ES" dirty="0" smtClean="0"/>
-              <a:t>autenticación y autorización</a:t>
-            </a:r>
-            <a:r>
-              <a:rPr lang="es-ES" dirty="0" smtClean="0"/>
-              <a:t>.</a:t>
+              <a:t>Esquema de autenticación y autorización.</a:t>
             </a:r>
           </a:p>
           <a:p>
@@ -6061,6 +6079,13 @@
   <p:clrMapOvr>
     <a:masterClrMapping/>
   </p:clrMapOvr>
+  <p:timing>
+    <p:tnLst>
+      <p:par>
+        <p:cTn id="1" dur="indefinite" restart="never" nodeType="tmRoot"/>
+      </p:par>
+    </p:tnLst>
+  </p:timing>
 </p:sld>
 </file>
 
@@ -6118,11 +6143,7 @@
           <a:p>
             <a:r>
               <a:rPr lang="es-ES" dirty="0" smtClean="0"/>
-              <a:t>La colaboración en tiempo real permite  interactuar  a un grupo de trabajo  de forma simple y coordinada  acelerando, enriqueciendo y haciendo mas productivo su trabajo</a:t>
-            </a:r>
-            <a:r>
-              <a:rPr lang="es-ES" dirty="0" smtClean="0"/>
-              <a:t>.</a:t>
+              <a:t>La colaboración en tiempo real permite  interactuar  a un grupo de trabajo  de forma simple y coordinada  acelerando, enriqueciendo y haciendo mas productivo su trabajo.</a:t>
             </a:r>
           </a:p>
           <a:p>
@@ -6169,6 +6190,13 @@
   <p:clrMapOvr>
     <a:masterClrMapping/>
   </p:clrMapOvr>
+  <p:timing>
+    <p:tnLst>
+      <p:par>
+        <p:cTn id="1" dur="indefinite" restart="never" nodeType="tmRoot"/>
+      </p:par>
+    </p:tnLst>
+  </p:timing>
 </p:sld>
 </file>
 
@@ -6199,27 +6227,164 @@
             <p:ph idx="1"/>
           </p:nvPr>
         </p:nvSpPr>
-        <p:spPr/>
-        <p:txBody>
-          <a:bodyPr/>
+        <p:spPr>
+          <a:xfrm>
+            <a:off x="1214414" y="1357298"/>
+            <a:ext cx="7000924" cy="5090944"/>
+          </a:xfrm>
+        </p:spPr>
+        <p:txBody>
+          <a:bodyPr>
+            <a:normAutofit lnSpcReduction="10000"/>
+          </a:bodyPr>
           <a:lstStyle/>
           <a:p>
             <a:r>
               <a:rPr lang="en-US" dirty="0" err="1" smtClean="0"/>
-              <a:t>Primero</a:t>
+              <a:t>Introduccion</a:t>
             </a:r>
             <a:endParaRPr lang="en-US" dirty="0" smtClean="0"/>
           </a:p>
           <a:p>
+            <a:pPr lvl="1"/>
+            <a:r>
+              <a:rPr lang="en-US" dirty="0" err="1" smtClean="0"/>
+              <a:t>Motivación</a:t>
+            </a:r>
+            <a:endParaRPr lang="en-US" dirty="0" smtClean="0"/>
+          </a:p>
+          <a:p>
+            <a:pPr lvl="1"/>
+            <a:r>
+              <a:rPr lang="en-US" dirty="0" err="1" smtClean="0"/>
+              <a:t>Escenario</a:t>
+            </a:r>
+            <a:endParaRPr lang="en-US" dirty="0" smtClean="0"/>
+          </a:p>
+          <a:p>
+            <a:pPr lvl="1"/>
+            <a:r>
+              <a:rPr lang="en-US" dirty="0" err="1" smtClean="0"/>
+              <a:t>Problema</a:t>
+            </a:r>
             <a:r>
               <a:rPr lang="en-US" dirty="0" smtClean="0"/>
-              <a:t>Segundo</a:t>
-            </a:r>
-          </a:p>
-          <a:p>
+              <a:t> a resolver</a:t>
+            </a:r>
+          </a:p>
+          <a:p>
+            <a:pPr lvl="1"/>
             <a:r>
               <a:rPr lang="en-US" dirty="0" err="1" smtClean="0"/>
-              <a:t>Tercero</a:t>
+              <a:t>Soluciones</a:t>
+            </a:r>
+            <a:r>
+              <a:rPr lang="en-US" dirty="0" smtClean="0"/>
+              <a:t> </a:t>
+            </a:r>
+            <a:r>
+              <a:rPr lang="en-US" dirty="0" err="1" smtClean="0"/>
+              <a:t>existentes</a:t>
+            </a:r>
+            <a:endParaRPr lang="en-US" dirty="0" smtClean="0"/>
+          </a:p>
+          <a:p>
+            <a:r>
+              <a:rPr lang="en-US" dirty="0" err="1" smtClean="0"/>
+              <a:t>Solución</a:t>
+            </a:r>
+            <a:r>
+              <a:rPr lang="en-US" dirty="0" smtClean="0"/>
+              <a:t> </a:t>
+            </a:r>
+            <a:r>
+              <a:rPr lang="en-US" dirty="0" err="1" smtClean="0"/>
+              <a:t>propuesta</a:t>
+            </a:r>
+            <a:endParaRPr lang="en-US" dirty="0" smtClean="0"/>
+          </a:p>
+          <a:p>
+            <a:pPr lvl="1"/>
+            <a:r>
+              <a:rPr lang="en-US" dirty="0" err="1" smtClean="0"/>
+              <a:t>Búsqueda</a:t>
+            </a:r>
+            <a:r>
+              <a:rPr lang="en-US" dirty="0" smtClean="0"/>
+              <a:t> de la </a:t>
+            </a:r>
+            <a:r>
+              <a:rPr lang="en-US" dirty="0" err="1" smtClean="0"/>
+              <a:t>solución</a:t>
+            </a:r>
+            <a:endParaRPr lang="en-US" dirty="0" smtClean="0"/>
+          </a:p>
+          <a:p>
+            <a:pPr lvl="1"/>
+            <a:r>
+              <a:rPr lang="en-US" dirty="0" err="1" smtClean="0"/>
+              <a:t>Tecnologìas</a:t>
+            </a:r>
+            <a:r>
+              <a:rPr lang="en-US" dirty="0" smtClean="0"/>
+              <a:t> </a:t>
+            </a:r>
+            <a:r>
+              <a:rPr lang="en-US" dirty="0" err="1" smtClean="0"/>
+              <a:t>utilizadas</a:t>
+            </a:r>
+            <a:endParaRPr lang="en-US" dirty="0" smtClean="0"/>
+          </a:p>
+          <a:p>
+            <a:pPr lvl="1"/>
+            <a:r>
+              <a:rPr lang="en-US" dirty="0" err="1" smtClean="0"/>
+              <a:t>Arquitectura</a:t>
+            </a:r>
+            <a:r>
+              <a:rPr lang="en-US" dirty="0" smtClean="0"/>
+              <a:t> de la </a:t>
+            </a:r>
+            <a:r>
+              <a:rPr lang="en-US" dirty="0" err="1" smtClean="0"/>
+              <a:t>solución</a:t>
+            </a:r>
+            <a:endParaRPr lang="en-US" dirty="0" smtClean="0"/>
+          </a:p>
+          <a:p>
+            <a:r>
+              <a:rPr lang="en-US" dirty="0" smtClean="0"/>
+              <a:t>Demo en vivo</a:t>
+            </a:r>
+          </a:p>
+          <a:p>
+            <a:r>
+              <a:rPr lang="en-US" dirty="0" err="1" smtClean="0"/>
+              <a:t>Cierre</a:t>
+            </a:r>
+            <a:endParaRPr lang="en-US" dirty="0" smtClean="0"/>
+          </a:p>
+          <a:p>
+            <a:pPr lvl="1"/>
+            <a:r>
+              <a:rPr lang="en-US" dirty="0" err="1" smtClean="0"/>
+              <a:t>Posibles</a:t>
+            </a:r>
+            <a:r>
+              <a:rPr lang="en-US" dirty="0" smtClean="0"/>
+              <a:t> </a:t>
+            </a:r>
+            <a:r>
+              <a:rPr lang="en-US" dirty="0" err="1" smtClean="0"/>
+              <a:t>mejoras</a:t>
+            </a:r>
+            <a:endParaRPr lang="en-US" dirty="0" smtClean="0"/>
+          </a:p>
+          <a:p>
+            <a:pPr lvl="1"/>
+            <a:r>
+              <a:rPr lang="en-US" dirty="0" err="1" smtClean="0"/>
+              <a:t>Conclusiones</a:t>
             </a:r>
             <a:endParaRPr lang="en-US" dirty="0" smtClean="0"/>
           </a:p>
@@ -6268,8 +6433,8 @@
         </p:blipFill>
         <p:spPr bwMode="auto">
           <a:xfrm>
-            <a:off x="7935943" y="142852"/>
-            <a:ext cx="993775" cy="1096962"/>
+            <a:off x="5786446" y="1571612"/>
+            <a:ext cx="2500330" cy="2759948"/>
           </a:xfrm>
           <a:prstGeom prst="rect">
             <a:avLst/>
@@ -6840,14 +7005,7 @@
                   <a:latin typeface="Courier New" pitchFamily="49" charset="0"/>
                   <a:cs typeface="Courier New" pitchFamily="49" charset="0"/>
                 </a:rPr>
-                <a:t> </a:t>
-              </a:r>
-              <a:r>
-                <a:rPr lang="en-US" sz="1400" dirty="0" smtClean="0">
-                  <a:latin typeface="Courier New" pitchFamily="49" charset="0"/>
-                  <a:cs typeface="Courier New" pitchFamily="49" charset="0"/>
-                </a:rPr>
-                <a:t> // </a:t>
+                <a:t>  // </a:t>
               </a:r>
               <a:r>
                 <a:rPr lang="en-US" sz="1400" dirty="0" err="1" smtClean="0">
@@ -6922,11 +7080,7 @@
           <a:p>
             <a:r>
               <a:rPr lang="en-US" b="1" dirty="0" err="1" smtClean="0"/>
-              <a:t>u</a:t>
-            </a:r>
-            <a:r>
-              <a:rPr lang="en-US" b="1" dirty="0" err="1" smtClean="0"/>
-              <a:t>bicación</a:t>
+              <a:t>ubicación</a:t>
             </a:r>
             <a:r>
               <a:rPr lang="en-US" b="1" dirty="0" smtClean="0"/>
@@ -6960,11 +7114,7 @@
           <a:p>
             <a:r>
               <a:rPr lang="en-US" b="1" dirty="0" err="1" smtClean="0"/>
-              <a:t>u</a:t>
-            </a:r>
-            <a:r>
-              <a:rPr lang="en-US" b="1" dirty="0" err="1" smtClean="0"/>
-              <a:t>bicación</a:t>
+              <a:t>ubicación</a:t>
             </a:r>
             <a:r>
               <a:rPr lang="en-US" b="1" dirty="0" smtClean="0"/>
@@ -7089,14 +7239,7 @@
                   <a:latin typeface="Courier New" pitchFamily="49" charset="0"/>
                   <a:cs typeface="Courier New" pitchFamily="49" charset="0"/>
                 </a:rPr>
-                <a:t> </a:t>
-              </a:r>
-              <a:r>
-                <a:rPr lang="en-US" sz="1400" dirty="0" smtClean="0">
-                  <a:latin typeface="Courier New" pitchFamily="49" charset="0"/>
-                  <a:cs typeface="Courier New" pitchFamily="49" charset="0"/>
-                </a:rPr>
-                <a:t> // </a:t>
+                <a:t>  // </a:t>
               </a:r>
               <a:r>
                 <a:rPr lang="en-US" sz="1400" dirty="0" err="1" smtClean="0">
@@ -7245,11 +7388,7 @@
           <a:p>
             <a:r>
               <a:rPr lang="es-ES" dirty="0" smtClean="0"/>
-              <a:t>Problemas </a:t>
-            </a:r>
-            <a:r>
-              <a:rPr lang="es-ES" dirty="0" smtClean="0"/>
-              <a:t>a Resolver</a:t>
+              <a:t>Problemas a Resolver</a:t>
             </a:r>
             <a:endParaRPr lang="es-ES" dirty="0"/>
           </a:p>
@@ -7311,14 +7450,343 @@
           <a:chExt cx="0" cy="0"/>
         </a:xfrm>
       </p:grpSpPr>
-      <p:sp>
-        <p:nvSpPr>
-          <p:cNvPr id="3" name="2 Marcador de contenido"/>
-          <p:cNvSpPr>
-            <a:spLocks noGrp="1"/>
-          </p:cNvSpPr>
+      <p:graphicFrame>
+        <p:nvGraphicFramePr>
+          <p:cNvPr id="4" name="3 Marcador de contenido"/>
+          <p:cNvGraphicFramePr>
+            <a:graphicFrameLocks noGrp="1"/>
+          </p:cNvGraphicFramePr>
           <p:nvPr>
             <p:ph idx="1"/>
+          </p:nvPr>
+        </p:nvGraphicFramePr>
+        <p:xfrm>
+          <a:off x="457200" y="1214422"/>
+          <a:ext cx="8229600" cy="4851400"/>
+        </p:xfrm>
+        <a:graphic>
+          <a:graphicData uri="http://schemas.openxmlformats.org/drawingml/2006/table">
+            <a:tbl>
+              <a:tblPr firstRow="1" bandRow="1">
+                <a:tableStyleId>{5C22544A-7EE6-4342-B048-85BDC9FD1C3A}</a:tableStyleId>
+              </a:tblPr>
+              <a:tblGrid>
+                <a:gridCol w="2743200"/>
+                <a:gridCol w="2743200"/>
+                <a:gridCol w="2743200"/>
+              </a:tblGrid>
+              <a:tr h="370840">
+                <a:tc>
+                  <a:txBody>
+                    <a:bodyPr/>
+                    <a:lstStyle/>
+                    <a:p>
+                      <a:r>
+                        <a:rPr lang="es-ES" dirty="0" smtClean="0"/>
+                        <a:t>Solución</a:t>
+                      </a:r>
+                      <a:endParaRPr lang="es-ES" dirty="0"/>
+                    </a:p>
+                  </a:txBody>
+                  <a:tcPr/>
+                </a:tc>
+                <a:tc>
+                  <a:txBody>
+                    <a:bodyPr/>
+                    <a:lstStyle/>
+                    <a:p>
+                      <a:r>
+                        <a:rPr lang="es-ES" dirty="0" smtClean="0"/>
+                        <a:t>Características</a:t>
+                      </a:r>
+                      <a:endParaRPr lang="es-ES" dirty="0"/>
+                    </a:p>
+                  </a:txBody>
+                  <a:tcPr/>
+                </a:tc>
+                <a:tc>
+                  <a:txBody>
+                    <a:bodyPr/>
+                    <a:lstStyle/>
+                    <a:p>
+                      <a:r>
+                        <a:rPr lang="es-ES" dirty="0" smtClean="0"/>
+                        <a:t>Comparativa</a:t>
+                      </a:r>
+                      <a:endParaRPr lang="es-ES" dirty="0"/>
+                    </a:p>
+                  </a:txBody>
+                  <a:tcPr/>
+                </a:tc>
+              </a:tr>
+              <a:tr h="370840">
+                <a:tc>
+                  <a:txBody>
+                    <a:bodyPr/>
+                    <a:lstStyle/>
+                    <a:p>
+                      <a:r>
+                        <a:rPr lang="es-ES" dirty="0" smtClean="0"/>
+                        <a:t>Google </a:t>
+                      </a:r>
+                      <a:r>
+                        <a:rPr lang="es-ES" dirty="0" err="1" smtClean="0"/>
+                        <a:t>Docs</a:t>
+                      </a:r>
+                      <a:endParaRPr lang="es-ES" dirty="0"/>
+                    </a:p>
+                  </a:txBody>
+                  <a:tcPr/>
+                </a:tc>
+                <a:tc>
+                  <a:txBody>
+                    <a:bodyPr/>
+                    <a:lstStyle/>
+                    <a:p>
+                      <a:r>
+                        <a:rPr lang="es-ES" dirty="0" smtClean="0"/>
+                        <a:t>Edición</a:t>
+                      </a:r>
+                      <a:r>
+                        <a:rPr lang="es-ES" baseline="0" dirty="0" smtClean="0"/>
+                        <a:t> de </a:t>
+                      </a:r>
+                      <a:r>
+                        <a:rPr lang="es-ES" baseline="0" dirty="0" err="1" smtClean="0"/>
+                        <a:t>docs</a:t>
+                      </a:r>
+                      <a:r>
+                        <a:rPr lang="es-ES" baseline="0" dirty="0" smtClean="0"/>
+                        <a:t> en tiempo real desde un navegador.</a:t>
+                      </a:r>
+                      <a:endParaRPr lang="es-ES" dirty="0"/>
+                    </a:p>
+                  </a:txBody>
+                  <a:tcPr/>
+                </a:tc>
+                <a:tc>
+                  <a:txBody>
+                    <a:bodyPr/>
+                    <a:lstStyle/>
+                    <a:p>
+                      <a:r>
+                        <a:rPr lang="es-ES" dirty="0" smtClean="0"/>
+                        <a:t>Solo utilizable a través</a:t>
+                      </a:r>
+                      <a:r>
+                        <a:rPr lang="es-ES" baseline="0" dirty="0" smtClean="0"/>
+                        <a:t> de un browser. Código fuente cerrado.</a:t>
+                      </a:r>
+                      <a:endParaRPr lang="es-ES" dirty="0"/>
+                    </a:p>
+                  </a:txBody>
+                  <a:tcPr/>
+                </a:tc>
+              </a:tr>
+              <a:tr h="370840">
+                <a:tc>
+                  <a:txBody>
+                    <a:bodyPr/>
+                    <a:lstStyle/>
+                    <a:p>
+                      <a:r>
+                        <a:rPr lang="es-ES" dirty="0" smtClean="0"/>
+                        <a:t>Google Wave</a:t>
+                      </a:r>
+                      <a:endParaRPr lang="es-ES" dirty="0"/>
+                    </a:p>
+                  </a:txBody>
+                  <a:tcPr/>
+                </a:tc>
+                <a:tc>
+                  <a:txBody>
+                    <a:bodyPr/>
+                    <a:lstStyle/>
+                    <a:p>
+                      <a:r>
+                        <a:rPr lang="es-ES" dirty="0" smtClean="0"/>
+                        <a:t>Comunicación</a:t>
+                      </a:r>
+                      <a:r>
+                        <a:rPr lang="es-ES" baseline="0" dirty="0" smtClean="0"/>
+                        <a:t> y colaboración en tiempo real.</a:t>
+                      </a:r>
+                      <a:endParaRPr lang="es-ES" dirty="0"/>
+                    </a:p>
+                  </a:txBody>
+                  <a:tcPr/>
+                </a:tc>
+                <a:tc>
+                  <a:txBody>
+                    <a:bodyPr/>
+                    <a:lstStyle/>
+                    <a:p>
+                      <a:r>
+                        <a:rPr lang="es-ES" dirty="0" smtClean="0"/>
+                        <a:t>Ídem</a:t>
+                      </a:r>
+                      <a:r>
+                        <a:rPr lang="es-ES" baseline="0" dirty="0" smtClean="0"/>
+                        <a:t> Google </a:t>
+                      </a:r>
+                      <a:r>
+                        <a:rPr lang="es-ES" baseline="0" dirty="0" err="1" smtClean="0"/>
+                        <a:t>Docs</a:t>
+                      </a:r>
+                      <a:r>
+                        <a:rPr lang="es-ES" baseline="0" dirty="0" smtClean="0"/>
+                        <a:t>. El proyecto ha sido abandonado.</a:t>
+                      </a:r>
+                      <a:endParaRPr lang="es-ES" dirty="0"/>
+                    </a:p>
+                  </a:txBody>
+                  <a:tcPr/>
+                </a:tc>
+              </a:tr>
+              <a:tr h="370840">
+                <a:tc>
+                  <a:txBody>
+                    <a:bodyPr/>
+                    <a:lstStyle/>
+                    <a:p>
+                      <a:r>
+                        <a:rPr lang="es-ES" dirty="0" smtClean="0"/>
+                        <a:t>COLA (ECF)</a:t>
+                      </a:r>
+                      <a:endParaRPr lang="es-ES" dirty="0"/>
+                    </a:p>
+                  </a:txBody>
+                  <a:tcPr/>
+                </a:tc>
+                <a:tc>
+                  <a:txBody>
+                    <a:bodyPr/>
+                    <a:lstStyle/>
+                    <a:p>
+                      <a:r>
+                        <a:rPr lang="es-ES" dirty="0" smtClean="0"/>
+                        <a:t>Integración</a:t>
+                      </a:r>
+                      <a:r>
+                        <a:rPr lang="es-ES" baseline="0" dirty="0" smtClean="0"/>
+                        <a:t> con Eclipse para colaboración en tiempo real de código fuente.</a:t>
+                      </a:r>
+                      <a:endParaRPr lang="es-ES" dirty="0"/>
+                    </a:p>
+                  </a:txBody>
+                  <a:tcPr/>
+                </a:tc>
+                <a:tc>
+                  <a:txBody>
+                    <a:bodyPr/>
+                    <a:lstStyle/>
+                    <a:p>
+                      <a:r>
+                        <a:rPr lang="es-ES" dirty="0" smtClean="0"/>
+                        <a:t>Máximo</a:t>
+                      </a:r>
+                      <a:r>
+                        <a:rPr lang="es-ES" baseline="0" dirty="0" smtClean="0"/>
+                        <a:t> dos  usuarios en una sesión de edición. Depende del proyecto ECF.</a:t>
+                      </a:r>
+                      <a:endParaRPr lang="es-ES" dirty="0"/>
+                    </a:p>
+                  </a:txBody>
+                  <a:tcPr/>
+                </a:tc>
+              </a:tr>
+              <a:tr h="370840">
+                <a:tc>
+                  <a:txBody>
+                    <a:bodyPr/>
+                    <a:lstStyle/>
+                    <a:p>
+                      <a:r>
+                        <a:rPr lang="es-ES" dirty="0" err="1" smtClean="0"/>
+                        <a:t>BeWeeVee</a:t>
+                      </a:r>
+                      <a:endParaRPr lang="es-ES" dirty="0"/>
+                    </a:p>
+                  </a:txBody>
+                  <a:tcPr/>
+                </a:tc>
+                <a:tc>
+                  <a:txBody>
+                    <a:bodyPr/>
+                    <a:lstStyle/>
+                    <a:p>
+                      <a:r>
+                        <a:rPr lang="es-ES" dirty="0" err="1" smtClean="0"/>
+                        <a:t>Framwork</a:t>
+                      </a:r>
+                      <a:r>
+                        <a:rPr lang="es-ES" baseline="0" dirty="0" smtClean="0"/>
+                        <a:t> para integración de funcionalidad de </a:t>
+                      </a:r>
+                      <a:r>
+                        <a:rPr lang="es-ES" baseline="0" dirty="0" err="1" smtClean="0"/>
+                        <a:t>colaboracion</a:t>
+                      </a:r>
+                      <a:r>
+                        <a:rPr lang="es-ES" baseline="0" dirty="0" smtClean="0"/>
+                        <a:t> en tiempo real para </a:t>
+                      </a:r>
+                      <a:r>
+                        <a:rPr lang="es-ES" baseline="0" dirty="0" err="1" smtClean="0"/>
+                        <a:t>.Net</a:t>
+                      </a:r>
+                      <a:r>
+                        <a:rPr lang="es-ES" baseline="0" dirty="0" smtClean="0"/>
+                        <a:t>.</a:t>
+                      </a:r>
+                      <a:endParaRPr lang="es-ES" dirty="0"/>
+                    </a:p>
+                  </a:txBody>
+                  <a:tcPr/>
+                </a:tc>
+                <a:tc>
+                  <a:txBody>
+                    <a:bodyPr/>
+                    <a:lstStyle/>
+                    <a:p>
+                      <a:r>
+                        <a:rPr lang="es-ES" dirty="0" smtClean="0"/>
+                        <a:t>Código</a:t>
+                      </a:r>
+                      <a:r>
+                        <a:rPr lang="es-ES" baseline="0" dirty="0" smtClean="0"/>
+                        <a:t> fuente </a:t>
+                      </a:r>
+                      <a:r>
+                        <a:rPr lang="es-ES" baseline="0" dirty="0" err="1" smtClean="0"/>
+                        <a:t>cerrrado</a:t>
+                      </a:r>
+                      <a:r>
+                        <a:rPr lang="es-ES" baseline="0" dirty="0" smtClean="0"/>
+                        <a:t>. Está desarrollado sólo para la plataforma </a:t>
+                      </a:r>
+                      <a:r>
+                        <a:rPr lang="es-ES" baseline="0" dirty="0" err="1" smtClean="0"/>
+                        <a:t>.Net</a:t>
+                      </a:r>
+                      <a:endParaRPr lang="es-ES" dirty="0"/>
+                    </a:p>
+                  </a:txBody>
+                  <a:tcPr/>
+                </a:tc>
+              </a:tr>
+            </a:tbl>
+          </a:graphicData>
+        </a:graphic>
+      </p:graphicFrame>
+      <p:sp>
+        <p:nvSpPr>
+          <p:cNvPr id="2" name="1 Título"/>
+          <p:cNvSpPr>
+            <a:spLocks noGrp="1"/>
+          </p:cNvSpPr>
+          <p:nvPr>
+            <p:ph type="title"/>
           </p:nvPr>
         </p:nvSpPr>
         <p:spPr/>
@@ -7328,40 +7796,96 @@
           <a:p>
             <a:r>
               <a:rPr lang="es-ES" dirty="0" smtClean="0"/>
-              <a:t>Poner  acá el cuadrito comparativo</a:t>
+              <a:t>Otras soluciones similares</a:t>
             </a:r>
             <a:endParaRPr lang="es-ES" dirty="0"/>
           </a:p>
         </p:txBody>
       </p:sp>
-      <p:sp>
-        <p:nvSpPr>
-          <p:cNvPr id="2" name="1 Título"/>
-          <p:cNvSpPr>
-            <a:spLocks noGrp="1"/>
-          </p:cNvSpPr>
-          <p:nvPr>
-            <p:ph type="title"/>
-          </p:nvPr>
-        </p:nvSpPr>
-        <p:spPr/>
-        <p:txBody>
-          <a:bodyPr/>
-          <a:lstStyle/>
-          <a:p>
-            <a:r>
-              <a:rPr lang="es-ES" dirty="0" smtClean="0"/>
-              <a:t>Otras soluciones similares</a:t>
-            </a:r>
-            <a:endParaRPr lang="es-ES" dirty="0"/>
-          </a:p>
-        </p:txBody>
-      </p:sp>
+      <p:pic>
+        <p:nvPicPr>
+          <p:cNvPr id="5" name="4 Imagen" descr="googledocs.bmp"/>
+          <p:cNvPicPr>
+            <a:picLocks noChangeAspect="1"/>
+          </p:cNvPicPr>
+          <p:nvPr/>
+        </p:nvPicPr>
+        <p:blipFill>
+          <a:blip r:embed="rId2"/>
+          <a:stretch>
+            <a:fillRect/>
+          </a:stretch>
+        </p:blipFill>
+        <p:spPr>
+          <a:xfrm>
+            <a:off x="2143108" y="1643050"/>
+            <a:ext cx="942975" cy="895350"/>
+          </a:xfrm>
+          <a:prstGeom prst="rect">
+            <a:avLst/>
+          </a:prstGeom>
+        </p:spPr>
+      </p:pic>
+      <p:pic>
+        <p:nvPicPr>
+          <p:cNvPr id="6" name="5 Imagen" descr="googlewave.bmp"/>
+          <p:cNvPicPr>
+            <a:picLocks noChangeAspect="1"/>
+          </p:cNvPicPr>
+          <p:nvPr/>
+        </p:nvPicPr>
+        <p:blipFill>
+          <a:blip r:embed="rId3"/>
+          <a:stretch>
+            <a:fillRect/>
+          </a:stretch>
+        </p:blipFill>
+        <p:spPr>
+          <a:xfrm>
+            <a:off x="2143108" y="2500306"/>
+            <a:ext cx="914400" cy="895350"/>
+          </a:xfrm>
+          <a:prstGeom prst="rect">
+            <a:avLst/>
+          </a:prstGeom>
+        </p:spPr>
+      </p:pic>
+      <p:pic>
+        <p:nvPicPr>
+          <p:cNvPr id="7" name="6 Imagen" descr="beweevee.jpg"/>
+          <p:cNvPicPr>
+            <a:picLocks noChangeAspect="1"/>
+          </p:cNvPicPr>
+          <p:nvPr/>
+        </p:nvPicPr>
+        <p:blipFill>
+          <a:blip r:embed="rId4"/>
+          <a:stretch>
+            <a:fillRect/>
+          </a:stretch>
+        </p:blipFill>
+        <p:spPr>
+          <a:xfrm>
+            <a:off x="785786" y="5072074"/>
+            <a:ext cx="1428760" cy="727859"/>
+          </a:xfrm>
+          <a:prstGeom prst="rect">
+            <a:avLst/>
+          </a:prstGeom>
+        </p:spPr>
+      </p:pic>
     </p:spTree>
   </p:cSld>
   <p:clrMapOvr>
     <a:masterClrMapping/>
   </p:clrMapOvr>
+  <p:timing>
+    <p:tnLst>
+      <p:par>
+        <p:cTn id="1" dur="indefinite" restart="never" nodeType="tmRoot"/>
+      </p:par>
+    </p:tnLst>
+  </p:timing>
 </p:sld>
 </file>
 
@@ -7397,7 +7921,7 @@
           <a:bodyPr/>
           <a:lstStyle/>
           <a:p>
-            <a:endParaRPr lang="es-ES"/>
+            <a:endParaRPr lang="es-ES" dirty="0"/>
           </a:p>
         </p:txBody>
       </p:sp>
@@ -7429,6 +7953,13 @@
   <p:clrMapOvr>
     <a:masterClrMapping/>
   </p:clrMapOvr>
+  <p:timing>
+    <p:tnLst>
+      <p:par>
+        <p:cTn id="1" dur="indefinite" restart="never" nodeType="tmRoot"/>
+      </p:par>
+    </p:tnLst>
+  </p:timing>
 </p:sld>
 </file>
 
@@ -7498,6 +8029,13 @@
   <p:clrMapOvr>
     <a:masterClrMapping/>
   </p:clrMapOvr>
+  <p:timing>
+    <p:tnLst>
+      <p:par>
+        <p:cTn id="1" dur="indefinite" restart="never" nodeType="tmRoot"/>
+      </p:par>
+    </p:tnLst>
+  </p:timing>
 </p:sld>
 </file>
 
@@ -7585,6 +8123,13 @@
   <p:clrMapOvr>
     <a:masterClrMapping/>
   </p:clrMapOvr>
+  <p:timing>
+    <p:tnLst>
+      <p:par>
+        <p:cTn id="1" dur="indefinite" restart="never" nodeType="tmRoot"/>
+      </p:par>
+    </p:tnLst>
+  </p:timing>
 </p:sld>
 </file>
 

</xml_diff>

<commit_message>
stub busqueda de la solucion
</commit_message>
<xml_diff>
--- a/doc/presentacion/presentacion.pptx
+++ b/doc/presentacion/presentacion.pptx
@@ -5,7 +5,7 @@
     <p:sldMasterId id="2147483672" r:id="rId1"/>
   </p:sldMasterIdLst>
   <p:notesMasterIdLst>
-    <p:notesMasterId r:id="rId18"/>
+    <p:notesMasterId r:id="rId19"/>
   </p:notesMasterIdLst>
   <p:sldIdLst>
     <p:sldId id="256" r:id="rId2"/>
@@ -15,15 +15,16 @@
     <p:sldId id="271" r:id="rId6"/>
     <p:sldId id="258" r:id="rId7"/>
     <p:sldId id="260" r:id="rId8"/>
-    <p:sldId id="261" r:id="rId9"/>
-    <p:sldId id="262" r:id="rId10"/>
-    <p:sldId id="263" r:id="rId11"/>
-    <p:sldId id="265" r:id="rId12"/>
-    <p:sldId id="264" r:id="rId13"/>
-    <p:sldId id="266" r:id="rId14"/>
-    <p:sldId id="269" r:id="rId15"/>
-    <p:sldId id="267" r:id="rId16"/>
-    <p:sldId id="268" r:id="rId17"/>
+    <p:sldId id="272" r:id="rId9"/>
+    <p:sldId id="261" r:id="rId10"/>
+    <p:sldId id="262" r:id="rId11"/>
+    <p:sldId id="263" r:id="rId12"/>
+    <p:sldId id="265" r:id="rId13"/>
+    <p:sldId id="264" r:id="rId14"/>
+    <p:sldId id="266" r:id="rId15"/>
+    <p:sldId id="269" r:id="rId16"/>
+    <p:sldId id="267" r:id="rId17"/>
+    <p:sldId id="268" r:id="rId18"/>
   </p:sldIdLst>
   <p:sldSz cx="9144000" cy="6858000" type="screen4x3"/>
   <p:notesSz cx="6858000" cy="9144000"/>
@@ -493,7 +494,7 @@
       </p:grpSpPr>
       <p:sp>
         <p:nvSpPr>
-          <p:cNvPr id="2" name="Slide Image Placeholder 1"/>
+          <p:cNvPr id="2" name="1 Marcador de imagen de diapositiva"/>
           <p:cNvSpPr>
             <a:spLocks noGrp="1" noRot="1" noChangeAspect="1"/>
           </p:cNvSpPr>
@@ -505,7 +506,7 @@
       </p:sp>
       <p:sp>
         <p:nvSpPr>
-          <p:cNvPr id="3" name="Notes Placeholder 2"/>
+          <p:cNvPr id="3" name="2 Marcador de notas"/>
           <p:cNvSpPr>
             <a:spLocks noGrp="1"/>
           </p:cNvSpPr>
@@ -520,7 +521,89 @@
           </a:bodyPr>
           <a:lstStyle/>
           <a:p>
-            <a:endParaRPr lang="es-AR" dirty="0"/>
+            <a:endParaRPr lang="es-ES"/>
+          </a:p>
+        </p:txBody>
+      </p:sp>
+      <p:sp>
+        <p:nvSpPr>
+          <p:cNvPr id="4" name="3 Marcador de número de diapositiva"/>
+          <p:cNvSpPr>
+            <a:spLocks noGrp="1"/>
+          </p:cNvSpPr>
+          <p:nvPr>
+            <p:ph type="sldNum" sz="quarter" idx="10"/>
+          </p:nvPr>
+        </p:nvSpPr>
+        <p:spPr/>
+        <p:txBody>
+          <a:bodyPr/>
+          <a:lstStyle/>
+          <a:p>
+            <a:fld id="{3BCBAC67-084D-419D-A89D-D7FC2C09E238}" type="slidenum">
+              <a:rPr lang="es-AR" smtClean="0"/>
+              <a:pPr/>
+              <a:t>1</a:t>
+            </a:fld>
+            <a:endParaRPr lang="es-AR"/>
+          </a:p>
+        </p:txBody>
+      </p:sp>
+    </p:spTree>
+  </p:cSld>
+  <p:clrMapOvr>
+    <a:masterClrMapping/>
+  </p:clrMapOvr>
+</p:notes>
+</file>
+
+<file path=ppt/notesSlides/notesSlide2.xml><?xml version="1.0" encoding="utf-8"?>
+<p:notes xmlns:a="http://schemas.openxmlformats.org/drawingml/2006/main" xmlns:r="http://schemas.openxmlformats.org/officeDocument/2006/relationships" xmlns:p="http://schemas.openxmlformats.org/presentationml/2006/main">
+  <p:cSld>
+    <p:spTree>
+      <p:nvGrpSpPr>
+        <p:cNvPr id="1" name=""/>
+        <p:cNvGrpSpPr/>
+        <p:nvPr/>
+      </p:nvGrpSpPr>
+      <p:grpSpPr>
+        <a:xfrm>
+          <a:off x="0" y="0"/>
+          <a:ext cx="0" cy="0"/>
+          <a:chOff x="0" y="0"/>
+          <a:chExt cx="0" cy="0"/>
+        </a:xfrm>
+      </p:grpSpPr>
+      <p:sp>
+        <p:nvSpPr>
+          <p:cNvPr id="2" name="Slide Image Placeholder 1"/>
+          <p:cNvSpPr>
+            <a:spLocks noGrp="1" noRot="1" noChangeAspect="1"/>
+          </p:cNvSpPr>
+          <p:nvPr>
+            <p:ph type="sldImg"/>
+          </p:nvPr>
+        </p:nvSpPr>
+        <p:spPr/>
+      </p:sp>
+      <p:sp>
+        <p:nvSpPr>
+          <p:cNvPr id="3" name="Notes Placeholder 2"/>
+          <p:cNvSpPr>
+            <a:spLocks noGrp="1"/>
+          </p:cNvSpPr>
+          <p:nvPr>
+            <p:ph type="body" idx="1"/>
+          </p:nvPr>
+        </p:nvSpPr>
+        <p:spPr/>
+        <p:txBody>
+          <a:bodyPr>
+            <a:normAutofit/>
+          </a:bodyPr>
+          <a:lstStyle/>
+          <a:p>
+            <a:endParaRPr lang="es-AR"/>
           </a:p>
         </p:txBody>
       </p:sp>
@@ -1184,7 +1267,7 @@
               <a:pPr/>
               <a:t>12/6/2010</a:t>
             </a:fld>
-            <a:endParaRPr lang="en-US" dirty="0">
+            <a:endParaRPr lang="en-US">
               <a:solidFill>
                 <a:schemeClr val="tx2">
                   <a:shade val="90000"/>
@@ -1221,7 +1304,7 @@
           </a:lstStyle>
           <a:p>
             <a:pPr algn="l" eaLnBrk="1" latinLnBrk="0" hangingPunct="1"/>
-            <a:endParaRPr kumimoji="0" lang="en-US" dirty="0">
+            <a:endParaRPr kumimoji="0" lang="en-US">
               <a:solidFill>
                 <a:schemeClr val="tx2">
                   <a:shade val="90000"/>
@@ -1260,7 +1343,7 @@
               <a:pPr/>
               <a:t>‹Nº›</a:t>
             </a:fld>
-            <a:endParaRPr kumimoji="0" lang="en-US" dirty="0">
+            <a:endParaRPr kumimoji="0" lang="en-US">
               <a:solidFill>
                 <a:schemeClr val="tx2">
                   <a:shade val="90000"/>
@@ -1401,7 +1484,7 @@
               <a:pPr/>
               <a:t>12/6/2010</a:t>
             </a:fld>
-            <a:endParaRPr lang="en-US" dirty="0">
+            <a:endParaRPr lang="en-US">
               <a:solidFill>
                 <a:schemeClr val="tx2">
                   <a:shade val="90000"/>
@@ -1429,7 +1512,7 @@
           </a:lstStyle>
           <a:p>
             <a:pPr algn="l" eaLnBrk="1" latinLnBrk="0" hangingPunct="1"/>
-            <a:endParaRPr kumimoji="0" lang="en-US" dirty="0">
+            <a:endParaRPr kumimoji="0" lang="en-US">
               <a:solidFill>
                 <a:schemeClr val="tx2">
                   <a:shade val="90000"/>
@@ -1461,7 +1544,7 @@
               <a:pPr/>
               <a:t>‹Nº›</a:t>
             </a:fld>
-            <a:endParaRPr kumimoji="0" lang="en-US" dirty="0">
+            <a:endParaRPr kumimoji="0" lang="en-US">
               <a:solidFill>
                 <a:schemeClr val="tx2">
                   <a:shade val="90000"/>
@@ -1607,7 +1690,7 @@
               <a:pPr/>
               <a:t>12/6/2010</a:t>
             </a:fld>
-            <a:endParaRPr lang="en-US" dirty="0">
+            <a:endParaRPr lang="en-US">
               <a:solidFill>
                 <a:schemeClr val="tx2">
                   <a:shade val="90000"/>
@@ -1635,7 +1718,7 @@
           </a:lstStyle>
           <a:p>
             <a:pPr algn="l" eaLnBrk="1" latinLnBrk="0" hangingPunct="1"/>
-            <a:endParaRPr kumimoji="0" lang="en-US" dirty="0">
+            <a:endParaRPr kumimoji="0" lang="en-US">
               <a:solidFill>
                 <a:schemeClr val="tx2">
                   <a:shade val="90000"/>
@@ -1667,7 +1750,7 @@
               <a:pPr/>
               <a:t>‹Nº›</a:t>
             </a:fld>
-            <a:endParaRPr kumimoji="0" lang="en-US" dirty="0">
+            <a:endParaRPr kumimoji="0" lang="en-US">
               <a:solidFill>
                 <a:schemeClr val="tx2">
                   <a:shade val="90000"/>
@@ -1778,7 +1861,7 @@
               <a:pPr/>
               <a:t>12/6/2010</a:t>
             </a:fld>
-            <a:endParaRPr lang="en-US" dirty="0">
+            <a:endParaRPr lang="en-US">
               <a:solidFill>
                 <a:schemeClr val="tx2">
                   <a:shade val="90000"/>
@@ -1806,7 +1889,7 @@
           </a:lstStyle>
           <a:p>
             <a:pPr algn="l" eaLnBrk="1" latinLnBrk="0" hangingPunct="1"/>
-            <a:endParaRPr kumimoji="0" lang="en-US" dirty="0">
+            <a:endParaRPr kumimoji="0" lang="en-US">
               <a:solidFill>
                 <a:schemeClr val="tx2">
                   <a:shade val="90000"/>
@@ -1838,7 +1921,7 @@
               <a:pPr/>
               <a:t>‹Nº›</a:t>
             </a:fld>
-            <a:endParaRPr kumimoji="0" lang="en-US" dirty="0">
+            <a:endParaRPr kumimoji="0" lang="en-US">
               <a:solidFill>
                 <a:schemeClr val="tx2">
                   <a:shade val="90000"/>
@@ -2054,7 +2137,7 @@
               <a:pPr/>
               <a:t>12/6/2010</a:t>
             </a:fld>
-            <a:endParaRPr lang="en-US" dirty="0">
+            <a:endParaRPr lang="en-US">
               <a:solidFill>
                 <a:schemeClr val="tx2">
                   <a:shade val="90000"/>
@@ -2082,7 +2165,7 @@
           </a:lstStyle>
           <a:p>
             <a:pPr algn="l" eaLnBrk="1" latinLnBrk="0" hangingPunct="1"/>
-            <a:endParaRPr kumimoji="0" lang="en-US" dirty="0">
+            <a:endParaRPr kumimoji="0" lang="en-US">
               <a:solidFill>
                 <a:schemeClr val="tx2">
                   <a:shade val="90000"/>
@@ -2114,7 +2197,7 @@
               <a:pPr/>
               <a:t>‹Nº›</a:t>
             </a:fld>
-            <a:endParaRPr kumimoji="0" lang="en-US" dirty="0">
+            <a:endParaRPr kumimoji="0" lang="en-US">
               <a:solidFill>
                 <a:schemeClr val="tx2">
                   <a:shade val="90000"/>
@@ -2484,7 +2567,7 @@
               <a:pPr/>
               <a:t>12/6/2010</a:t>
             </a:fld>
-            <a:endParaRPr lang="en-US" dirty="0">
+            <a:endParaRPr lang="en-US">
               <a:solidFill>
                 <a:schemeClr val="tx2">
                   <a:shade val="90000"/>
@@ -2512,7 +2595,7 @@
           </a:lstStyle>
           <a:p>
             <a:pPr algn="l" eaLnBrk="1" latinLnBrk="0" hangingPunct="1"/>
-            <a:endParaRPr kumimoji="0" lang="en-US" dirty="0">
+            <a:endParaRPr kumimoji="0" lang="en-US">
               <a:solidFill>
                 <a:schemeClr val="tx2">
                   <a:shade val="90000"/>
@@ -2544,7 +2627,7 @@
               <a:pPr/>
               <a:t>‹Nº›</a:t>
             </a:fld>
-            <a:endParaRPr kumimoji="0" lang="en-US" dirty="0">
+            <a:endParaRPr kumimoji="0" lang="en-US">
               <a:solidFill>
                 <a:schemeClr val="tx2">
                   <a:shade val="90000"/>
@@ -2951,7 +3034,7 @@
               <a:pPr/>
               <a:t>12/6/2010</a:t>
             </a:fld>
-            <a:endParaRPr lang="en-US" dirty="0">
+            <a:endParaRPr lang="en-US">
               <a:solidFill>
                 <a:schemeClr val="tx2">
                   <a:shade val="90000"/>
@@ -2979,7 +3062,7 @@
           </a:lstStyle>
           <a:p>
             <a:pPr algn="l" eaLnBrk="1" latinLnBrk="0" hangingPunct="1"/>
-            <a:endParaRPr kumimoji="0" lang="en-US" dirty="0">
+            <a:endParaRPr kumimoji="0" lang="en-US">
               <a:solidFill>
                 <a:schemeClr val="tx2">
                   <a:shade val="90000"/>
@@ -3011,7 +3094,7 @@
               <a:pPr/>
               <a:t>‹Nº›</a:t>
             </a:fld>
-            <a:endParaRPr kumimoji="0" lang="en-US" dirty="0">
+            <a:endParaRPr kumimoji="0" lang="en-US">
               <a:solidFill>
                 <a:schemeClr val="tx2">
                   <a:shade val="90000"/>
@@ -3073,7 +3156,7 @@
               <a:pPr/>
               <a:t>12/6/2010</a:t>
             </a:fld>
-            <a:endParaRPr lang="en-US" dirty="0">
+            <a:endParaRPr lang="en-US">
               <a:solidFill>
                 <a:schemeClr val="tx2">
                   <a:shade val="90000"/>
@@ -3101,7 +3184,7 @@
           </a:lstStyle>
           <a:p>
             <a:pPr algn="l" eaLnBrk="1" latinLnBrk="0" hangingPunct="1"/>
-            <a:endParaRPr kumimoji="0" lang="en-US" dirty="0">
+            <a:endParaRPr kumimoji="0" lang="en-US">
               <a:solidFill>
                 <a:schemeClr val="tx2">
                   <a:shade val="90000"/>
@@ -3133,7 +3216,7 @@
               <a:pPr/>
               <a:t>‹Nº›</a:t>
             </a:fld>
-            <a:endParaRPr kumimoji="0" lang="en-US" dirty="0">
+            <a:endParaRPr kumimoji="0" lang="en-US">
               <a:solidFill>
                 <a:schemeClr val="tx2">
                   <a:shade val="90000"/>
@@ -3215,7 +3298,7 @@
               <a:pPr/>
               <a:t>12/6/2010</a:t>
             </a:fld>
-            <a:endParaRPr lang="en-US" dirty="0">
+            <a:endParaRPr lang="en-US">
               <a:solidFill>
                 <a:schemeClr val="tx2">
                   <a:shade val="90000"/>
@@ -3243,7 +3326,7 @@
           </a:lstStyle>
           <a:p>
             <a:pPr algn="l" eaLnBrk="1" latinLnBrk="0" hangingPunct="1"/>
-            <a:endParaRPr kumimoji="0" lang="en-US" dirty="0">
+            <a:endParaRPr kumimoji="0" lang="en-US">
               <a:solidFill>
                 <a:schemeClr val="tx2">
                   <a:shade val="90000"/>
@@ -3275,7 +3358,7 @@
               <a:pPr/>
               <a:t>‹Nº›</a:t>
             </a:fld>
-            <a:endParaRPr kumimoji="0" lang="en-US" dirty="0">
+            <a:endParaRPr kumimoji="0" lang="en-US">
               <a:solidFill>
                 <a:schemeClr val="tx2">
                   <a:shade val="90000"/>
@@ -3510,7 +3593,7 @@
               <a:pPr/>
               <a:t>12/6/2010</a:t>
             </a:fld>
-            <a:endParaRPr lang="en-US" dirty="0">
+            <a:endParaRPr lang="en-US">
               <a:solidFill>
                 <a:schemeClr val="tx2">
                   <a:shade val="90000"/>
@@ -3538,7 +3621,7 @@
           </a:lstStyle>
           <a:p>
             <a:pPr algn="l" eaLnBrk="1" latinLnBrk="0" hangingPunct="1"/>
-            <a:endParaRPr kumimoji="0" lang="en-US" dirty="0">
+            <a:endParaRPr kumimoji="0" lang="en-US">
               <a:solidFill>
                 <a:schemeClr val="tx2">
                   <a:shade val="90000"/>
@@ -3570,7 +3653,7 @@
               <a:pPr/>
               <a:t>‹Nº›</a:t>
             </a:fld>
-            <a:endParaRPr kumimoji="0" lang="en-US" dirty="0">
+            <a:endParaRPr kumimoji="0" lang="en-US">
               <a:solidFill>
                 <a:schemeClr val="tx2">
                   <a:shade val="90000"/>
@@ -3703,7 +3786,7 @@
               <a:rPr kumimoji="0" lang="en-US" smtClean="0"/>
               <a:t>Click icon to add picture</a:t>
             </a:r>
-            <a:endParaRPr kumimoji="0" lang="en-US" dirty="0"/>
+            <a:endParaRPr kumimoji="0" lang="en-US"/>
           </a:p>
         </p:txBody>
       </p:sp>
@@ -3736,7 +3819,7 @@
               <a:pPr/>
               <a:t>12/6/2010</a:t>
             </a:fld>
-            <a:endParaRPr lang="en-US" dirty="0">
+            <a:endParaRPr lang="en-US">
               <a:solidFill>
                 <a:schemeClr val="tx2">
                   <a:shade val="90000"/>
@@ -3776,7 +3859,7 @@
           </a:lstStyle>
           <a:p>
             <a:pPr algn="l" eaLnBrk="1" latinLnBrk="0" hangingPunct="1"/>
-            <a:endParaRPr kumimoji="0" lang="en-US" dirty="0">
+            <a:endParaRPr kumimoji="0" lang="en-US">
               <a:solidFill>
                 <a:schemeClr val="tx2">
                   <a:shade val="90000"/>
@@ -3815,7 +3898,7 @@
               <a:pPr/>
               <a:t>‹Nº›</a:t>
             </a:fld>
-            <a:endParaRPr kumimoji="0" lang="en-US" dirty="0">
+            <a:endParaRPr kumimoji="0" lang="en-US">
               <a:solidFill>
                 <a:schemeClr val="tx2">
                   <a:shade val="90000"/>
@@ -4866,7 +4949,7 @@
               <a:pPr/>
               <a:t>12/6/2010</a:t>
             </a:fld>
-            <a:endParaRPr lang="en-US" dirty="0">
+            <a:endParaRPr lang="en-US">
               <a:solidFill>
                 <a:schemeClr val="tx2">
                   <a:shade val="90000"/>
@@ -4909,7 +4992,7 @@
           </a:lstStyle>
           <a:p>
             <a:pPr algn="l" eaLnBrk="1" latinLnBrk="0" hangingPunct="1"/>
-            <a:endParaRPr kumimoji="0" lang="en-US" dirty="0">
+            <a:endParaRPr kumimoji="0" lang="en-US">
               <a:solidFill>
                 <a:schemeClr val="tx2">
                   <a:shade val="90000"/>
@@ -4956,7 +5039,7 @@
               <a:pPr/>
               <a:t>‹Nº›</a:t>
             </a:fld>
-            <a:endParaRPr kumimoji="0" lang="en-US" dirty="0">
+            <a:endParaRPr kumimoji="0" lang="en-US">
               <a:solidFill>
                 <a:schemeClr val="tx2">
                   <a:shade val="90000"/>
@@ -5318,10 +5401,10 @@
               <a:t>Parallel</a:t>
             </a:r>
             <a:r>
-              <a:rPr lang="es-ES" sz="9600" dirty="0" smtClean="0"/>
+              <a:rPr lang="es-ES" sz="9600" smtClean="0"/>
               <a:t> Editor</a:t>
             </a:r>
-            <a:endParaRPr lang="es-ES" sz="9600" dirty="0"/>
+            <a:endParaRPr lang="es-ES" sz="9600"/>
           </a:p>
         </p:txBody>
       </p:sp>
@@ -5346,35 +5429,35 @@
           <a:lstStyle/>
           <a:p>
             <a:r>
-              <a:rPr lang="es-ES" dirty="0" smtClean="0"/>
+              <a:rPr lang="es-ES" smtClean="0"/>
               <a:t>Trabajo Profesional</a:t>
             </a:r>
           </a:p>
           <a:p>
             <a:r>
-              <a:rPr lang="es-ES" dirty="0" smtClean="0"/>
+              <a:rPr lang="es-ES" smtClean="0"/>
               <a:t>Mauro </a:t>
             </a:r>
             <a:r>
-              <a:rPr lang="es-ES" dirty="0" err="1" smtClean="0"/>
+              <a:rPr lang="es-ES" err="1" smtClean="0"/>
               <a:t>Ciancio</a:t>
             </a:r>
             <a:r>
-              <a:rPr lang="es-ES" dirty="0" smtClean="0"/>
+              <a:rPr lang="es-ES" smtClean="0"/>
               <a:t>, Leandro </a:t>
             </a:r>
             <a:r>
-              <a:rPr lang="es-ES" dirty="0" err="1" smtClean="0"/>
+              <a:rPr lang="es-ES" err="1" smtClean="0"/>
               <a:t>Gilioli</a:t>
             </a:r>
-            <a:endParaRPr lang="es-ES" dirty="0" smtClean="0"/>
-          </a:p>
-          <a:p>
-            <a:r>
-              <a:rPr lang="es-ES" dirty="0" smtClean="0"/>
+            <a:endParaRPr lang="es-ES" smtClean="0"/>
+          </a:p>
+          <a:p>
+            <a:r>
+              <a:rPr lang="es-ES" smtClean="0"/>
               <a:t>Facultad de Ingeniería - UBA</a:t>
             </a:r>
-            <a:endParaRPr lang="es-ES" dirty="0"/>
+            <a:endParaRPr lang="es-ES"/>
           </a:p>
         </p:txBody>
       </p:sp>
@@ -5387,7 +5470,7 @@
           <p:nvPr/>
         </p:nvPicPr>
         <p:blipFill>
-          <a:blip r:embed="rId2"/>
+          <a:blip r:embed="rId3"/>
           <a:stretch>
             <a:fillRect/>
           </a:stretch>
@@ -5450,54 +5533,26 @@
           <a:lstStyle/>
           <a:p>
             <a:r>
-              <a:rPr lang="es-ES" dirty="0" smtClean="0"/>
-              <a:t>Explicación de los módulos que la componen</a:t>
-            </a:r>
-          </a:p>
-          <a:p>
-            <a:r>
-              <a:rPr lang="es-ES" dirty="0" smtClean="0"/>
-              <a:t>Mostrar  caso  cliente servidor  peer 2peer </a:t>
-            </a:r>
-          </a:p>
-          <a:p>
-            <a:r>
-              <a:rPr lang="es-ES" dirty="0" smtClean="0"/>
-              <a:t>Diagramas de ambos y pequeña explicación sobre cada uno de los módulos (</a:t>
-            </a:r>
-            <a:r>
-              <a:rPr lang="es-ES" dirty="0" err="1" smtClean="0"/>
-              <a:t>kernel</a:t>
-            </a:r>
-            <a:r>
-              <a:rPr lang="es-ES" dirty="0" smtClean="0"/>
-              <a:t>, </a:t>
-            </a:r>
-            <a:r>
-              <a:rPr lang="es-ES" dirty="0" err="1" smtClean="0"/>
-              <a:t>client</a:t>
-            </a:r>
-            <a:r>
-              <a:rPr lang="es-ES" dirty="0" smtClean="0"/>
-              <a:t>, </a:t>
-            </a:r>
-            <a:r>
-              <a:rPr lang="es-ES" dirty="0" err="1" smtClean="0"/>
-              <a:t>common</a:t>
-            </a:r>
-            <a:r>
-              <a:rPr lang="es-ES" dirty="0" smtClean="0"/>
-              <a:t>, </a:t>
-            </a:r>
-            <a:r>
-              <a:rPr lang="es-ES" dirty="0" err="1" smtClean="0"/>
-              <a:t>etc</a:t>
-            </a:r>
-            <a:r>
-              <a:rPr lang="es-ES" dirty="0" smtClean="0"/>
-              <a:t>)</a:t>
-            </a:r>
-            <a:endParaRPr lang="es-ES" dirty="0"/>
+              <a:rPr lang="es-ES" smtClean="0"/>
+              <a:t>Mostrar  el listado  de las </a:t>
+            </a:r>
+            <a:r>
+              <a:rPr lang="es-ES" err="1" smtClean="0"/>
+              <a:t>tecnologias</a:t>
+            </a:r>
+            <a:r>
+              <a:rPr lang="es-ES" smtClean="0"/>
+              <a:t> y una breve </a:t>
+            </a:r>
+            <a:r>
+              <a:rPr lang="es-ES" err="1" smtClean="0"/>
+              <a:t>explicacion</a:t>
+            </a:r>
+            <a:r>
+              <a:rPr lang="es-ES" smtClean="0"/>
+              <a:t> de porque se usaron</a:t>
+            </a:r>
+            <a:endParaRPr lang="es-ES"/>
           </a:p>
         </p:txBody>
       </p:sp>
@@ -5517,10 +5572,10 @@
           <a:lstStyle/>
           <a:p>
             <a:r>
-              <a:rPr lang="es-ES" dirty="0" smtClean="0"/>
-              <a:t>Arquitectura de la solución</a:t>
-            </a:r>
-            <a:endParaRPr lang="es-ES" dirty="0"/>
+              <a:rPr lang="es-ES" smtClean="0"/>
+              <a:t>Tecnologías utilizadas</a:t>
+            </a:r>
+            <a:endParaRPr lang="es-ES"/>
           </a:p>
         </p:txBody>
       </p:sp>
@@ -5572,16 +5627,54 @@
           <a:lstStyle/>
           <a:p>
             <a:r>
-              <a:rPr lang="es-ES" dirty="0" smtClean="0"/>
-              <a:t>Hablar  algo sobre que la comunicación entre los módulos es asincrónica y se utilizan actores para esto.</a:t>
-            </a:r>
-          </a:p>
-          <a:p>
-            <a:r>
-              <a:rPr lang="es-ES" dirty="0" smtClean="0"/>
-              <a:t>Ventajas de utilizar actores, como simplifica las cosas.</a:t>
-            </a:r>
-            <a:endParaRPr lang="es-ES" dirty="0"/>
+              <a:rPr lang="es-ES" smtClean="0"/>
+              <a:t>Explicación de los módulos que la componen</a:t>
+            </a:r>
+          </a:p>
+          <a:p>
+            <a:r>
+              <a:rPr lang="es-ES" smtClean="0"/>
+              <a:t>Mostrar  caso  cliente servidor  peer 2peer </a:t>
+            </a:r>
+          </a:p>
+          <a:p>
+            <a:r>
+              <a:rPr lang="es-ES" smtClean="0"/>
+              <a:t>Diagramas de ambos y pequeña explicación sobre cada uno de los módulos (</a:t>
+            </a:r>
+            <a:r>
+              <a:rPr lang="es-ES" err="1" smtClean="0"/>
+              <a:t>kernel</a:t>
+            </a:r>
+            <a:r>
+              <a:rPr lang="es-ES" smtClean="0"/>
+              <a:t>, </a:t>
+            </a:r>
+            <a:r>
+              <a:rPr lang="es-ES" err="1" smtClean="0"/>
+              <a:t>client</a:t>
+            </a:r>
+            <a:r>
+              <a:rPr lang="es-ES" smtClean="0"/>
+              <a:t>, </a:t>
+            </a:r>
+            <a:r>
+              <a:rPr lang="es-ES" err="1" smtClean="0"/>
+              <a:t>common</a:t>
+            </a:r>
+            <a:r>
+              <a:rPr lang="es-ES" smtClean="0"/>
+              <a:t>, </a:t>
+            </a:r>
+            <a:r>
+              <a:rPr lang="es-ES" err="1" smtClean="0"/>
+              <a:t>etc</a:t>
+            </a:r>
+            <a:r>
+              <a:rPr lang="es-ES" smtClean="0"/>
+              <a:t>)</a:t>
+            </a:r>
+            <a:endParaRPr lang="es-ES"/>
           </a:p>
         </p:txBody>
       </p:sp>
@@ -5601,10 +5694,10 @@
           <a:lstStyle/>
           <a:p>
             <a:r>
-              <a:rPr lang="es-ES" dirty="0" smtClean="0"/>
-              <a:t>Actores</a:t>
-            </a:r>
-            <a:endParaRPr lang="es-ES" dirty="0"/>
+              <a:rPr lang="es-ES" smtClean="0"/>
+              <a:t>Arquitectura de la solución</a:t>
+            </a:r>
+            <a:endParaRPr lang="es-ES"/>
           </a:p>
         </p:txBody>
       </p:sp>
@@ -5656,42 +5749,16 @@
           <a:lstStyle/>
           <a:p>
             <a:r>
-              <a:rPr lang="es-ES" dirty="0" smtClean="0"/>
-              <a:t>Hablar sobre los tipos de mensajes</a:t>
-            </a:r>
-          </a:p>
-          <a:p>
-            <a:r>
-              <a:rPr lang="es-ES" dirty="0" err="1" smtClean="0"/>
-              <a:t>Serializacion</a:t>
-            </a:r>
-            <a:endParaRPr lang="es-ES" dirty="0" smtClean="0"/>
-          </a:p>
-          <a:p>
-            <a:r>
-              <a:rPr lang="es-ES" dirty="0" smtClean="0"/>
-              <a:t>Ejemplos?</a:t>
-            </a:r>
-          </a:p>
-          <a:p>
-            <a:endParaRPr lang="es-ES" dirty="0" smtClean="0"/>
-          </a:p>
-          <a:p>
-            <a:r>
-              <a:rPr lang="es-ES" dirty="0" smtClean="0"/>
-              <a:t>No se si pondría esta </a:t>
-            </a:r>
-            <a:r>
-              <a:rPr lang="es-ES" dirty="0" err="1" smtClean="0"/>
-              <a:t>diapo</a:t>
-            </a:r>
-            <a:endParaRPr lang="es-ES" dirty="0" smtClean="0"/>
-          </a:p>
-          <a:p>
-            <a:pPr>
-              <a:buNone/>
-            </a:pPr>
-            <a:endParaRPr lang="es-ES" dirty="0" smtClean="0"/>
+              <a:rPr lang="es-ES" smtClean="0"/>
+              <a:t>Hablar  algo sobre que la comunicación entre los módulos es asincrónica y se utilizan actores para esto.</a:t>
+            </a:r>
+          </a:p>
+          <a:p>
+            <a:r>
+              <a:rPr lang="es-ES" smtClean="0"/>
+              <a:t>Ventajas de utilizar actores, como simplifica las cosas.</a:t>
+            </a:r>
+            <a:endParaRPr lang="es-ES"/>
           </a:p>
         </p:txBody>
       </p:sp>
@@ -5711,14 +5778,10 @@
           <a:lstStyle/>
           <a:p>
             <a:r>
-              <a:rPr lang="es-ES" dirty="0" smtClean="0"/>
-              <a:t>Protocolo de </a:t>
-            </a:r>
-            <a:r>
-              <a:rPr lang="es-ES" dirty="0" err="1" smtClean="0"/>
-              <a:t>msgs</a:t>
-            </a:r>
-            <a:endParaRPr lang="es-ES" dirty="0"/>
+              <a:rPr lang="es-ES" smtClean="0"/>
+              <a:t>Actores</a:t>
+            </a:r>
+            <a:endParaRPr lang="es-ES"/>
           </a:p>
         </p:txBody>
       </p:sp>
@@ -5770,64 +5833,42 @@
           <a:lstStyle/>
           <a:p>
             <a:r>
-              <a:rPr lang="es-ES" dirty="0" smtClean="0"/>
-              <a:t>Hablar dos boludeces de </a:t>
-            </a:r>
-            <a:r>
-              <a:rPr lang="es-ES" dirty="0" err="1" smtClean="0"/>
-              <a:t>scrum</a:t>
-            </a:r>
-            <a:r>
-              <a:rPr lang="es-ES" dirty="0" smtClean="0"/>
-              <a:t>.</a:t>
-            </a:r>
-          </a:p>
-          <a:p>
-            <a:r>
-              <a:rPr lang="es-ES" dirty="0" smtClean="0"/>
-              <a:t>Tabla de </a:t>
-            </a:r>
-            <a:r>
-              <a:rPr lang="es-ES" dirty="0" err="1" smtClean="0"/>
-              <a:t>Sprints</a:t>
-            </a:r>
-            <a:r>
-              <a:rPr lang="es-ES" dirty="0" smtClean="0"/>
-              <a:t> que se hicieron con descripción de objetivos.</a:t>
-            </a:r>
-          </a:p>
-          <a:p>
-            <a:r>
-              <a:rPr lang="es-ES" dirty="0" smtClean="0"/>
-              <a:t>Mostrar dos grafiquitos  de los </a:t>
-            </a:r>
-            <a:r>
-              <a:rPr lang="es-ES" dirty="0" err="1" smtClean="0"/>
-              <a:t>sprints</a:t>
-            </a:r>
-            <a:r>
-              <a:rPr lang="es-ES" dirty="0" smtClean="0"/>
-              <a:t>.</a:t>
-            </a:r>
-          </a:p>
-          <a:p>
-            <a:r>
-              <a:rPr lang="es-ES" dirty="0" smtClean="0"/>
-              <a:t>Decir como resulto.</a:t>
-            </a:r>
-          </a:p>
-          <a:p>
-            <a:endParaRPr lang="es-ES" dirty="0" smtClean="0"/>
-          </a:p>
-          <a:p>
-            <a:endParaRPr lang="es-ES" dirty="0" smtClean="0"/>
-          </a:p>
-          <a:p>
-            <a:r>
-              <a:rPr lang="es-ES" dirty="0" smtClean="0"/>
-              <a:t>Aporta esto?</a:t>
-            </a:r>
-            <a:endParaRPr lang="es-ES" dirty="0"/>
+              <a:rPr lang="es-ES" smtClean="0"/>
+              <a:t>Hablar sobre los tipos de mensajes</a:t>
+            </a:r>
+          </a:p>
+          <a:p>
+            <a:r>
+              <a:rPr lang="es-ES" err="1" smtClean="0"/>
+              <a:t>Serializacion</a:t>
+            </a:r>
+            <a:endParaRPr lang="es-ES" smtClean="0"/>
+          </a:p>
+          <a:p>
+            <a:r>
+              <a:rPr lang="es-ES" smtClean="0"/>
+              <a:t>Ejemplos?</a:t>
+            </a:r>
+          </a:p>
+          <a:p>
+            <a:endParaRPr lang="es-ES" smtClean="0"/>
+          </a:p>
+          <a:p>
+            <a:r>
+              <a:rPr lang="es-ES" smtClean="0"/>
+              <a:t>No se si pondría esta </a:t>
+            </a:r>
+            <a:r>
+              <a:rPr lang="es-ES" err="1" smtClean="0"/>
+              <a:t>diapo</a:t>
+            </a:r>
+            <a:endParaRPr lang="es-ES" smtClean="0"/>
+          </a:p>
+          <a:p>
+            <a:pPr>
+              <a:buNone/>
+            </a:pPr>
+            <a:endParaRPr lang="es-ES" smtClean="0"/>
           </a:p>
         </p:txBody>
       </p:sp>
@@ -5847,10 +5888,14 @@
           <a:lstStyle/>
           <a:p>
             <a:r>
-              <a:rPr lang="es-ES" dirty="0" smtClean="0"/>
-              <a:t>Metodología de desarrollo</a:t>
-            </a:r>
-            <a:endParaRPr lang="es-ES" dirty="0"/>
+              <a:rPr lang="es-ES" smtClean="0"/>
+              <a:t>Protocolo de </a:t>
+            </a:r>
+            <a:r>
+              <a:rPr lang="es-ES" err="1" smtClean="0"/>
+              <a:t>msgs</a:t>
+            </a:r>
+            <a:endParaRPr lang="es-ES"/>
           </a:p>
         </p:txBody>
       </p:sp>
@@ -5902,27 +5947,64 @@
           <a:lstStyle/>
           <a:p>
             <a:r>
-              <a:rPr lang="es-ES" dirty="0" smtClean="0"/>
-              <a:t>Poner  acá </a:t>
-            </a:r>
-            <a:r>
-              <a:rPr lang="es-ES" dirty="0" err="1" smtClean="0"/>
-              <a:t>screenshot</a:t>
-            </a:r>
-            <a:r>
-              <a:rPr lang="es-ES" dirty="0" smtClean="0"/>
-              <a:t> del eclipse con PE</a:t>
-            </a:r>
-          </a:p>
-          <a:p>
-            <a:endParaRPr lang="es-ES" dirty="0" smtClean="0"/>
-          </a:p>
-          <a:p>
-            <a:r>
-              <a:rPr lang="es-ES" dirty="0" smtClean="0"/>
-              <a:t>Demo en vivo!</a:t>
-            </a:r>
-            <a:endParaRPr lang="es-ES" dirty="0"/>
+              <a:rPr lang="es-ES" smtClean="0"/>
+              <a:t>Hablar dos boludeces de </a:t>
+            </a:r>
+            <a:r>
+              <a:rPr lang="es-ES" err="1" smtClean="0"/>
+              <a:t>scrum</a:t>
+            </a:r>
+            <a:r>
+              <a:rPr lang="es-ES" smtClean="0"/>
+              <a:t>.</a:t>
+            </a:r>
+          </a:p>
+          <a:p>
+            <a:r>
+              <a:rPr lang="es-ES" smtClean="0"/>
+              <a:t>Tabla de </a:t>
+            </a:r>
+            <a:r>
+              <a:rPr lang="es-ES" err="1" smtClean="0"/>
+              <a:t>Sprints</a:t>
+            </a:r>
+            <a:r>
+              <a:rPr lang="es-ES" smtClean="0"/>
+              <a:t> que se hicieron con descripción de objetivos.</a:t>
+            </a:r>
+          </a:p>
+          <a:p>
+            <a:r>
+              <a:rPr lang="es-ES" smtClean="0"/>
+              <a:t>Mostrar dos grafiquitos  de los </a:t>
+            </a:r>
+            <a:r>
+              <a:rPr lang="es-ES" err="1" smtClean="0"/>
+              <a:t>sprints</a:t>
+            </a:r>
+            <a:r>
+              <a:rPr lang="es-ES" smtClean="0"/>
+              <a:t>.</a:t>
+            </a:r>
+          </a:p>
+          <a:p>
+            <a:r>
+              <a:rPr lang="es-ES" smtClean="0"/>
+              <a:t>Decir como resulto.</a:t>
+            </a:r>
+          </a:p>
+          <a:p>
+            <a:endParaRPr lang="es-ES" smtClean="0"/>
+          </a:p>
+          <a:p>
+            <a:endParaRPr lang="es-ES" smtClean="0"/>
+          </a:p>
+          <a:p>
+            <a:r>
+              <a:rPr lang="es-ES" smtClean="0"/>
+              <a:t>Aporta esto?</a:t>
+            </a:r>
+            <a:endParaRPr lang="es-ES"/>
           </a:p>
         </p:txBody>
       </p:sp>
@@ -5942,10 +6024,10 @@
           <a:lstStyle/>
           <a:p>
             <a:r>
-              <a:rPr lang="es-ES" dirty="0" smtClean="0"/>
-              <a:t>Demostración</a:t>
-            </a:r>
-            <a:endParaRPr lang="es-ES" dirty="0"/>
+              <a:rPr lang="es-ES" smtClean="0"/>
+              <a:t>Metodología de desarrollo</a:t>
+            </a:r>
+            <a:endParaRPr lang="es-ES"/>
           </a:p>
         </p:txBody>
       </p:sp>
@@ -5997,55 +6079,27 @@
           <a:lstStyle/>
           <a:p>
             <a:r>
-              <a:rPr lang="es-ES" dirty="0" smtClean="0"/>
-              <a:t>Esquema de autenticación y autorización.</a:t>
-            </a:r>
-          </a:p>
-          <a:p>
-            <a:r>
-              <a:rPr lang="es-ES" dirty="0" smtClean="0"/>
-              <a:t>Optimización del uso de red.</a:t>
-            </a:r>
-          </a:p>
-          <a:p>
-            <a:r>
-              <a:rPr lang="es-ES" dirty="0" smtClean="0"/>
-              <a:t>Integración con otros </a:t>
-            </a:r>
-            <a:r>
-              <a:rPr lang="es-ES" dirty="0" err="1" smtClean="0"/>
-              <a:t>IDEs</a:t>
-            </a:r>
-            <a:r>
-              <a:rPr lang="es-ES" dirty="0" smtClean="0"/>
-              <a:t> .</a:t>
-            </a:r>
-          </a:p>
-          <a:p>
-            <a:r>
-              <a:rPr lang="es-ES" dirty="0" smtClean="0"/>
-              <a:t>Extensión de la solución a otros modelos.</a:t>
-            </a:r>
-          </a:p>
-          <a:p>
-            <a:r>
-              <a:rPr lang="es-ES" dirty="0" smtClean="0"/>
-              <a:t>Cifrado de mensajes.</a:t>
-            </a:r>
-          </a:p>
-          <a:p>
-            <a:r>
-              <a:rPr lang="es-ES" dirty="0" smtClean="0"/>
-              <a:t>Mecanismo de deshacer  cambios (</a:t>
-            </a:r>
-            <a:r>
-              <a:rPr lang="es-ES" dirty="0" err="1" smtClean="0"/>
-              <a:t>undo</a:t>
-            </a:r>
-            <a:r>
-              <a:rPr lang="es-ES" dirty="0" smtClean="0"/>
-              <a:t>).</a:t>
-            </a:r>
+              <a:rPr lang="es-ES" smtClean="0"/>
+              <a:t>Poner  acá </a:t>
+            </a:r>
+            <a:r>
+              <a:rPr lang="es-ES" err="1" smtClean="0"/>
+              <a:t>screenshot</a:t>
+            </a:r>
+            <a:r>
+              <a:rPr lang="es-ES" smtClean="0"/>
+              <a:t> del eclipse con PE</a:t>
+            </a:r>
+          </a:p>
+          <a:p>
+            <a:endParaRPr lang="es-ES" smtClean="0"/>
+          </a:p>
+          <a:p>
+            <a:r>
+              <a:rPr lang="es-ES" smtClean="0"/>
+              <a:t>Demo en vivo!</a:t>
+            </a:r>
+            <a:endParaRPr lang="es-ES"/>
           </a:p>
         </p:txBody>
       </p:sp>
@@ -6061,16 +6115,14 @@
         </p:nvSpPr>
         <p:spPr/>
         <p:txBody>
-          <a:bodyPr>
-            <a:normAutofit fontScale="90000"/>
-          </a:bodyPr>
+          <a:bodyPr/>
           <a:lstStyle/>
           <a:p>
             <a:r>
-              <a:rPr lang="es-ES" dirty="0" smtClean="0"/>
-              <a:t>Posibles mejoras a implementar</a:t>
-            </a:r>
-            <a:endParaRPr lang="es-ES" dirty="0"/>
+              <a:rPr lang="es-ES" smtClean="0"/>
+              <a:t>Demostración</a:t>
+            </a:r>
+            <a:endParaRPr lang="es-ES"/>
           </a:p>
         </p:txBody>
       </p:sp>
@@ -6118,47 +6170,168 @@
         </p:nvSpPr>
         <p:spPr/>
         <p:txBody>
+          <a:bodyPr/>
+          <a:lstStyle/>
+          <a:p>
+            <a:r>
+              <a:rPr lang="es-ES" smtClean="0"/>
+              <a:t>Esquema de autenticación y autorización.</a:t>
+            </a:r>
+          </a:p>
+          <a:p>
+            <a:r>
+              <a:rPr lang="es-ES" smtClean="0"/>
+              <a:t>Optimización del uso de red.</a:t>
+            </a:r>
+          </a:p>
+          <a:p>
+            <a:r>
+              <a:rPr lang="es-ES" smtClean="0"/>
+              <a:t>Integración con otros </a:t>
+            </a:r>
+            <a:r>
+              <a:rPr lang="es-ES" err="1" smtClean="0"/>
+              <a:t>IDEs</a:t>
+            </a:r>
+            <a:r>
+              <a:rPr lang="es-ES" smtClean="0"/>
+              <a:t> .</a:t>
+            </a:r>
+          </a:p>
+          <a:p>
+            <a:r>
+              <a:rPr lang="es-ES" smtClean="0"/>
+              <a:t>Extensión de la solución a otros modelos.</a:t>
+            </a:r>
+          </a:p>
+          <a:p>
+            <a:r>
+              <a:rPr lang="es-ES" smtClean="0"/>
+              <a:t>Cifrado de mensajes.</a:t>
+            </a:r>
+          </a:p>
+          <a:p>
+            <a:r>
+              <a:rPr lang="es-ES" smtClean="0"/>
+              <a:t>Mecanismo de deshacer  cambios (</a:t>
+            </a:r>
+            <a:r>
+              <a:rPr lang="es-ES" err="1" smtClean="0"/>
+              <a:t>undo</a:t>
+            </a:r>
+            <a:r>
+              <a:rPr lang="es-ES" smtClean="0"/>
+              <a:t>).</a:t>
+            </a:r>
+          </a:p>
+        </p:txBody>
+      </p:sp>
+      <p:sp>
+        <p:nvSpPr>
+          <p:cNvPr id="2" name="1 Título"/>
+          <p:cNvSpPr>
+            <a:spLocks noGrp="1"/>
+          </p:cNvSpPr>
+          <p:nvPr>
+            <p:ph type="title"/>
+          </p:nvPr>
+        </p:nvSpPr>
+        <p:spPr/>
+        <p:txBody>
+          <a:bodyPr>
+            <a:normAutofit fontScale="90000"/>
+          </a:bodyPr>
+          <a:lstStyle/>
+          <a:p>
+            <a:r>
+              <a:rPr lang="es-ES" smtClean="0"/>
+              <a:t>Posibles mejoras a implementar</a:t>
+            </a:r>
+            <a:endParaRPr lang="es-ES"/>
+          </a:p>
+        </p:txBody>
+      </p:sp>
+    </p:spTree>
+  </p:cSld>
+  <p:clrMapOvr>
+    <a:masterClrMapping/>
+  </p:clrMapOvr>
+  <p:timing>
+    <p:tnLst>
+      <p:par>
+        <p:cTn id="1" dur="indefinite" restart="never" nodeType="tmRoot"/>
+      </p:par>
+    </p:tnLst>
+  </p:timing>
+</p:sld>
+</file>
+
+<file path=ppt/slides/slide17.xml><?xml version="1.0" encoding="utf-8"?>
+<p:sld xmlns:a="http://schemas.openxmlformats.org/drawingml/2006/main" xmlns:r="http://schemas.openxmlformats.org/officeDocument/2006/relationships" xmlns:p="http://schemas.openxmlformats.org/presentationml/2006/main">
+  <p:cSld>
+    <p:spTree>
+      <p:nvGrpSpPr>
+        <p:cNvPr id="1" name=""/>
+        <p:cNvGrpSpPr/>
+        <p:nvPr/>
+      </p:nvGrpSpPr>
+      <p:grpSpPr>
+        <a:xfrm>
+          <a:off x="0" y="0"/>
+          <a:ext cx="0" cy="0"/>
+          <a:chOff x="0" y="0"/>
+          <a:chExt cx="0" cy="0"/>
+        </a:xfrm>
+      </p:grpSpPr>
+      <p:sp>
+        <p:nvSpPr>
+          <p:cNvPr id="3" name="2 Marcador de contenido"/>
+          <p:cNvSpPr>
+            <a:spLocks noGrp="1"/>
+          </p:cNvSpPr>
+          <p:nvPr>
+            <p:ph idx="1"/>
+          </p:nvPr>
+        </p:nvSpPr>
+        <p:spPr/>
+        <p:txBody>
           <a:bodyPr>
             <a:normAutofit fontScale="77500" lnSpcReduction="20000"/>
           </a:bodyPr>
           <a:lstStyle/>
           <a:p>
             <a:r>
-              <a:rPr lang="es-ES" dirty="0" smtClean="0"/>
+              <a:rPr lang="es-ES" smtClean="0"/>
               <a:t>Aplicaciones de naturaleza concurrente y distribuida precisan modelos que abstraigan al programador de la complejidad subyacente.</a:t>
             </a:r>
           </a:p>
           <a:p>
             <a:r>
-              <a:rPr lang="es-ES" dirty="0" smtClean="0"/>
+              <a:rPr lang="es-ES" smtClean="0"/>
               <a:t>Lenguajes nuevos sobre la JVM incorporan construcciones y paradigmas que simplifican el desarrollo.</a:t>
             </a:r>
           </a:p>
           <a:p>
             <a:r>
-              <a:rPr lang="es-ES" dirty="0" smtClean="0"/>
+              <a:rPr lang="es-ES" smtClean="0"/>
               <a:t>Los modelos para la implementación de sistemas  colaborativos en tiempo real están en constante desarrollo y evolución.</a:t>
             </a:r>
           </a:p>
           <a:p>
             <a:r>
-              <a:rPr lang="es-ES" dirty="0" smtClean="0"/>
+              <a:rPr lang="es-ES" smtClean="0"/>
               <a:t>La colaboración en tiempo real permite  interactuar  a un grupo de trabajo  de forma simple y coordinada  acelerando, enriqueciendo y haciendo mas productivo su trabajo.</a:t>
             </a:r>
           </a:p>
           <a:p>
-            <a:endParaRPr lang="es-ES" dirty="0" smtClean="0"/>
-          </a:p>
-          <a:p>
-            <a:r>
-              <a:rPr lang="es-ES" dirty="0" smtClean="0"/>
-              <a:t>Mucho texto </a:t>
-            </a:r>
+            <a:endParaRPr lang="es-ES" smtClean="0"/>
+          </a:p>
+          <a:p>
             <a:r>
               <a:rPr lang="es-ES" smtClean="0"/>
-              <a:t>me parece</a:t>
-            </a:r>
-            <a:endParaRPr lang="es-ES" dirty="0"/>
+              <a:t>Mucho texto me parece</a:t>
+            </a:r>
+            <a:endParaRPr lang="es-ES"/>
           </a:p>
         </p:txBody>
       </p:sp>
@@ -6178,10 +6351,10 @@
           <a:lstStyle/>
           <a:p>
             <a:r>
-              <a:rPr lang="es-ES" dirty="0" smtClean="0"/>
+              <a:rPr lang="es-ES" smtClean="0"/>
               <a:t>Conclusiones</a:t>
             </a:r>
-            <a:endParaRPr lang="es-ES" dirty="0"/>
+            <a:endParaRPr lang="es-ES"/>
           </a:p>
         </p:txBody>
       </p:sp>
@@ -6241,7 +6414,7 @@
           <a:p>
             <a:r>
               <a:rPr lang="en-US" dirty="0" err="1" smtClean="0"/>
-              <a:t>Introduccion</a:t>
+              <a:t>Introducción</a:t>
             </a:r>
             <a:endParaRPr lang="en-US" dirty="0" smtClean="0"/>
           </a:p>
@@ -6409,10 +6582,10 @@
           <a:lstStyle/>
           <a:p>
             <a:r>
-              <a:rPr lang="en-US" dirty="0" smtClean="0"/>
+              <a:rPr lang="en-US" smtClean="0"/>
               <a:t>Agenda</a:t>
             </a:r>
-            <a:endParaRPr lang="es-AR" dirty="0"/>
+            <a:endParaRPr lang="es-AR"/>
           </a:p>
         </p:txBody>
       </p:sp>
@@ -6497,39 +6670,39 @@
           <a:lstStyle/>
           <a:p>
             <a:r>
-              <a:rPr lang="es-ES" dirty="0" smtClean="0"/>
+              <a:rPr lang="es-ES" smtClean="0"/>
               <a:t>Cómo nace la idea del presente trabajo?</a:t>
             </a:r>
           </a:p>
           <a:p>
-            <a:endParaRPr lang="es-ES" dirty="0" smtClean="0"/>
-          </a:p>
-          <a:p>
-            <a:r>
-              <a:rPr lang="es-ES" dirty="0" smtClean="0"/>
+            <a:endParaRPr lang="es-ES" smtClean="0"/>
+          </a:p>
+          <a:p>
+            <a:r>
+              <a:rPr lang="es-ES" smtClean="0"/>
               <a:t>Necesidad de obtener </a:t>
             </a:r>
             <a:r>
-              <a:rPr lang="es-ES" dirty="0" err="1" smtClean="0"/>
+              <a:rPr lang="es-ES" err="1" smtClean="0"/>
               <a:t>feedback</a:t>
             </a:r>
             <a:r>
-              <a:rPr lang="es-ES" dirty="0" smtClean="0"/>
+              <a:rPr lang="es-ES" smtClean="0"/>
               <a:t> instantáneo sobre tareas de desarrollo complejas.</a:t>
             </a:r>
           </a:p>
           <a:p>
             <a:r>
-              <a:rPr lang="es-ES" dirty="0" smtClean="0"/>
+              <a:rPr lang="es-ES" smtClean="0"/>
               <a:t>Dos desarrolladores trabajando sobre lo mismo pero en diferentes lugares físicos.</a:t>
             </a:r>
           </a:p>
           <a:p>
             <a:r>
-              <a:rPr lang="es-ES" dirty="0" smtClean="0"/>
+              <a:rPr lang="es-ES" smtClean="0"/>
               <a:t>Herramientas existentes no satisfactorias.</a:t>
             </a:r>
-            <a:endParaRPr lang="es-ES" dirty="0"/>
+            <a:endParaRPr lang="es-ES"/>
           </a:p>
         </p:txBody>
       </p:sp>
@@ -6549,10 +6722,10 @@
           <a:lstStyle/>
           <a:p>
             <a:r>
-              <a:rPr lang="es-ES" dirty="0" smtClean="0"/>
+              <a:rPr lang="es-ES" smtClean="0"/>
               <a:t>Motivación</a:t>
             </a:r>
-            <a:endParaRPr lang="es-ES" dirty="0"/>
+            <a:endParaRPr lang="es-ES"/>
           </a:p>
         </p:txBody>
       </p:sp>
@@ -6628,10 +6801,10 @@
           <a:lstStyle/>
           <a:p>
             <a:r>
-              <a:rPr lang="es-ES" dirty="0" smtClean="0"/>
+              <a:rPr lang="es-ES" smtClean="0"/>
               <a:t>Escenario</a:t>
             </a:r>
-            <a:endParaRPr lang="es-ES" dirty="0"/>
+            <a:endParaRPr lang="es-ES"/>
           </a:p>
         </p:txBody>
       </p:sp>
@@ -6737,14 +6910,14 @@
           <a:p>
             <a:pPr algn="ctr"/>
             <a:r>
-              <a:rPr lang="en-US" dirty="0" smtClean="0">
+              <a:rPr lang="en-US" smtClean="0">
                 <a:solidFill>
                   <a:schemeClr val="tx1"/>
                 </a:solidFill>
               </a:rPr>
               <a:t>Internet</a:t>
             </a:r>
-            <a:endParaRPr lang="es-AR" dirty="0">
+            <a:endParaRPr lang="es-AR">
               <a:solidFill>
                 <a:schemeClr val="tx1"/>
               </a:solidFill>
@@ -6951,48 +7124,48 @@
             <a:lstStyle/>
             <a:p>
               <a:r>
-                <a:rPr lang="en-US" sz="1400" dirty="0" smtClean="0">
+                <a:rPr lang="en-US" sz="1400" smtClean="0">
                   <a:latin typeface="Courier New" pitchFamily="49" charset="0"/>
                   <a:cs typeface="Courier New" pitchFamily="49" charset="0"/>
                 </a:rPr>
                 <a:t>class </a:t>
               </a:r>
               <a:r>
-                <a:rPr lang="en-US" sz="1400" dirty="0" err="1" smtClean="0">
+                <a:rPr lang="en-US" sz="1400" err="1" smtClean="0">
                   <a:latin typeface="Courier New" pitchFamily="49" charset="0"/>
                   <a:cs typeface="Courier New" pitchFamily="49" charset="0"/>
                 </a:rPr>
                 <a:t>MyClass</a:t>
               </a:r>
               <a:r>
-                <a:rPr lang="en-US" sz="1400" dirty="0" smtClean="0">
+                <a:rPr lang="en-US" sz="1400" smtClean="0">
                   <a:latin typeface="Courier New" pitchFamily="49" charset="0"/>
                   <a:cs typeface="Courier New" pitchFamily="49" charset="0"/>
                 </a:rPr>
                 <a:t> {</a:t>
               </a:r>
               <a:br>
-                <a:rPr lang="en-US" sz="1400" dirty="0" smtClean="0">
+                <a:rPr lang="en-US" sz="1400" smtClean="0">
                   <a:latin typeface="Courier New" pitchFamily="49" charset="0"/>
                   <a:cs typeface="Courier New" pitchFamily="49" charset="0"/>
                 </a:rPr>
               </a:br>
               <a:r>
-                <a:rPr lang="en-US" sz="1400" dirty="0" smtClean="0">
+                <a:rPr lang="en-US" sz="1400" smtClean="0">
                   <a:latin typeface="Courier New" pitchFamily="49" charset="0"/>
                   <a:cs typeface="Courier New" pitchFamily="49" charset="0"/>
                 </a:rPr>
                 <a:t>  </a:t>
               </a:r>
               <a:r>
-                <a:rPr lang="en-US" sz="1400" dirty="0" err="1" smtClean="0">
+                <a:rPr lang="en-US" sz="1400" err="1" smtClean="0">
                   <a:latin typeface="Courier New" pitchFamily="49" charset="0"/>
                   <a:cs typeface="Courier New" pitchFamily="49" charset="0"/>
                 </a:rPr>
                 <a:t>int</a:t>
               </a:r>
               <a:r>
-                <a:rPr lang="en-US" sz="1400" dirty="0" smtClean="0">
+                <a:rPr lang="en-US" sz="1400" smtClean="0">
                   <a:latin typeface="Courier New" pitchFamily="49" charset="0"/>
                   <a:cs typeface="Courier New" pitchFamily="49" charset="0"/>
                 </a:rPr>
@@ -7001,54 +7174,54 @@
             </a:p>
             <a:p>
               <a:r>
-                <a:rPr lang="en-US" sz="1400" dirty="0" smtClean="0">
+                <a:rPr lang="en-US" sz="1400" smtClean="0">
                   <a:latin typeface="Courier New" pitchFamily="49" charset="0"/>
                   <a:cs typeface="Courier New" pitchFamily="49" charset="0"/>
                 </a:rPr>
                 <a:t>  // </a:t>
               </a:r>
               <a:r>
-                <a:rPr lang="en-US" sz="1400" dirty="0" err="1" smtClean="0">
+                <a:rPr lang="en-US" sz="1400" err="1" smtClean="0">
                   <a:latin typeface="Courier New" pitchFamily="49" charset="0"/>
                   <a:cs typeface="Courier New" pitchFamily="49" charset="0"/>
                 </a:rPr>
                 <a:t>es</a:t>
               </a:r>
               <a:r>
-                <a:rPr lang="en-US" sz="1400" dirty="0" smtClean="0">
+                <a:rPr lang="en-US" sz="1400" smtClean="0">
                   <a:latin typeface="Courier New" pitchFamily="49" charset="0"/>
                   <a:cs typeface="Courier New" pitchFamily="49" charset="0"/>
                 </a:rPr>
                 <a:t> </a:t>
               </a:r>
               <a:r>
-                <a:rPr lang="en-US" sz="1400" dirty="0" err="1" smtClean="0">
+                <a:rPr lang="en-US" sz="1400" err="1" smtClean="0">
                   <a:latin typeface="Courier New" pitchFamily="49" charset="0"/>
                   <a:cs typeface="Courier New" pitchFamily="49" charset="0"/>
                 </a:rPr>
                 <a:t>difícil</a:t>
               </a:r>
               <a:r>
-                <a:rPr lang="en-US" sz="1400" dirty="0" smtClean="0">
+                <a:rPr lang="en-US" sz="1400" smtClean="0">
                   <a:latin typeface="Courier New" pitchFamily="49" charset="0"/>
                   <a:cs typeface="Courier New" pitchFamily="49" charset="0"/>
                 </a:rPr>
                 <a:t>!</a:t>
               </a:r>
               <a:br>
-                <a:rPr lang="en-US" sz="1400" dirty="0" smtClean="0">
+                <a:rPr lang="en-US" sz="1400" smtClean="0">
                   <a:latin typeface="Courier New" pitchFamily="49" charset="0"/>
                   <a:cs typeface="Courier New" pitchFamily="49" charset="0"/>
                 </a:rPr>
               </a:br>
               <a:r>
-                <a:rPr lang="en-US" sz="1400" dirty="0" smtClean="0">
+                <a:rPr lang="en-US" sz="1400" smtClean="0">
                   <a:latin typeface="Courier New" pitchFamily="49" charset="0"/>
                   <a:cs typeface="Courier New" pitchFamily="49" charset="0"/>
                 </a:rPr>
                 <a:t>}</a:t>
               </a:r>
-              <a:endParaRPr lang="es-AR" sz="1400" dirty="0">
+              <a:endParaRPr lang="es-AR" sz="1400">
                 <a:latin typeface="Courier New" pitchFamily="49" charset="0"/>
                 <a:cs typeface="Courier New" pitchFamily="49" charset="0"/>
               </a:endParaRPr>
@@ -7079,14 +7252,14 @@
           <a:lstStyle/>
           <a:p>
             <a:r>
-              <a:rPr lang="en-US" b="1" dirty="0" err="1" smtClean="0"/>
+              <a:rPr lang="en-US" b="1" err="1" smtClean="0"/>
               <a:t>ubicación</a:t>
             </a:r>
             <a:r>
-              <a:rPr lang="en-US" b="1" dirty="0" smtClean="0"/>
+              <a:rPr lang="en-US" b="1" smtClean="0"/>
               <a:t> 1</a:t>
             </a:r>
-            <a:endParaRPr lang="es-AR" b="1" dirty="0"/>
+            <a:endParaRPr lang="es-AR" b="1"/>
           </a:p>
         </p:txBody>
       </p:sp>
@@ -7113,14 +7286,14 @@
           <a:lstStyle/>
           <a:p>
             <a:r>
-              <a:rPr lang="en-US" b="1" dirty="0" err="1" smtClean="0"/>
+              <a:rPr lang="en-US" b="1" err="1" smtClean="0"/>
               <a:t>ubicación</a:t>
             </a:r>
             <a:r>
-              <a:rPr lang="en-US" b="1" dirty="0" smtClean="0"/>
+              <a:rPr lang="en-US" b="1" smtClean="0"/>
               <a:t> 2</a:t>
             </a:r>
-            <a:endParaRPr lang="es-AR" b="1" dirty="0"/>
+            <a:endParaRPr lang="es-AR" b="1"/>
           </a:p>
         </p:txBody>
       </p:sp>
@@ -7185,48 +7358,48 @@
             <a:lstStyle/>
             <a:p>
               <a:r>
-                <a:rPr lang="en-US" sz="1400" dirty="0" smtClean="0">
+                <a:rPr lang="en-US" sz="1400" smtClean="0">
                   <a:latin typeface="Courier New" pitchFamily="49" charset="0"/>
                   <a:cs typeface="Courier New" pitchFamily="49" charset="0"/>
                 </a:rPr>
                 <a:t>class </a:t>
               </a:r>
               <a:r>
-                <a:rPr lang="en-US" sz="1400" dirty="0" err="1" smtClean="0">
+                <a:rPr lang="en-US" sz="1400" err="1" smtClean="0">
                   <a:latin typeface="Courier New" pitchFamily="49" charset="0"/>
                   <a:cs typeface="Courier New" pitchFamily="49" charset="0"/>
                 </a:rPr>
                 <a:t>MyClass</a:t>
               </a:r>
               <a:r>
-                <a:rPr lang="en-US" sz="1400" dirty="0" smtClean="0">
+                <a:rPr lang="en-US" sz="1400" smtClean="0">
                   <a:latin typeface="Courier New" pitchFamily="49" charset="0"/>
                   <a:cs typeface="Courier New" pitchFamily="49" charset="0"/>
                 </a:rPr>
                 <a:t> {</a:t>
               </a:r>
               <a:br>
-                <a:rPr lang="en-US" sz="1400" dirty="0" smtClean="0">
+                <a:rPr lang="en-US" sz="1400" smtClean="0">
                   <a:latin typeface="Courier New" pitchFamily="49" charset="0"/>
                   <a:cs typeface="Courier New" pitchFamily="49" charset="0"/>
                 </a:rPr>
               </a:br>
               <a:r>
-                <a:rPr lang="en-US" sz="1400" dirty="0" smtClean="0">
+                <a:rPr lang="en-US" sz="1400" smtClean="0">
                   <a:latin typeface="Courier New" pitchFamily="49" charset="0"/>
                   <a:cs typeface="Courier New" pitchFamily="49" charset="0"/>
                 </a:rPr>
                 <a:t>  </a:t>
               </a:r>
               <a:r>
-                <a:rPr lang="en-US" sz="1400" dirty="0" err="1" smtClean="0">
+                <a:rPr lang="en-US" sz="1400" err="1" smtClean="0">
                   <a:latin typeface="Courier New" pitchFamily="49" charset="0"/>
                   <a:cs typeface="Courier New" pitchFamily="49" charset="0"/>
                 </a:rPr>
                 <a:t>int</a:t>
               </a:r>
               <a:r>
-                <a:rPr lang="en-US" sz="1400" dirty="0" smtClean="0">
+                <a:rPr lang="en-US" sz="1400" smtClean="0">
                   <a:latin typeface="Courier New" pitchFamily="49" charset="0"/>
                   <a:cs typeface="Courier New" pitchFamily="49" charset="0"/>
                 </a:rPr>
@@ -7235,54 +7408,54 @@
             </a:p>
             <a:p>
               <a:r>
-                <a:rPr lang="en-US" sz="1400" dirty="0" smtClean="0">
+                <a:rPr lang="en-US" sz="1400" smtClean="0">
                   <a:latin typeface="Courier New" pitchFamily="49" charset="0"/>
                   <a:cs typeface="Courier New" pitchFamily="49" charset="0"/>
                 </a:rPr>
                 <a:t>  // </a:t>
               </a:r>
               <a:r>
-                <a:rPr lang="en-US" sz="1400" dirty="0" err="1" smtClean="0">
+                <a:rPr lang="en-US" sz="1400" err="1" smtClean="0">
                   <a:latin typeface="Courier New" pitchFamily="49" charset="0"/>
                   <a:cs typeface="Courier New" pitchFamily="49" charset="0"/>
                 </a:rPr>
                 <a:t>es</a:t>
               </a:r>
               <a:r>
-                <a:rPr lang="en-US" sz="1400" dirty="0" smtClean="0">
+                <a:rPr lang="en-US" sz="1400" smtClean="0">
                   <a:latin typeface="Courier New" pitchFamily="49" charset="0"/>
                   <a:cs typeface="Courier New" pitchFamily="49" charset="0"/>
                 </a:rPr>
                 <a:t> </a:t>
               </a:r>
               <a:r>
-                <a:rPr lang="en-US" sz="1400" dirty="0" err="1" smtClean="0">
+                <a:rPr lang="en-US" sz="1400" err="1" smtClean="0">
                   <a:latin typeface="Courier New" pitchFamily="49" charset="0"/>
                   <a:cs typeface="Courier New" pitchFamily="49" charset="0"/>
                 </a:rPr>
                 <a:t>difícil</a:t>
               </a:r>
               <a:r>
-                <a:rPr lang="en-US" sz="1400" dirty="0" smtClean="0">
+                <a:rPr lang="en-US" sz="1400" smtClean="0">
                   <a:latin typeface="Courier New" pitchFamily="49" charset="0"/>
                   <a:cs typeface="Courier New" pitchFamily="49" charset="0"/>
                 </a:rPr>
                 <a:t>!</a:t>
               </a:r>
               <a:br>
-                <a:rPr lang="en-US" sz="1400" dirty="0" smtClean="0">
+                <a:rPr lang="en-US" sz="1400" smtClean="0">
                   <a:latin typeface="Courier New" pitchFamily="49" charset="0"/>
                   <a:cs typeface="Courier New" pitchFamily="49" charset="0"/>
                 </a:rPr>
               </a:br>
               <a:r>
-                <a:rPr lang="en-US" sz="1400" dirty="0" smtClean="0">
+                <a:rPr lang="en-US" sz="1400" smtClean="0">
                   <a:latin typeface="Courier New" pitchFamily="49" charset="0"/>
                   <a:cs typeface="Courier New" pitchFamily="49" charset="0"/>
                 </a:rPr>
                 <a:t>}</a:t>
               </a:r>
-              <a:endParaRPr lang="es-AR" sz="1400" dirty="0">
+              <a:endParaRPr lang="es-AR" sz="1400">
                 <a:latin typeface="Courier New" pitchFamily="49" charset="0"/>
                 <a:cs typeface="Courier New" pitchFamily="49" charset="0"/>
               </a:endParaRPr>
@@ -7338,36 +7511,36 @@
           <a:lstStyle/>
           <a:p>
             <a:r>
-              <a:rPr lang="es-ES" dirty="0" smtClean="0"/>
+              <a:rPr lang="es-ES" smtClean="0"/>
               <a:t>Mantener sincronizado el mismo documento en todas las ubicaciones.</a:t>
             </a:r>
           </a:p>
           <a:p>
             <a:r>
-              <a:rPr lang="es-ES" dirty="0" smtClean="0"/>
+              <a:rPr lang="es-ES" smtClean="0"/>
               <a:t>Ofrecer un </a:t>
             </a:r>
             <a:r>
-              <a:rPr lang="es-ES" dirty="0" err="1" smtClean="0"/>
+              <a:rPr lang="es-ES" err="1" smtClean="0"/>
               <a:t>feedback</a:t>
             </a:r>
             <a:r>
-              <a:rPr lang="es-ES" dirty="0" smtClean="0"/>
+              <a:rPr lang="es-ES" smtClean="0"/>
               <a:t> instantáneo al usuario.</a:t>
             </a:r>
           </a:p>
           <a:p>
             <a:r>
-              <a:rPr lang="es-ES" dirty="0" smtClean="0"/>
+              <a:rPr lang="es-ES" smtClean="0"/>
               <a:t>No inventar otra herramienta, integrarse con las herramientas existentes.</a:t>
             </a:r>
           </a:p>
           <a:p>
             <a:r>
-              <a:rPr lang="es-ES" dirty="0" smtClean="0"/>
+              <a:rPr lang="es-ES" smtClean="0"/>
               <a:t>Simplicidad de uso y despliegue, sin necesidad de un servidor central.</a:t>
             </a:r>
-            <a:endParaRPr lang="es-ES" dirty="0"/>
+            <a:endParaRPr lang="es-ES"/>
           </a:p>
         </p:txBody>
       </p:sp>
@@ -7387,10 +7560,10 @@
           <a:lstStyle/>
           <a:p>
             <a:r>
-              <a:rPr lang="es-ES" dirty="0" smtClean="0"/>
+              <a:rPr lang="es-ES" smtClean="0"/>
               <a:t>Problemas a Resolver</a:t>
             </a:r>
-            <a:endParaRPr lang="es-ES" dirty="0"/>
+            <a:endParaRPr lang="es-ES"/>
           </a:p>
         </p:txBody>
       </p:sp>
@@ -7482,10 +7655,10 @@
                     <a:lstStyle/>
                     <a:p>
                       <a:r>
-                        <a:rPr lang="es-ES" dirty="0" smtClean="0"/>
+                        <a:rPr lang="es-ES" smtClean="0"/>
                         <a:t>Solución</a:t>
                       </a:r>
-                      <a:endParaRPr lang="es-ES" dirty="0"/>
+                      <a:endParaRPr lang="es-ES"/>
                     </a:p>
                   </a:txBody>
                   <a:tcPr/>
@@ -7496,10 +7669,10 @@
                     <a:lstStyle/>
                     <a:p>
                       <a:r>
-                        <a:rPr lang="es-ES" dirty="0" smtClean="0"/>
+                        <a:rPr lang="es-ES" smtClean="0"/>
                         <a:t>Características</a:t>
                       </a:r>
-                      <a:endParaRPr lang="es-ES" dirty="0"/>
+                      <a:endParaRPr lang="es-ES"/>
                     </a:p>
                   </a:txBody>
                   <a:tcPr/>
@@ -7510,10 +7683,10 @@
                     <a:lstStyle/>
                     <a:p>
                       <a:r>
-                        <a:rPr lang="es-ES" dirty="0" smtClean="0"/>
+                        <a:rPr lang="es-ES" smtClean="0"/>
                         <a:t>Comparativa</a:t>
                       </a:r>
-                      <a:endParaRPr lang="es-ES" dirty="0"/>
+                      <a:endParaRPr lang="es-ES"/>
                     </a:p>
                   </a:txBody>
                   <a:tcPr/>
@@ -7526,14 +7699,14 @@
                     <a:lstStyle/>
                     <a:p>
                       <a:r>
-                        <a:rPr lang="es-ES" dirty="0" smtClean="0"/>
+                        <a:rPr lang="es-ES" smtClean="0"/>
                         <a:t>Google </a:t>
                       </a:r>
                       <a:r>
-                        <a:rPr lang="es-ES" dirty="0" err="1" smtClean="0"/>
+                        <a:rPr lang="es-ES" err="1" smtClean="0"/>
                         <a:t>Docs</a:t>
                       </a:r>
-                      <a:endParaRPr lang="es-ES" dirty="0"/>
+                      <a:endParaRPr lang="es-ES"/>
                     </a:p>
                   </a:txBody>
                   <a:tcPr/>
@@ -7544,22 +7717,22 @@
                     <a:lstStyle/>
                     <a:p>
                       <a:r>
-                        <a:rPr lang="es-ES" dirty="0" smtClean="0"/>
+                        <a:rPr lang="es-ES" smtClean="0"/>
                         <a:t>Edición</a:t>
                       </a:r>
                       <a:r>
-                        <a:rPr lang="es-ES" baseline="0" dirty="0" smtClean="0"/>
+                        <a:rPr lang="es-ES" baseline="0" smtClean="0"/>
                         <a:t> de </a:t>
                       </a:r>
                       <a:r>
-                        <a:rPr lang="es-ES" baseline="0" dirty="0" err="1" smtClean="0"/>
+                        <a:rPr lang="es-ES" baseline="0" err="1" smtClean="0"/>
                         <a:t>docs</a:t>
                       </a:r>
                       <a:r>
-                        <a:rPr lang="es-ES" baseline="0" dirty="0" smtClean="0"/>
+                        <a:rPr lang="es-ES" baseline="0" smtClean="0"/>
                         <a:t> en tiempo real desde un navegador.</a:t>
                       </a:r>
-                      <a:endParaRPr lang="es-ES" dirty="0"/>
+                      <a:endParaRPr lang="es-ES"/>
                     </a:p>
                   </a:txBody>
                   <a:tcPr/>
@@ -7570,14 +7743,14 @@
                     <a:lstStyle/>
                     <a:p>
                       <a:r>
-                        <a:rPr lang="es-ES" dirty="0" smtClean="0"/>
+                        <a:rPr lang="es-ES" smtClean="0"/>
                         <a:t>Solo utilizable a través</a:t>
                       </a:r>
                       <a:r>
-                        <a:rPr lang="es-ES" baseline="0" dirty="0" smtClean="0"/>
+                        <a:rPr lang="es-ES" baseline="0" smtClean="0"/>
                         <a:t> de un browser. Código fuente cerrado.</a:t>
                       </a:r>
-                      <a:endParaRPr lang="es-ES" dirty="0"/>
+                      <a:endParaRPr lang="es-ES"/>
                     </a:p>
                   </a:txBody>
                   <a:tcPr/>
@@ -7590,10 +7763,10 @@
                     <a:lstStyle/>
                     <a:p>
                       <a:r>
-                        <a:rPr lang="es-ES" dirty="0" smtClean="0"/>
+                        <a:rPr lang="es-ES" smtClean="0"/>
                         <a:t>Google Wave</a:t>
                       </a:r>
-                      <a:endParaRPr lang="es-ES" dirty="0"/>
+                      <a:endParaRPr lang="es-ES"/>
                     </a:p>
                   </a:txBody>
                   <a:tcPr/>
@@ -7604,14 +7777,14 @@
                     <a:lstStyle/>
                     <a:p>
                       <a:r>
-                        <a:rPr lang="es-ES" dirty="0" smtClean="0"/>
+                        <a:rPr lang="es-ES" smtClean="0"/>
                         <a:t>Comunicación</a:t>
                       </a:r>
                       <a:r>
-                        <a:rPr lang="es-ES" baseline="0" dirty="0" smtClean="0"/>
+                        <a:rPr lang="es-ES" baseline="0" smtClean="0"/>
                         <a:t> y colaboración en tiempo real.</a:t>
                       </a:r>
-                      <a:endParaRPr lang="es-ES" dirty="0"/>
+                      <a:endParaRPr lang="es-ES"/>
                     </a:p>
                   </a:txBody>
                   <a:tcPr/>
@@ -7622,22 +7795,22 @@
                     <a:lstStyle/>
                     <a:p>
                       <a:r>
-                        <a:rPr lang="es-ES" dirty="0" smtClean="0"/>
+                        <a:rPr lang="es-ES" smtClean="0"/>
                         <a:t>Ídem</a:t>
                       </a:r>
                       <a:r>
-                        <a:rPr lang="es-ES" baseline="0" dirty="0" smtClean="0"/>
+                        <a:rPr lang="es-ES" baseline="0" smtClean="0"/>
                         <a:t> Google </a:t>
                       </a:r>
                       <a:r>
-                        <a:rPr lang="es-ES" baseline="0" dirty="0" err="1" smtClean="0"/>
+                        <a:rPr lang="es-ES" baseline="0" err="1" smtClean="0"/>
                         <a:t>Docs</a:t>
                       </a:r>
                       <a:r>
-                        <a:rPr lang="es-ES" baseline="0" dirty="0" smtClean="0"/>
+                        <a:rPr lang="es-ES" baseline="0" smtClean="0"/>
                         <a:t>. El proyecto ha sido abandonado.</a:t>
                       </a:r>
-                      <a:endParaRPr lang="es-ES" dirty="0"/>
+                      <a:endParaRPr lang="es-ES"/>
                     </a:p>
                   </a:txBody>
                   <a:tcPr/>
@@ -7650,10 +7823,10 @@
                     <a:lstStyle/>
                     <a:p>
                       <a:r>
-                        <a:rPr lang="es-ES" dirty="0" smtClean="0"/>
+                        <a:rPr lang="es-ES" smtClean="0"/>
                         <a:t>COLA (ECF)</a:t>
                       </a:r>
-                      <a:endParaRPr lang="es-ES" dirty="0"/>
+                      <a:endParaRPr lang="es-ES"/>
                     </a:p>
                   </a:txBody>
                   <a:tcPr/>
@@ -7664,14 +7837,14 @@
                     <a:lstStyle/>
                     <a:p>
                       <a:r>
-                        <a:rPr lang="es-ES" dirty="0" smtClean="0"/>
+                        <a:rPr lang="es-ES" smtClean="0"/>
                         <a:t>Integración</a:t>
                       </a:r>
                       <a:r>
-                        <a:rPr lang="es-ES" baseline="0" dirty="0" smtClean="0"/>
+                        <a:rPr lang="es-ES" baseline="0" smtClean="0"/>
                         <a:t> con Eclipse para colaboración en tiempo real de código fuente.</a:t>
                       </a:r>
-                      <a:endParaRPr lang="es-ES" dirty="0"/>
+                      <a:endParaRPr lang="es-ES"/>
                     </a:p>
                   </a:txBody>
                   <a:tcPr/>
@@ -7682,14 +7855,14 @@
                     <a:lstStyle/>
                     <a:p>
                       <a:r>
-                        <a:rPr lang="es-ES" dirty="0" smtClean="0"/>
+                        <a:rPr lang="es-ES" smtClean="0"/>
                         <a:t>Máximo</a:t>
                       </a:r>
                       <a:r>
-                        <a:rPr lang="es-ES" baseline="0" dirty="0" smtClean="0"/>
+                        <a:rPr lang="es-ES" baseline="0" smtClean="0"/>
                         <a:t> dos  usuarios en una sesión de edición. Depende del proyecto ECF.</a:t>
                       </a:r>
-                      <a:endParaRPr lang="es-ES" dirty="0"/>
+                      <a:endParaRPr lang="es-ES"/>
                     </a:p>
                   </a:txBody>
                   <a:tcPr/>
@@ -7702,10 +7875,10 @@
                     <a:lstStyle/>
                     <a:p>
                       <a:r>
-                        <a:rPr lang="es-ES" dirty="0" err="1" smtClean="0"/>
+                        <a:rPr lang="es-ES" err="1" smtClean="0"/>
                         <a:t>BeWeeVee</a:t>
                       </a:r>
-                      <a:endParaRPr lang="es-ES" dirty="0"/>
+                      <a:endParaRPr lang="es-ES"/>
                     </a:p>
                   </a:txBody>
                   <a:tcPr/>
@@ -7716,30 +7889,30 @@
                     <a:lstStyle/>
                     <a:p>
                       <a:r>
-                        <a:rPr lang="es-ES" dirty="0" err="1" smtClean="0"/>
+                        <a:rPr lang="es-ES" err="1" smtClean="0"/>
                         <a:t>Framwork</a:t>
                       </a:r>
                       <a:r>
-                        <a:rPr lang="es-ES" baseline="0" dirty="0" smtClean="0"/>
+                        <a:rPr lang="es-ES" baseline="0" smtClean="0"/>
                         <a:t> para integración de funcionalidad de </a:t>
                       </a:r>
                       <a:r>
-                        <a:rPr lang="es-ES" baseline="0" dirty="0" err="1" smtClean="0"/>
+                        <a:rPr lang="es-ES" baseline="0" err="1" smtClean="0"/>
                         <a:t>colaboracion</a:t>
                       </a:r>
                       <a:r>
-                        <a:rPr lang="es-ES" baseline="0" dirty="0" smtClean="0"/>
+                        <a:rPr lang="es-ES" baseline="0" smtClean="0"/>
                         <a:t> en tiempo real para </a:t>
                       </a:r>
                       <a:r>
-                        <a:rPr lang="es-ES" baseline="0" dirty="0" err="1" smtClean="0"/>
+                        <a:rPr lang="es-ES" baseline="0" err="1" smtClean="0"/>
                         <a:t>.Net</a:t>
                       </a:r>
                       <a:r>
-                        <a:rPr lang="es-ES" baseline="0" dirty="0" smtClean="0"/>
+                        <a:rPr lang="es-ES" baseline="0" smtClean="0"/>
                         <a:t>.</a:t>
                       </a:r>
-                      <a:endParaRPr lang="es-ES" dirty="0"/>
+                      <a:endParaRPr lang="es-ES"/>
                     </a:p>
                   </a:txBody>
                   <a:tcPr/>
@@ -7750,26 +7923,26 @@
                     <a:lstStyle/>
                     <a:p>
                       <a:r>
-                        <a:rPr lang="es-ES" dirty="0" smtClean="0"/>
+                        <a:rPr lang="es-ES" smtClean="0"/>
                         <a:t>Código</a:t>
                       </a:r>
                       <a:r>
-                        <a:rPr lang="es-ES" baseline="0" dirty="0" smtClean="0"/>
+                        <a:rPr lang="es-ES" baseline="0" smtClean="0"/>
                         <a:t> fuente </a:t>
                       </a:r>
                       <a:r>
-                        <a:rPr lang="es-ES" baseline="0" dirty="0" err="1" smtClean="0"/>
+                        <a:rPr lang="es-ES" baseline="0" err="1" smtClean="0"/>
                         <a:t>cerrrado</a:t>
                       </a:r>
                       <a:r>
-                        <a:rPr lang="es-ES" baseline="0" dirty="0" smtClean="0"/>
+                        <a:rPr lang="es-ES" baseline="0" smtClean="0"/>
                         <a:t>. Está desarrollado sólo para la plataforma </a:t>
                       </a:r>
                       <a:r>
-                        <a:rPr lang="es-ES" baseline="0" dirty="0" err="1" smtClean="0"/>
+                        <a:rPr lang="es-ES" baseline="0" err="1" smtClean="0"/>
                         <a:t>.Net</a:t>
                       </a:r>
-                      <a:endParaRPr lang="es-ES" dirty="0"/>
+                      <a:endParaRPr lang="es-ES"/>
                     </a:p>
                   </a:txBody>
                   <a:tcPr/>
@@ -7795,10 +7968,10 @@
           <a:lstStyle/>
           <a:p>
             <a:r>
-              <a:rPr lang="es-ES" dirty="0" smtClean="0"/>
+              <a:rPr lang="es-ES" smtClean="0"/>
               <a:t>Otras soluciones similares</a:t>
             </a:r>
-            <a:endParaRPr lang="es-ES" dirty="0"/>
+            <a:endParaRPr lang="es-ES"/>
           </a:p>
         </p:txBody>
       </p:sp>
@@ -7918,31 +8091,90 @@
         </p:nvSpPr>
         <p:spPr/>
         <p:txBody>
+          <a:bodyPr>
+            <a:normAutofit/>
+          </a:bodyPr>
+          <a:lstStyle/>
+          <a:p>
+            <a:r>
+              <a:rPr lang="es-ES" dirty="0" smtClean="0"/>
+              <a:t>Para </a:t>
+            </a:r>
+            <a:r>
+              <a:rPr lang="es-ES" dirty="0" smtClean="0"/>
+              <a:t>sincronizar el documento entre cada ubicación se hace uso del algoritmo “Júpiter”</a:t>
+            </a:r>
+            <a:endParaRPr lang="es-ES" dirty="0" smtClean="0"/>
+          </a:p>
+          <a:p>
+            <a:endParaRPr lang="es-ES" dirty="0" smtClean="0"/>
+          </a:p>
+        </p:txBody>
+      </p:sp>
+      <p:sp>
+        <p:nvSpPr>
+          <p:cNvPr id="2" name="1 Título"/>
+          <p:cNvSpPr>
+            <a:spLocks noGrp="1"/>
+          </p:cNvSpPr>
+          <p:nvPr>
+            <p:ph type="title"/>
+          </p:nvPr>
+        </p:nvSpPr>
+        <p:spPr/>
+        <p:txBody>
           <a:bodyPr/>
           <a:lstStyle/>
           <a:p>
+            <a:r>
+              <a:rPr lang="es-ES" dirty="0" smtClean="0"/>
+              <a:t>Búsqueda de la </a:t>
+            </a:r>
+            <a:r>
+              <a:rPr lang="es-ES" dirty="0" smtClean="0"/>
+              <a:t>solución (I)</a:t>
+            </a:r>
             <a:endParaRPr lang="es-ES" dirty="0"/>
           </a:p>
         </p:txBody>
       </p:sp>
       <p:sp>
         <p:nvSpPr>
-          <p:cNvPr id="2" name="1 Título"/>
-          <p:cNvSpPr>
-            <a:spLocks noGrp="1"/>
-          </p:cNvSpPr>
-          <p:nvPr>
-            <p:ph type="title"/>
-          </p:nvPr>
-        </p:nvSpPr>
-        <p:spPr/>
-        <p:txBody>
-          <a:bodyPr/>
+          <p:cNvPr id="5" name="4 CuadroTexto"/>
+          <p:cNvSpPr txBox="1"/>
+          <p:nvPr/>
+        </p:nvSpPr>
+        <p:spPr>
+          <a:xfrm>
+            <a:off x="1000100" y="2643182"/>
+            <a:ext cx="7215238" cy="646331"/>
+          </a:xfrm>
+          <a:prstGeom prst="rect">
+            <a:avLst/>
+          </a:prstGeom>
+          <a:noFill/>
+        </p:spPr>
+        <p:txBody>
+          <a:bodyPr wrap="square" rtlCol="0">
+            <a:spAutoFit/>
+          </a:bodyPr>
           <a:lstStyle/>
           <a:p>
             <a:r>
+              <a:rPr lang="es-ES" dirty="0" err="1" smtClean="0"/>
+              <a:t>Aca</a:t>
+            </a:r>
+            <a:r>
               <a:rPr lang="es-ES" dirty="0" smtClean="0"/>
-              <a:t>Búsqueda de la solución</a:t>
+              <a:t> poner algoritmo de </a:t>
+            </a:r>
+            <a:r>
+              <a:rPr lang="es-ES" dirty="0" err="1" smtClean="0"/>
+              <a:t>jupiter</a:t>
+            </a:r>
+            <a:r>
+              <a:rPr lang="es-ES" dirty="0" smtClean="0"/>
+              <a:t> simple, con una animación de cómo se aplicaría</a:t>
             </a:r>
             <a:endParaRPr lang="es-ES" dirty="0"/>
           </a:p>
@@ -7990,35 +8222,126 @@
             <p:ph idx="1"/>
           </p:nvPr>
         </p:nvSpPr>
-        <p:spPr/>
+        <p:spPr>
+          <a:xfrm>
+            <a:off x="457200" y="1481329"/>
+            <a:ext cx="8229600" cy="2304862"/>
+          </a:xfrm>
+        </p:spPr>
         <p:txBody>
           <a:bodyPr/>
           <a:lstStyle/>
           <a:p>
+            <a:r>
+              <a:rPr lang="es-ES" dirty="0" smtClean="0"/>
+              <a:t>Originalmente se </a:t>
+            </a:r>
+            <a:r>
+              <a:rPr lang="es-ES" dirty="0" err="1" smtClean="0"/>
+              <a:t>implentaron</a:t>
+            </a:r>
+            <a:r>
+              <a:rPr lang="es-ES" dirty="0" smtClean="0"/>
+              <a:t> operaciones Borrar e Insertar de más de un carácter.</a:t>
+            </a:r>
+          </a:p>
+          <a:p>
+            <a:r>
+              <a:rPr lang="es-ES" dirty="0" smtClean="0"/>
+              <a:t>Finalmente, se utilizó la solución propuesta en el </a:t>
+            </a:r>
+            <a:r>
+              <a:rPr lang="es-ES" dirty="0" err="1" smtClean="0"/>
+              <a:t>paper</a:t>
+            </a:r>
+            <a:r>
+              <a:rPr lang="es-ES" dirty="0" smtClean="0"/>
+              <a:t> </a:t>
+            </a:r>
+            <a:r>
+              <a:rPr lang="es-ES" dirty="0" err="1" smtClean="0"/>
+              <a:t>xxx</a:t>
+            </a:r>
+            <a:r>
+              <a:rPr lang="es-ES" dirty="0" smtClean="0"/>
+              <a:t> haciendo uso de operaciones Borrar e Insertar de 1 carácter de longitud</a:t>
+            </a:r>
+            <a:r>
+              <a:rPr lang="es-ES" dirty="0" smtClean="0"/>
+              <a:t>.</a:t>
+            </a:r>
+            <a:endParaRPr lang="es-ES" dirty="0" smtClean="0"/>
+          </a:p>
+        </p:txBody>
+      </p:sp>
+      <p:sp>
+        <p:nvSpPr>
+          <p:cNvPr id="2" name="1 Título"/>
+          <p:cNvSpPr>
+            <a:spLocks noGrp="1"/>
+          </p:cNvSpPr>
+          <p:nvPr>
+            <p:ph type="title"/>
+          </p:nvPr>
+        </p:nvSpPr>
+        <p:spPr/>
+        <p:txBody>
+          <a:bodyPr/>
+          <a:lstStyle/>
+          <a:p>
+            <a:r>
+              <a:rPr lang="es-ES" dirty="0" smtClean="0"/>
+              <a:t>Búsqueda de la </a:t>
+            </a:r>
+            <a:r>
+              <a:rPr lang="es-ES" dirty="0" smtClean="0"/>
+              <a:t>solución (II)</a:t>
+            </a:r>
             <a:endParaRPr lang="es-ES" dirty="0"/>
           </a:p>
         </p:txBody>
       </p:sp>
       <p:sp>
         <p:nvSpPr>
-          <p:cNvPr id="2" name="1 Título"/>
-          <p:cNvSpPr>
-            <a:spLocks noGrp="1"/>
-          </p:cNvSpPr>
-          <p:nvPr>
-            <p:ph type="title"/>
-          </p:nvPr>
-        </p:nvSpPr>
-        <p:spPr/>
-        <p:txBody>
-          <a:bodyPr>
-            <a:normAutofit fontScale="90000"/>
+          <p:cNvPr id="5" name="4 CuadroTexto"/>
+          <p:cNvSpPr txBox="1"/>
+          <p:nvPr/>
+        </p:nvSpPr>
+        <p:spPr>
+          <a:xfrm>
+            <a:off x="1428728" y="4643446"/>
+            <a:ext cx="6929486" cy="646331"/>
+          </a:xfrm>
+          <a:prstGeom prst="rect">
+            <a:avLst/>
+          </a:prstGeom>
+          <a:noFill/>
+        </p:spPr>
+        <p:txBody>
+          <a:bodyPr wrap="square" rtlCol="0">
+            <a:spAutoFit/>
           </a:bodyPr>
           <a:lstStyle/>
           <a:p>
             <a:r>
               <a:rPr lang="es-ES" dirty="0" smtClean="0"/>
-              <a:t>Problemas enfrentados durante el desarrollo</a:t>
+              <a:t>Poner </a:t>
+            </a:r>
+            <a:r>
+              <a:rPr lang="es-ES" dirty="0" err="1" smtClean="0"/>
+              <a:t>ej</a:t>
+            </a:r>
+            <a:r>
+              <a:rPr lang="es-ES" dirty="0" smtClean="0"/>
+              <a:t> de </a:t>
+            </a:r>
+            <a:r>
+              <a:rPr lang="es-ES" dirty="0" err="1" smtClean="0"/>
+              <a:t>funcion</a:t>
+            </a:r>
+            <a:r>
+              <a:rPr lang="es-ES" dirty="0" smtClean="0"/>
+              <a:t> de transformación,  para dar una idea de lo que hace</a:t>
             </a:r>
             <a:endParaRPr lang="es-ES" dirty="0"/>
           </a:p>
@@ -8071,26 +8394,6 @@
           <a:bodyPr/>
           <a:lstStyle/>
           <a:p>
-            <a:r>
-              <a:rPr lang="es-ES" dirty="0" smtClean="0"/>
-              <a:t>Mostrar  el listado  de las </a:t>
-            </a:r>
-            <a:r>
-              <a:rPr lang="es-ES" dirty="0" err="1" smtClean="0"/>
-              <a:t>tecnologias</a:t>
-            </a:r>
-            <a:r>
-              <a:rPr lang="es-ES" dirty="0" smtClean="0"/>
-              <a:t> y una breve </a:t>
-            </a:r>
-            <a:r>
-              <a:rPr lang="es-ES" dirty="0" err="1" smtClean="0"/>
-              <a:t>explicacion</a:t>
-            </a:r>
-            <a:r>
-              <a:rPr lang="es-ES" dirty="0" smtClean="0"/>
-              <a:t> de porque se usaron</a:t>
-            </a:r>
             <a:endParaRPr lang="es-ES" dirty="0"/>
           </a:p>
         </p:txBody>
@@ -8107,14 +8410,16 @@
         </p:nvSpPr>
         <p:spPr/>
         <p:txBody>
-          <a:bodyPr/>
+          <a:bodyPr>
+            <a:normAutofit fontScale="90000"/>
+          </a:bodyPr>
           <a:lstStyle/>
           <a:p>
             <a:r>
-              <a:rPr lang="es-ES" dirty="0" smtClean="0"/>
-              <a:t>Tecnologías utilizadas</a:t>
-            </a:r>
-            <a:endParaRPr lang="es-ES" dirty="0"/>
+              <a:rPr lang="es-ES" smtClean="0"/>
+              <a:t>Problemas enfrentados durante el desarrollo</a:t>
+            </a:r>
+            <a:endParaRPr lang="es-ES"/>
           </a:p>
         </p:txBody>
       </p:sp>

</xml_diff>

<commit_message>
notas del speaker para las primeras 3 diapositivas
</commit_message>
<xml_diff>
--- a/doc/presentacion/presentacion.pptx
+++ b/doc/presentacion/presentacion.pptx
@@ -211,7 +211,7 @@
             <a:fld id="{53A9BA33-61B4-4CB5-A056-C0C55B1A2ED8}" type="datetimeFigureOut">
               <a:rPr lang="es-AR" smtClean="0"/>
               <a:pPr/>
-              <a:t>07/12/2010</a:t>
+              <a:t>19/12/2010</a:t>
             </a:fld>
             <a:endParaRPr lang="es-AR"/>
           </a:p>
@@ -373,7 +373,7 @@
             <a:fld id="{3BCBAC67-084D-419D-A89D-D7FC2C09E238}" type="slidenum">
               <a:rPr lang="es-AR" smtClean="0"/>
               <a:pPr/>
-              <a:t>‹#›</a:t>
+              <a:t>‹Nº›</a:t>
             </a:fld>
             <a:endParaRPr lang="es-AR"/>
           </a:p>
@@ -523,7 +523,81 @@
           </a:bodyPr>
           <a:lstStyle/>
           <a:p>
-            <a:endParaRPr lang="es-ES"/>
+            <a:pPr>
+              <a:buFont typeface="Arial" pitchFamily="34" charset="0"/>
+              <a:buChar char="•"/>
+            </a:pPr>
+            <a:r>
+              <a:rPr lang="es-ES" dirty="0" smtClean="0"/>
+              <a:t>Buenas noches/tardes, somos</a:t>
+            </a:r>
+            <a:r>
+              <a:rPr lang="es-ES" baseline="0" dirty="0" smtClean="0"/>
+              <a:t> </a:t>
+            </a:r>
+            <a:r>
+              <a:rPr lang="es-ES" baseline="0" dirty="0" err="1" smtClean="0"/>
+              <a:t>becho</a:t>
+            </a:r>
+            <a:r>
+              <a:rPr lang="es-ES" baseline="0" dirty="0" smtClean="0"/>
+              <a:t> y lea. Gracias a todos por venir.</a:t>
+            </a:r>
+          </a:p>
+          <a:p>
+            <a:pPr>
+              <a:buFont typeface="Arial" pitchFamily="34" charset="0"/>
+              <a:buChar char="•"/>
+            </a:pPr>
+            <a:r>
+              <a:rPr lang="es-ES" baseline="0" dirty="0" smtClean="0"/>
+              <a:t>Hoy vamos a realizar</a:t>
+            </a:r>
+            <a:r>
+              <a:rPr lang="es-ES" dirty="0" smtClean="0"/>
+              <a:t> la presentación del trabajo profesional de ingeniería en informática que desarrollamos bajo la tutoría</a:t>
+            </a:r>
+            <a:r>
+              <a:rPr lang="es-ES" baseline="0" dirty="0" smtClean="0"/>
+              <a:t> del Lic. Pablo </a:t>
+            </a:r>
+            <a:r>
+              <a:rPr lang="es-ES" baseline="0" dirty="0" err="1" smtClean="0"/>
+              <a:t>Cosso</a:t>
+            </a:r>
+            <a:r>
+              <a:rPr lang="es-ES" baseline="0" dirty="0" smtClean="0"/>
+              <a:t>.</a:t>
+            </a:r>
+          </a:p>
+          <a:p>
+            <a:pPr>
+              <a:buFont typeface="Arial" pitchFamily="34" charset="0"/>
+              <a:buChar char="•"/>
+            </a:pPr>
+            <a:r>
+              <a:rPr lang="es-ES" baseline="0" dirty="0" smtClean="0"/>
+              <a:t>El nombre que le dimos al proyecto es “Editor Paralelo” o en inglés como lo llamaremos de aquí en adelante “</a:t>
+            </a:r>
+            <a:r>
+              <a:rPr lang="es-ES" baseline="0" dirty="0" err="1" smtClean="0"/>
+              <a:t>ParalellEditor</a:t>
+            </a:r>
+            <a:r>
+              <a:rPr lang="es-ES" baseline="0" dirty="0" smtClean="0"/>
+              <a:t>”</a:t>
+            </a:r>
+          </a:p>
+          <a:p>
+            <a:pPr>
+              <a:buFont typeface="Arial" pitchFamily="34" charset="0"/>
+              <a:buChar char="•"/>
+            </a:pPr>
+            <a:r>
+              <a:rPr lang="es-ES" baseline="0" dirty="0" smtClean="0"/>
+              <a:t>A continuación vamos a pasar a revisar los puntos que se van a exponer a lo largo de la presentación.</a:t>
+            </a:r>
+            <a:endParaRPr lang="es-ES" dirty="0"/>
           </a:p>
         </p:txBody>
       </p:sp>
@@ -578,7 +652,7 @@
       </p:grpSpPr>
       <p:sp>
         <p:nvSpPr>
-          <p:cNvPr id="2" name="Slide Image Placeholder 1"/>
+          <p:cNvPr id="2" name="1 Marcador de imagen de diapositiva"/>
           <p:cNvSpPr>
             <a:spLocks noGrp="1" noRot="1" noChangeAspect="1"/>
           </p:cNvSpPr>
@@ -590,7 +664,7 @@
       </p:sp>
       <p:sp>
         <p:nvSpPr>
-          <p:cNvPr id="3" name="Notes Placeholder 2"/>
+          <p:cNvPr id="3" name="2 Marcador de notas"/>
           <p:cNvSpPr>
             <a:spLocks noGrp="1"/>
           </p:cNvSpPr>
@@ -605,13 +679,89 @@
           </a:bodyPr>
           <a:lstStyle/>
           <a:p>
-            <a:endParaRPr lang="es-AR"/>
+            <a:pPr>
+              <a:buFont typeface="Arial" pitchFamily="34" charset="0"/>
+              <a:buChar char="•"/>
+            </a:pPr>
+            <a:r>
+              <a:rPr lang="es-ES" dirty="0" smtClean="0"/>
+              <a:t>La presentación se va</a:t>
+            </a:r>
+            <a:r>
+              <a:rPr lang="es-ES" baseline="0" dirty="0" smtClean="0"/>
+              <a:t> a dividir en 3 partes:</a:t>
+            </a:r>
+          </a:p>
+          <a:p>
+            <a:pPr>
+              <a:buFont typeface="Arial" pitchFamily="34" charset="0"/>
+              <a:buChar char="•"/>
+            </a:pPr>
+            <a:r>
+              <a:rPr lang="es-ES" baseline="0" dirty="0" smtClean="0"/>
+              <a:t> La primera realiza una introducción al tema, para poner en contexto a aquellos que no están familiarizados con los sistemas colaborativos de tiempo real.</a:t>
+            </a:r>
+          </a:p>
+          <a:p>
+            <a:pPr>
+              <a:buFont typeface="Arial" pitchFamily="34" charset="0"/>
+              <a:buNone/>
+            </a:pPr>
+            <a:r>
+              <a:rPr lang="es-ES" baseline="0" dirty="0" smtClean="0"/>
+              <a:t> Se explica el porque o la motivación que nos lleva a desarrollar este trabajo junto con la explicación del problema que se quiere resolver y cuales son las soluciones que hoy en día existen y que tratan de resolverlo. Se analizan las ventajas y desventajas de estos productos.</a:t>
+            </a:r>
+          </a:p>
+          <a:p>
+            <a:pPr>
+              <a:buFont typeface="Arial" pitchFamily="34" charset="0"/>
+              <a:buChar char="•"/>
+            </a:pPr>
+            <a:r>
+              <a:rPr lang="es-ES" dirty="0" smtClean="0"/>
+              <a:t>Durante la 2º</a:t>
+            </a:r>
+            <a:r>
+              <a:rPr lang="es-ES" baseline="0" dirty="0" smtClean="0"/>
+              <a:t> parte se analiza la solución implementada.</a:t>
+            </a:r>
+          </a:p>
+          <a:p>
+            <a:pPr>
+              <a:buFont typeface="Arial" pitchFamily="34" charset="0"/>
+              <a:buNone/>
+            </a:pPr>
+            <a:r>
+              <a:rPr lang="es-ES" baseline="0" dirty="0" smtClean="0"/>
+              <a:t>Se explica cuales son los fundamentos, tecnologías y arquitectura aplicadas en el desarrollo de la misma.</a:t>
+            </a:r>
+          </a:p>
+          <a:p>
+            <a:pPr>
+              <a:buFont typeface="Arial" pitchFamily="34" charset="0"/>
+              <a:buChar char="•"/>
+            </a:pPr>
+            <a:r>
+              <a:rPr lang="es-ES" baseline="0" dirty="0" smtClean="0"/>
+              <a:t>Seguido de esto vamos a realizar una demostración en vivo del producto en lo que sería un escenario típico de uso: dos programadores en distintas ubicaciones desarrollando código fuente al mismo tiempo sobre el mismo archivo de un proyecto.</a:t>
+            </a:r>
+          </a:p>
+          <a:p>
+            <a:pPr>
+              <a:buFont typeface="Arial" pitchFamily="34" charset="0"/>
+              <a:buChar char="•"/>
+            </a:pPr>
+            <a:r>
+              <a:rPr lang="es-ES" baseline="0" dirty="0" smtClean="0"/>
+              <a:t>Como cierre se explicarán las futuras líneas de investigación o mejoras que podrían aplicarse al producto desarrollado para agregarle valor, y se expondrán las conclusiones obtenidas.</a:t>
+            </a:r>
+            <a:endParaRPr lang="es-ES" dirty="0"/>
           </a:p>
         </p:txBody>
       </p:sp>
       <p:sp>
         <p:nvSpPr>
-          <p:cNvPr id="4" name="Slide Number Placeholder 3"/>
+          <p:cNvPr id="4" name="3 Marcador de número de diapositiva"/>
           <p:cNvSpPr>
             <a:spLocks noGrp="1"/>
           </p:cNvSpPr>
@@ -627,7 +777,7 @@
             <a:fld id="{3BCBAC67-084D-419D-A89D-D7FC2C09E238}" type="slidenum">
               <a:rPr lang="es-AR" smtClean="0"/>
               <a:pPr/>
-              <a:t>3</a:t>
+              <a:t>2</a:t>
             </a:fld>
             <a:endParaRPr lang="es-AR"/>
           </a:p>
@@ -642,6 +792,161 @@
 </file>
 
 <file path=ppt/notesSlides/notesSlide3.xml><?xml version="1.0" encoding="utf-8"?>
+<p:notes xmlns:a="http://schemas.openxmlformats.org/drawingml/2006/main" xmlns:r="http://schemas.openxmlformats.org/officeDocument/2006/relationships" xmlns:p="http://schemas.openxmlformats.org/presentationml/2006/main">
+  <p:cSld>
+    <p:spTree>
+      <p:nvGrpSpPr>
+        <p:cNvPr id="1" name=""/>
+        <p:cNvGrpSpPr/>
+        <p:nvPr/>
+      </p:nvGrpSpPr>
+      <p:grpSpPr>
+        <a:xfrm>
+          <a:off x="0" y="0"/>
+          <a:ext cx="0" cy="0"/>
+          <a:chOff x="0" y="0"/>
+          <a:chExt cx="0" cy="0"/>
+        </a:xfrm>
+      </p:grpSpPr>
+      <p:sp>
+        <p:nvSpPr>
+          <p:cNvPr id="2" name="Slide Image Placeholder 1"/>
+          <p:cNvSpPr>
+            <a:spLocks noGrp="1" noRot="1" noChangeAspect="1"/>
+          </p:cNvSpPr>
+          <p:nvPr>
+            <p:ph type="sldImg"/>
+          </p:nvPr>
+        </p:nvSpPr>
+        <p:spPr/>
+      </p:sp>
+      <p:sp>
+        <p:nvSpPr>
+          <p:cNvPr id="3" name="Notes Placeholder 2"/>
+          <p:cNvSpPr>
+            <a:spLocks noGrp="1"/>
+          </p:cNvSpPr>
+          <p:nvPr>
+            <p:ph type="body" idx="1"/>
+          </p:nvPr>
+        </p:nvSpPr>
+        <p:spPr/>
+        <p:txBody>
+          <a:bodyPr>
+            <a:normAutofit/>
+          </a:bodyPr>
+          <a:lstStyle/>
+          <a:p>
+            <a:pPr>
+              <a:buFont typeface="Arial" pitchFamily="34" charset="0"/>
+              <a:buChar char="•"/>
+            </a:pPr>
+            <a:r>
+              <a:rPr lang="es-AR" dirty="0" smtClean="0"/>
+              <a:t>Frecuentemente</a:t>
+            </a:r>
+            <a:r>
+              <a:rPr lang="es-AR" baseline="0" dirty="0" smtClean="0"/>
+              <a:t> al enfrentarse con tareas en las cuales es necesario trabajar en forma grupal surge el inconveniente de que los integrantes del ET están distribuidos geográficamente. Un escenario muy común es la necesidad de desarrollar un trabajo práctico para la facultad. En este tipo de trabajos generalmente se realiza una división de tareas, que luego de ser resueltas por cada integrante requieren un cierto </a:t>
+            </a:r>
+            <a:r>
+              <a:rPr lang="es-AR" baseline="0" dirty="0" err="1" smtClean="0"/>
+              <a:t>feedback</a:t>
+            </a:r>
+            <a:r>
+              <a:rPr lang="es-AR" baseline="0" dirty="0" smtClean="0"/>
+              <a:t>.</a:t>
+            </a:r>
+          </a:p>
+          <a:p>
+            <a:pPr>
+              <a:buFont typeface="Arial" pitchFamily="34" charset="0"/>
+              <a:buChar char="•"/>
+            </a:pPr>
+            <a:r>
+              <a:rPr lang="es-AR" baseline="0" dirty="0" smtClean="0"/>
+              <a:t>En estas situaciones se necesitan </a:t>
+            </a:r>
+            <a:r>
+              <a:rPr lang="es-ES" dirty="0" smtClean="0"/>
+              <a:t>herramientas que ayuden a simplificar este proceso</a:t>
+            </a:r>
+            <a:r>
+              <a:rPr lang="es-ES" baseline="0" dirty="0" smtClean="0"/>
+              <a:t> y que ayude a que </a:t>
+            </a:r>
+            <a:r>
+              <a:rPr lang="es-ES" dirty="0" smtClean="0"/>
+              <a:t>los tiempos de coordinación e interacción entre</a:t>
+            </a:r>
+            <a:r>
+              <a:rPr lang="es-ES" baseline="0" dirty="0" smtClean="0"/>
+              <a:t> </a:t>
+            </a:r>
+            <a:r>
+              <a:rPr lang="es-ES" dirty="0" smtClean="0"/>
+              <a:t>los integrantes del grupo de trabajo sean bajos.</a:t>
+            </a:r>
+            <a:endParaRPr lang="es-AR" dirty="0" smtClean="0"/>
+          </a:p>
+          <a:p>
+            <a:pPr>
+              <a:buFont typeface="Arial" pitchFamily="34" charset="0"/>
+              <a:buChar char="•"/>
+            </a:pPr>
+            <a:r>
+              <a:rPr lang="es-AR" dirty="0" smtClean="0"/>
+              <a:t>Personalmente,</a:t>
+            </a:r>
+            <a:r>
+              <a:rPr lang="es-AR" baseline="0" dirty="0" smtClean="0"/>
+              <a:t> en los casos en los que se nos presento la necesidad de utilizar herramienta para el desarrollo de </a:t>
+            </a:r>
+            <a:r>
+              <a:rPr lang="es-AR" baseline="0" smtClean="0"/>
+              <a:t>un TP en </a:t>
+            </a:r>
+            <a:r>
+              <a:rPr lang="es-AR" baseline="0" dirty="0" smtClean="0"/>
+              <a:t>las condiciones que se explicaron anteriormente, las que estaban disponibles no fueron o resultaron satisfactorias por diversos motivos.</a:t>
+            </a:r>
+            <a:endParaRPr lang="es-ES" dirty="0" smtClean="0"/>
+          </a:p>
+        </p:txBody>
+      </p:sp>
+      <p:sp>
+        <p:nvSpPr>
+          <p:cNvPr id="4" name="Slide Number Placeholder 3"/>
+          <p:cNvSpPr>
+            <a:spLocks noGrp="1"/>
+          </p:cNvSpPr>
+          <p:nvPr>
+            <p:ph type="sldNum" sz="quarter" idx="10"/>
+          </p:nvPr>
+        </p:nvSpPr>
+        <p:spPr/>
+        <p:txBody>
+          <a:bodyPr/>
+          <a:lstStyle/>
+          <a:p>
+            <a:fld id="{3BCBAC67-084D-419D-A89D-D7FC2C09E238}" type="slidenum">
+              <a:rPr lang="es-AR" smtClean="0"/>
+              <a:pPr/>
+              <a:t>3</a:t>
+            </a:fld>
+            <a:endParaRPr lang="es-AR"/>
+          </a:p>
+        </p:txBody>
+      </p:sp>
+    </p:spTree>
+  </p:cSld>
+  <p:clrMapOvr>
+    <a:masterClrMapping/>
+  </p:clrMapOvr>
+</p:notes>
+</file>
+
+<file path=ppt/notesSlides/notesSlide4.xml><?xml version="1.0" encoding="utf-8"?>
 <p:notes xmlns:a="http://schemas.openxmlformats.org/drawingml/2006/main" xmlns:r="http://schemas.openxmlformats.org/officeDocument/2006/relationships" xmlns:p="http://schemas.openxmlformats.org/presentationml/2006/main">
   <p:cSld>
     <p:spTree>
@@ -1381,7 +1686,7 @@
             <a:fld id="{47C9B81F-C347-4BEF-BFDF-29C42F48304A}" type="datetimeFigureOut">
               <a:rPr lang="en-US" smtClean="0"/>
               <a:pPr/>
-              <a:t>12/7/2010</a:t>
+              <a:t>12/19/2010</a:t>
             </a:fld>
             <a:endParaRPr lang="en-US">
               <a:solidFill>
@@ -1457,7 +1762,7 @@
             <a:fld id="{042AED99-7FB4-404E-8A97-64753DCE42EC}" type="slidenum">
               <a:rPr kumimoji="0" lang="en-US" smtClean="0"/>
               <a:pPr/>
-              <a:t>‹#›</a:t>
+              <a:t>‹Nº›</a:t>
             </a:fld>
             <a:endParaRPr kumimoji="0" lang="en-US">
               <a:solidFill>
@@ -1598,7 +1903,7 @@
             <a:fld id="{47C9B81F-C347-4BEF-BFDF-29C42F48304A}" type="datetimeFigureOut">
               <a:rPr lang="en-US" smtClean="0"/>
               <a:pPr/>
-              <a:t>12/7/2010</a:t>
+              <a:t>12/19/2010</a:t>
             </a:fld>
             <a:endParaRPr lang="en-US">
               <a:solidFill>
@@ -1658,7 +1963,7 @@
             <a:fld id="{042AED99-7FB4-404E-8A97-64753DCE42EC}" type="slidenum">
               <a:rPr kumimoji="0" lang="en-US" smtClean="0"/>
               <a:pPr/>
-              <a:t>‹#›</a:t>
+              <a:t>‹Nº›</a:t>
             </a:fld>
             <a:endParaRPr kumimoji="0" lang="en-US">
               <a:solidFill>
@@ -1804,7 +2109,7 @@
             <a:fld id="{47C9B81F-C347-4BEF-BFDF-29C42F48304A}" type="datetimeFigureOut">
               <a:rPr lang="en-US" smtClean="0"/>
               <a:pPr/>
-              <a:t>12/7/2010</a:t>
+              <a:t>12/19/2010</a:t>
             </a:fld>
             <a:endParaRPr lang="en-US">
               <a:solidFill>
@@ -1864,7 +2169,7 @@
             <a:fld id="{042AED99-7FB4-404E-8A97-64753DCE42EC}" type="slidenum">
               <a:rPr kumimoji="0" lang="en-US" smtClean="0"/>
               <a:pPr/>
-              <a:t>‹#›</a:t>
+              <a:t>‹Nº›</a:t>
             </a:fld>
             <a:endParaRPr kumimoji="0" lang="en-US">
               <a:solidFill>
@@ -1975,7 +2280,7 @@
             <a:fld id="{47C9B81F-C347-4BEF-BFDF-29C42F48304A}" type="datetimeFigureOut">
               <a:rPr lang="en-US" smtClean="0"/>
               <a:pPr/>
-              <a:t>12/7/2010</a:t>
+              <a:t>12/19/2010</a:t>
             </a:fld>
             <a:endParaRPr lang="en-US">
               <a:solidFill>
@@ -2035,7 +2340,7 @@
             <a:fld id="{042AED99-7FB4-404E-8A97-64753DCE42EC}" type="slidenum">
               <a:rPr kumimoji="0" lang="en-US" smtClean="0"/>
               <a:pPr/>
-              <a:t>‹#›</a:t>
+              <a:t>‹Nº›</a:t>
             </a:fld>
             <a:endParaRPr kumimoji="0" lang="en-US">
               <a:solidFill>
@@ -2251,7 +2556,7 @@
             <a:fld id="{47C9B81F-C347-4BEF-BFDF-29C42F48304A}" type="datetimeFigureOut">
               <a:rPr lang="en-US" smtClean="0"/>
               <a:pPr/>
-              <a:t>12/7/2010</a:t>
+              <a:t>12/19/2010</a:t>
             </a:fld>
             <a:endParaRPr lang="en-US">
               <a:solidFill>
@@ -2311,7 +2616,7 @@
             <a:fld id="{042AED99-7FB4-404E-8A97-64753DCE42EC}" type="slidenum">
               <a:rPr kumimoji="0" lang="en-US" smtClean="0"/>
               <a:pPr/>
-              <a:t>‹#›</a:t>
+              <a:t>‹Nº›</a:t>
             </a:fld>
             <a:endParaRPr kumimoji="0" lang="en-US">
               <a:solidFill>
@@ -2681,7 +2986,7 @@
             <a:fld id="{47C9B81F-C347-4BEF-BFDF-29C42F48304A}" type="datetimeFigureOut">
               <a:rPr lang="en-US" smtClean="0"/>
               <a:pPr/>
-              <a:t>12/7/2010</a:t>
+              <a:t>12/19/2010</a:t>
             </a:fld>
             <a:endParaRPr lang="en-US">
               <a:solidFill>
@@ -2741,7 +3046,7 @@
             <a:fld id="{042AED99-7FB4-404E-8A97-64753DCE42EC}" type="slidenum">
               <a:rPr kumimoji="0" lang="en-US" smtClean="0"/>
               <a:pPr/>
-              <a:t>‹#›</a:t>
+              <a:t>‹Nº›</a:t>
             </a:fld>
             <a:endParaRPr kumimoji="0" lang="en-US">
               <a:solidFill>
@@ -3148,7 +3453,7 @@
             <a:fld id="{47C9B81F-C347-4BEF-BFDF-29C42F48304A}" type="datetimeFigureOut">
               <a:rPr lang="en-US" smtClean="0"/>
               <a:pPr/>
-              <a:t>12/7/2010</a:t>
+              <a:t>12/19/2010</a:t>
             </a:fld>
             <a:endParaRPr lang="en-US">
               <a:solidFill>
@@ -3208,7 +3513,7 @@
             <a:fld id="{042AED99-7FB4-404E-8A97-64753DCE42EC}" type="slidenum">
               <a:rPr kumimoji="0" lang="en-US" smtClean="0"/>
               <a:pPr/>
-              <a:t>‹#›</a:t>
+              <a:t>‹Nº›</a:t>
             </a:fld>
             <a:endParaRPr kumimoji="0" lang="en-US">
               <a:solidFill>
@@ -3270,7 +3575,7 @@
             <a:fld id="{47C9B81F-C347-4BEF-BFDF-29C42F48304A}" type="datetimeFigureOut">
               <a:rPr lang="en-US" smtClean="0"/>
               <a:pPr/>
-              <a:t>12/7/2010</a:t>
+              <a:t>12/19/2010</a:t>
             </a:fld>
             <a:endParaRPr lang="en-US">
               <a:solidFill>
@@ -3330,7 +3635,7 @@
             <a:fld id="{042AED99-7FB4-404E-8A97-64753DCE42EC}" type="slidenum">
               <a:rPr kumimoji="0" lang="en-US" smtClean="0"/>
               <a:pPr/>
-              <a:t>‹#›</a:t>
+              <a:t>‹Nº›</a:t>
             </a:fld>
             <a:endParaRPr kumimoji="0" lang="en-US">
               <a:solidFill>
@@ -3412,7 +3717,7 @@
             <a:fld id="{47C9B81F-C347-4BEF-BFDF-29C42F48304A}" type="datetimeFigureOut">
               <a:rPr lang="en-US" smtClean="0"/>
               <a:pPr/>
-              <a:t>12/7/2010</a:t>
+              <a:t>12/19/2010</a:t>
             </a:fld>
             <a:endParaRPr lang="en-US">
               <a:solidFill>
@@ -3472,7 +3777,7 @@
             <a:fld id="{042AED99-7FB4-404E-8A97-64753DCE42EC}" type="slidenum">
               <a:rPr kumimoji="0" lang="en-US" smtClean="0"/>
               <a:pPr/>
-              <a:t>‹#›</a:t>
+              <a:t>‹Nº›</a:t>
             </a:fld>
             <a:endParaRPr kumimoji="0" lang="en-US">
               <a:solidFill>
@@ -3707,7 +4012,7 @@
             <a:fld id="{47C9B81F-C347-4BEF-BFDF-29C42F48304A}" type="datetimeFigureOut">
               <a:rPr lang="en-US" smtClean="0"/>
               <a:pPr/>
-              <a:t>12/7/2010</a:t>
+              <a:t>12/19/2010</a:t>
             </a:fld>
             <a:endParaRPr lang="en-US">
               <a:solidFill>
@@ -3767,7 +4072,7 @@
             <a:fld id="{042AED99-7FB4-404E-8A97-64753DCE42EC}" type="slidenum">
               <a:rPr kumimoji="0" lang="en-US" smtClean="0"/>
               <a:pPr/>
-              <a:t>‹#›</a:t>
+              <a:t>‹Nº›</a:t>
             </a:fld>
             <a:endParaRPr kumimoji="0" lang="en-US">
               <a:solidFill>
@@ -3933,7 +4238,7 @@
             <a:fld id="{47C9B81F-C347-4BEF-BFDF-29C42F48304A}" type="datetimeFigureOut">
               <a:rPr lang="en-US" smtClean="0"/>
               <a:pPr/>
-              <a:t>12/7/2010</a:t>
+              <a:t>12/19/2010</a:t>
             </a:fld>
             <a:endParaRPr lang="en-US">
               <a:solidFill>
@@ -4012,7 +4317,7 @@
             <a:fld id="{042AED99-7FB4-404E-8A97-64753DCE42EC}" type="slidenum">
               <a:rPr kumimoji="0" lang="en-US" smtClean="0"/>
               <a:pPr/>
-              <a:t>‹#›</a:t>
+              <a:t>‹Nº›</a:t>
             </a:fld>
             <a:endParaRPr kumimoji="0" lang="en-US">
               <a:solidFill>
@@ -5063,7 +5368,7 @@
             <a:fld id="{47C9B81F-C347-4BEF-BFDF-29C42F48304A}" type="datetimeFigureOut">
               <a:rPr lang="en-US" smtClean="0"/>
               <a:pPr/>
-              <a:t>12/7/2010</a:t>
+              <a:t>12/19/2010</a:t>
             </a:fld>
             <a:endParaRPr lang="en-US">
               <a:solidFill>
@@ -5153,7 +5458,7 @@
             <a:fld id="{042AED99-7FB4-404E-8A97-64753DCE42EC}" type="slidenum">
               <a:rPr kumimoji="0" lang="en-US" smtClean="0"/>
               <a:pPr/>
-              <a:t>‹#›</a:t>
+              <a:t>‹Nº›</a:t>
             </a:fld>
             <a:endParaRPr kumimoji="0" lang="en-US">
               <a:solidFill>
@@ -8921,15 +9226,7 @@
             </a:r>
             <a:r>
               <a:rPr lang="es-ES" dirty="0" smtClean="0"/>
-              <a:t> puede hacer uso </a:t>
-            </a:r>
-            <a:r>
-              <a:rPr lang="es-ES" dirty="0" smtClean="0"/>
-              <a:t>de bibliotecas </a:t>
-            </a:r>
-            <a:r>
-              <a:rPr lang="es-ES" dirty="0" smtClean="0"/>
-              <a:t>de Java y viceversa.</a:t>
+              <a:t> puede hacer uso de bibliotecas de Java y viceversa.</a:t>
             </a:r>
           </a:p>
           <a:p>
@@ -9501,15 +9798,7 @@
           <a:p>
             <a:r>
               <a:rPr lang="es-ES" dirty="0" smtClean="0"/>
-              <a:t>La colaboración en tiempo real permite  interactuar a un </a:t>
-            </a:r>
-            <a:r>
-              <a:rPr lang="es-ES" dirty="0" smtClean="0"/>
-              <a:t>equipo de </a:t>
-            </a:r>
-            <a:r>
-              <a:rPr lang="es-ES" dirty="0" smtClean="0"/>
-              <a:t>trabajo de forma simple y coordinada acelerando, enriqueciendo y haciendo mas productivo su trabajo.</a:t>
+              <a:t>La colaboración en tiempo real permite  interactuar a un equipo de trabajo de forma simple y coordinada acelerando, enriqueciendo y haciendo mas productivo su trabajo.</a:t>
             </a:r>
           </a:p>
         </p:txBody>
@@ -9864,11 +10153,7 @@
             </a:r>
             <a:r>
               <a:rPr lang="en-US" dirty="0" smtClean="0"/>
-              <a:t> </a:t>
-            </a:r>
-            <a:r>
-              <a:rPr lang="en-US" dirty="0" smtClean="0"/>
-              <a:t>en vivo</a:t>
+              <a:t> en vivo</a:t>
             </a:r>
           </a:p>
           <a:p>
@@ -9939,7 +10224,7 @@
           <p:nvPr/>
         </p:nvPicPr>
         <p:blipFill>
-          <a:blip r:embed="rId2"/>
+          <a:blip r:embed="rId3"/>
           <a:srcRect/>
           <a:stretch>
             <a:fillRect/>
@@ -10041,15 +10326,7 @@
           <a:p>
             <a:r>
               <a:rPr lang="es-ES" dirty="0" smtClean="0"/>
-              <a:t>Varios desarrolladores trabajando sobre </a:t>
-            </a:r>
-            <a:r>
-              <a:rPr lang="es-ES" dirty="0" smtClean="0"/>
-              <a:t>el mismo documento en </a:t>
-            </a:r>
-            <a:r>
-              <a:rPr lang="es-ES" dirty="0" smtClean="0"/>
-              <a:t>diferentes lugares físicos.</a:t>
+              <a:t>Varios desarrolladores trabajando sobre el mismo documento en diferentes lugares físicos.</a:t>
             </a:r>
           </a:p>
           <a:p>
@@ -10524,14 +10801,7 @@
                   <a:latin typeface="Courier New" pitchFamily="49" charset="0"/>
                   <a:cs typeface="Courier New" pitchFamily="49" charset="0"/>
                 </a:rPr>
-                <a:t> value </a:t>
-              </a:r>
-              <a:r>
-                <a:rPr lang="en-US" sz="1400" dirty="0" smtClean="0">
-                  <a:latin typeface="Courier New" pitchFamily="49" charset="0"/>
-                  <a:cs typeface="Courier New" pitchFamily="49" charset="0"/>
-                </a:rPr>
-                <a:t>= 0;</a:t>
+                <a:t> value = 0;</a:t>
               </a:r>
             </a:p>
             <a:p>
@@ -10765,14 +11035,7 @@
                   <a:latin typeface="Courier New" pitchFamily="49" charset="0"/>
                   <a:cs typeface="Courier New" pitchFamily="49" charset="0"/>
                 </a:rPr>
-                <a:t> value </a:t>
-              </a:r>
-              <a:r>
-                <a:rPr lang="en-US" sz="1400" dirty="0" smtClean="0">
-                  <a:latin typeface="Courier New" pitchFamily="49" charset="0"/>
-                  <a:cs typeface="Courier New" pitchFamily="49" charset="0"/>
-                </a:rPr>
-                <a:t>= 0;</a:t>
+                <a:t> value = 0;</a:t>
               </a:r>
             </a:p>
             <a:p>
@@ -12836,11 +13099,7 @@
                       </a:r>
                       <a:r>
                         <a:rPr lang="es-ES" baseline="0" dirty="0" smtClean="0"/>
-                        <a:t> </a:t>
-                      </a:r>
-                      <a:r>
-                        <a:rPr lang="es-ES" baseline="0" dirty="0" smtClean="0"/>
-                        <a:t>en tiempo real desde un navegador.</a:t>
+                        <a:t> en tiempo real desde un navegador.</a:t>
                       </a:r>
                       <a:endParaRPr lang="es-ES" dirty="0"/>
                     </a:p>
@@ -12970,15 +13229,7 @@
                       </a:r>
                       <a:r>
                         <a:rPr lang="es-ES" baseline="0" dirty="0" smtClean="0"/>
-                        <a:t> dos </a:t>
-                      </a:r>
-                      <a:r>
-                        <a:rPr lang="es-ES" baseline="0" dirty="0" smtClean="0"/>
-                        <a:t>usuarios </a:t>
-                      </a:r>
-                      <a:r>
-                        <a:rPr lang="es-ES" baseline="0" dirty="0" smtClean="0"/>
-                        <a:t>en una sesión de edición. Depende del proyecto ECF.</a:t>
+                        <a:t> dos usuarios en una sesión de edición. Depende del proyecto ECF.</a:t>
                       </a:r>
                       <a:endParaRPr lang="es-ES" dirty="0"/>
                     </a:p>
@@ -13369,19 +13620,7 @@
           <a:p>
             <a:r>
               <a:rPr lang="es-ES" dirty="0" smtClean="0"/>
-              <a:t>Finalmente, </a:t>
-            </a:r>
-            <a:r>
-              <a:rPr lang="es-ES" dirty="0" smtClean="0"/>
-              <a:t>se implementó</a:t>
-            </a:r>
-            <a:r>
-              <a:rPr lang="es-ES" dirty="0" smtClean="0"/>
-              <a:t> </a:t>
-            </a:r>
-            <a:r>
-              <a:rPr lang="es-ES" dirty="0" smtClean="0"/>
-              <a:t>la solución propuesta en el </a:t>
+              <a:t>Finalmente, se implementó la solución propuesta en el </a:t>
             </a:r>
             <a:r>
               <a:rPr lang="es-ES" dirty="0" err="1" smtClean="0"/>
@@ -13389,11 +13628,7 @@
             </a:r>
             <a:r>
               <a:rPr lang="es-ES" dirty="0" smtClean="0"/>
-              <a:t> utilizado* haciendo uso de operaciones borrar e insertar de </a:t>
-            </a:r>
-            <a:r>
-              <a:rPr lang="es-ES" dirty="0" smtClean="0"/>
-              <a:t>un </a:t>
+              <a:t> utilizado* haciendo uso de operaciones borrar e insertar de un </a:t>
             </a:r>
             <a:r>
               <a:rPr lang="es-ES" dirty="0" err="1" smtClean="0"/>

</xml_diff>

<commit_message>
speaker notes diapositivas 4-6
</commit_message>
<xml_diff>
--- a/doc/presentacion/presentacion.pptx
+++ b/doc/presentacion/presentacion.pptx
@@ -900,15 +900,7 @@
             </a:r>
             <a:r>
               <a:rPr lang="es-AR" baseline="0" dirty="0" smtClean="0"/>
-              <a:t> en los casos en los que se nos presento la necesidad de utilizar herramienta para el desarrollo de </a:t>
-            </a:r>
-            <a:r>
-              <a:rPr lang="es-AR" baseline="0" smtClean="0"/>
-              <a:t>un TP en </a:t>
-            </a:r>
-            <a:r>
-              <a:rPr lang="es-AR" baseline="0" dirty="0" smtClean="0"/>
-              <a:t>las condiciones que se explicaron anteriormente, las que estaban disponibles no fueron o resultaron satisfactorias por diversos motivos.</a:t>
+              <a:t> en los casos en los que se nos presento la necesidad de utilizar herramienta para el desarrollo de un TP en las condiciones que se explicaron anteriormente, las que estaban disponibles no fueron o resultaron satisfactorias por diversos motivos.</a:t>
             </a:r>
             <a:endParaRPr lang="es-ES" dirty="0" smtClean="0"/>
           </a:p>
@@ -947,6 +939,657 @@
 </file>
 
 <file path=ppt/notesSlides/notesSlide4.xml><?xml version="1.0" encoding="utf-8"?>
+<p:notes xmlns:a="http://schemas.openxmlformats.org/drawingml/2006/main" xmlns:r="http://schemas.openxmlformats.org/officeDocument/2006/relationships" xmlns:p="http://schemas.openxmlformats.org/presentationml/2006/main">
+  <p:cSld>
+    <p:spTree>
+      <p:nvGrpSpPr>
+        <p:cNvPr id="1" name=""/>
+        <p:cNvGrpSpPr/>
+        <p:nvPr/>
+      </p:nvGrpSpPr>
+      <p:grpSpPr>
+        <a:xfrm>
+          <a:off x="0" y="0"/>
+          <a:ext cx="0" cy="0"/>
+          <a:chOff x="0" y="0"/>
+          <a:chExt cx="0" cy="0"/>
+        </a:xfrm>
+      </p:grpSpPr>
+      <p:sp>
+        <p:nvSpPr>
+          <p:cNvPr id="2" name="1 Marcador de imagen de diapositiva"/>
+          <p:cNvSpPr>
+            <a:spLocks noGrp="1" noRot="1" noChangeAspect="1"/>
+          </p:cNvSpPr>
+          <p:nvPr>
+            <p:ph type="sldImg"/>
+          </p:nvPr>
+        </p:nvSpPr>
+        <p:spPr/>
+      </p:sp>
+      <p:sp>
+        <p:nvSpPr>
+          <p:cNvPr id="3" name="2 Marcador de notas"/>
+          <p:cNvSpPr>
+            <a:spLocks noGrp="1"/>
+          </p:cNvSpPr>
+          <p:nvPr>
+            <p:ph type="body" idx="1"/>
+          </p:nvPr>
+        </p:nvSpPr>
+        <p:spPr/>
+        <p:txBody>
+          <a:bodyPr>
+            <a:normAutofit/>
+          </a:bodyPr>
+          <a:lstStyle/>
+          <a:p>
+            <a:pPr>
+              <a:buFont typeface="Arial" pitchFamily="34" charset="0"/>
+              <a:buChar char="•"/>
+            </a:pPr>
+            <a:r>
+              <a:rPr lang="es-AR" dirty="0" smtClean="0"/>
+              <a:t>En esta</a:t>
+            </a:r>
+            <a:r>
+              <a:rPr lang="es-AR" baseline="0" dirty="0" smtClean="0"/>
+              <a:t> diapositiva se observa el escenario típico descripto anteriormente, que sirvió de motivación para el desarrollo del trabajo profesional.</a:t>
+            </a:r>
+          </a:p>
+          <a:p>
+            <a:pPr>
+              <a:buFont typeface="Arial" pitchFamily="34" charset="0"/>
+              <a:buChar char="•"/>
+            </a:pPr>
+            <a:r>
+              <a:rPr lang="es-AR" baseline="0" dirty="0" smtClean="0"/>
+              <a:t>Podemos apreciar que existen dos personas distribuidas en distintas ubicaciones. Cada una de ellas posee una PC en la cual se encuentra editando una copia local de un archivo de código fuente de un proyecto.</a:t>
+            </a:r>
+          </a:p>
+          <a:p>
+            <a:pPr>
+              <a:buFont typeface="Arial" pitchFamily="34" charset="0"/>
+              <a:buChar char="•"/>
+            </a:pPr>
+            <a:r>
+              <a:rPr lang="es-AR" baseline="0" dirty="0" smtClean="0"/>
+              <a:t>Acá puede verse que no hay un </a:t>
+            </a:r>
+            <a:r>
+              <a:rPr lang="es-AR" baseline="0" dirty="0" err="1" smtClean="0"/>
+              <a:t>feedback</a:t>
+            </a:r>
+            <a:r>
+              <a:rPr lang="es-AR" baseline="0" dirty="0" smtClean="0"/>
+              <a:t> instantáneo entre las partes. Si una parte hace un cambio en el archivo la otra no se entera hasta que de alguna forma pueda enviarle el archivo con los cambios (por </a:t>
+            </a:r>
+            <a:r>
+              <a:rPr lang="es-AR" baseline="0" dirty="0" err="1" smtClean="0"/>
+              <a:t>ej</a:t>
+            </a:r>
+            <a:r>
+              <a:rPr lang="es-AR" baseline="0" dirty="0" smtClean="0"/>
+              <a:t>, mediante un email, mensajería, </a:t>
+            </a:r>
+            <a:r>
+              <a:rPr lang="es-AR" baseline="0" dirty="0" err="1" smtClean="0"/>
+              <a:t>pendrive</a:t>
+            </a:r>
+            <a:r>
+              <a:rPr lang="es-AR" baseline="0" dirty="0" smtClean="0"/>
+              <a:t>, </a:t>
+            </a:r>
+            <a:r>
+              <a:rPr lang="es-AR" baseline="0" dirty="0" err="1" smtClean="0"/>
+              <a:t>etc</a:t>
+            </a:r>
+            <a:r>
+              <a:rPr lang="es-AR" baseline="0" dirty="0" smtClean="0"/>
+              <a:t>).</a:t>
+            </a:r>
+          </a:p>
+          <a:p>
+            <a:pPr>
+              <a:buFont typeface="Arial" pitchFamily="34" charset="0"/>
+              <a:buChar char="•"/>
+            </a:pPr>
+            <a:r>
+              <a:rPr lang="es-AR" baseline="0" dirty="0" smtClean="0"/>
+              <a:t>En este caso si </a:t>
+            </a:r>
+            <a:r>
+              <a:rPr lang="es-AR" baseline="0" dirty="0" smtClean="0"/>
+              <a:t>además </a:t>
+            </a:r>
+            <a:r>
+              <a:rPr lang="es-AR" baseline="0" dirty="0" smtClean="0"/>
+              <a:t>la persona en la otra ubicación produjo cambios, tendrá que notificarlos a la contraparte y ambos deberán conciliar las diferencias entre sus versiones para llegar a una misma versión final.</a:t>
+            </a:r>
+          </a:p>
+          <a:p>
+            <a:pPr>
+              <a:buFont typeface="Arial" pitchFamily="34" charset="0"/>
+              <a:buChar char="•"/>
+            </a:pPr>
+            <a:r>
+              <a:rPr lang="es-AR" baseline="0" dirty="0" smtClean="0"/>
+              <a:t>Lo ideal seria que los cambios que una parte realiza sean visibles instantáneamente en la otra ubicación, sin tener que realizar todo el proceso anterior.</a:t>
+            </a:r>
+            <a:endParaRPr lang="es-ES" dirty="0"/>
+          </a:p>
+        </p:txBody>
+      </p:sp>
+      <p:sp>
+        <p:nvSpPr>
+          <p:cNvPr id="4" name="3 Marcador de número de diapositiva"/>
+          <p:cNvSpPr>
+            <a:spLocks noGrp="1"/>
+          </p:cNvSpPr>
+          <p:nvPr>
+            <p:ph type="sldNum" sz="quarter" idx="10"/>
+          </p:nvPr>
+        </p:nvSpPr>
+        <p:spPr/>
+        <p:txBody>
+          <a:bodyPr/>
+          <a:lstStyle/>
+          <a:p>
+            <a:fld id="{3BCBAC67-084D-419D-A89D-D7FC2C09E238}" type="slidenum">
+              <a:rPr lang="es-AR" smtClean="0"/>
+              <a:pPr/>
+              <a:t>4</a:t>
+            </a:fld>
+            <a:endParaRPr lang="es-AR"/>
+          </a:p>
+        </p:txBody>
+      </p:sp>
+    </p:spTree>
+  </p:cSld>
+  <p:clrMapOvr>
+    <a:masterClrMapping/>
+  </p:clrMapOvr>
+</p:notes>
+</file>
+
+<file path=ppt/notesSlides/notesSlide5.xml><?xml version="1.0" encoding="utf-8"?>
+<p:notes xmlns:a="http://schemas.openxmlformats.org/drawingml/2006/main" xmlns:r="http://schemas.openxmlformats.org/officeDocument/2006/relationships" xmlns:p="http://schemas.openxmlformats.org/presentationml/2006/main">
+  <p:cSld>
+    <p:spTree>
+      <p:nvGrpSpPr>
+        <p:cNvPr id="1" name=""/>
+        <p:cNvGrpSpPr/>
+        <p:nvPr/>
+      </p:nvGrpSpPr>
+      <p:grpSpPr>
+        <a:xfrm>
+          <a:off x="0" y="0"/>
+          <a:ext cx="0" cy="0"/>
+          <a:chOff x="0" y="0"/>
+          <a:chExt cx="0" cy="0"/>
+        </a:xfrm>
+      </p:grpSpPr>
+      <p:sp>
+        <p:nvSpPr>
+          <p:cNvPr id="2" name="1 Marcador de imagen de diapositiva"/>
+          <p:cNvSpPr>
+            <a:spLocks noGrp="1" noRot="1" noChangeAspect="1"/>
+          </p:cNvSpPr>
+          <p:nvPr>
+            <p:ph type="sldImg"/>
+          </p:nvPr>
+        </p:nvSpPr>
+        <p:spPr/>
+      </p:sp>
+      <p:sp>
+        <p:nvSpPr>
+          <p:cNvPr id="3" name="2 Marcador de notas"/>
+          <p:cNvSpPr>
+            <a:spLocks noGrp="1"/>
+          </p:cNvSpPr>
+          <p:nvPr>
+            <p:ph type="body" idx="1"/>
+          </p:nvPr>
+        </p:nvSpPr>
+        <p:spPr/>
+        <p:txBody>
+          <a:bodyPr>
+            <a:normAutofit/>
+          </a:bodyPr>
+          <a:lstStyle/>
+          <a:p>
+            <a:pPr>
+              <a:buFont typeface="Arial" pitchFamily="34" charset="0"/>
+              <a:buChar char="•"/>
+            </a:pPr>
+            <a:r>
+              <a:rPr lang="es-AR" dirty="0" smtClean="0"/>
+              <a:t>De la situación anterior surgen</a:t>
+            </a:r>
+            <a:r>
+              <a:rPr lang="es-AR" baseline="0" dirty="0" smtClean="0"/>
+              <a:t> entonces la necesidad de resolver varios problemas:</a:t>
+            </a:r>
+          </a:p>
+          <a:p>
+            <a:pPr>
+              <a:buFont typeface="Arial" pitchFamily="34" charset="0"/>
+              <a:buChar char="•"/>
+            </a:pPr>
+            <a:r>
+              <a:rPr lang="es-AR" baseline="0" dirty="0" smtClean="0"/>
+              <a:t>En primer lugar es necesario que el documento que las partes editan se mantenga sincronizado en todas las ubicaciones. Esto quiere decir que al final de las tareas de edición en cada parte, el documento resultante en todas las ubicaciones debe ser exactamente el mismo.</a:t>
+            </a:r>
+          </a:p>
+          <a:p>
+            <a:pPr>
+              <a:buFont typeface="Arial" pitchFamily="34" charset="0"/>
+              <a:buChar char="•"/>
+            </a:pPr>
+            <a:r>
+              <a:rPr lang="es-AR" baseline="0" dirty="0" smtClean="0"/>
+              <a:t>Otro problema a resolver es que en cada ubicación, los cambios que se introducen tanto local como remotamente deben ser visibles instantáneamente. Por </a:t>
+            </a:r>
+            <a:r>
+              <a:rPr lang="es-AR" baseline="0" dirty="0" err="1" smtClean="0"/>
+              <a:t>ej</a:t>
+            </a:r>
+            <a:r>
+              <a:rPr lang="es-AR" baseline="0" dirty="0" smtClean="0"/>
+              <a:t>: no se desea que haya un arbitro que coordine y determine quién puede introducir cambios al documento en cada momento.</a:t>
+            </a:r>
+          </a:p>
+          <a:p>
+            <a:pPr>
+              <a:buFont typeface="Arial" pitchFamily="34" charset="0"/>
+              <a:buChar char="•"/>
+            </a:pPr>
+            <a:r>
+              <a:rPr lang="es-AR" baseline="0" dirty="0" smtClean="0"/>
+              <a:t>Se requiere que este esquema pueda ser integrado a herramientas existentes, aprovechando las capacidades que éstas ya ofrecen.</a:t>
+            </a:r>
+          </a:p>
+          <a:p>
+            <a:pPr>
+              <a:buFont typeface="Arial" pitchFamily="34" charset="0"/>
+              <a:buChar char="•"/>
+            </a:pPr>
+            <a:r>
+              <a:rPr lang="es-AR" baseline="0" dirty="0" smtClean="0"/>
+              <a:t>Finalmente se busca simplicidad para la configuración y uso de este sistema, enfocando al usuario en las tareas que realmente le interesan, en lugar de tener que preocuparse por instalaciones y configuraciones que desalientan su uso.</a:t>
+            </a:r>
+            <a:endParaRPr lang="es-ES" dirty="0"/>
+          </a:p>
+        </p:txBody>
+      </p:sp>
+      <p:sp>
+        <p:nvSpPr>
+          <p:cNvPr id="4" name="3 Marcador de número de diapositiva"/>
+          <p:cNvSpPr>
+            <a:spLocks noGrp="1"/>
+          </p:cNvSpPr>
+          <p:nvPr>
+            <p:ph type="sldNum" sz="quarter" idx="10"/>
+          </p:nvPr>
+        </p:nvSpPr>
+        <p:spPr/>
+        <p:txBody>
+          <a:bodyPr/>
+          <a:lstStyle/>
+          <a:p>
+            <a:fld id="{3BCBAC67-084D-419D-A89D-D7FC2C09E238}" type="slidenum">
+              <a:rPr lang="es-AR" smtClean="0"/>
+              <a:pPr/>
+              <a:t>5</a:t>
+            </a:fld>
+            <a:endParaRPr lang="es-AR"/>
+          </a:p>
+        </p:txBody>
+      </p:sp>
+    </p:spTree>
+  </p:cSld>
+  <p:clrMapOvr>
+    <a:masterClrMapping/>
+  </p:clrMapOvr>
+</p:notes>
+</file>
+
+<file path=ppt/notesSlides/notesSlide6.xml><?xml version="1.0" encoding="utf-8"?>
+<p:notes xmlns:a="http://schemas.openxmlformats.org/drawingml/2006/main" xmlns:r="http://schemas.openxmlformats.org/officeDocument/2006/relationships" xmlns:p="http://schemas.openxmlformats.org/presentationml/2006/main">
+  <p:cSld>
+    <p:spTree>
+      <p:nvGrpSpPr>
+        <p:cNvPr id="1" name=""/>
+        <p:cNvGrpSpPr/>
+        <p:nvPr/>
+      </p:nvGrpSpPr>
+      <p:grpSpPr>
+        <a:xfrm>
+          <a:off x="0" y="0"/>
+          <a:ext cx="0" cy="0"/>
+          <a:chOff x="0" y="0"/>
+          <a:chExt cx="0" cy="0"/>
+        </a:xfrm>
+      </p:grpSpPr>
+      <p:sp>
+        <p:nvSpPr>
+          <p:cNvPr id="2" name="1 Marcador de imagen de diapositiva"/>
+          <p:cNvSpPr>
+            <a:spLocks noGrp="1" noRot="1" noChangeAspect="1"/>
+          </p:cNvSpPr>
+          <p:nvPr>
+            <p:ph type="sldImg"/>
+          </p:nvPr>
+        </p:nvSpPr>
+        <p:spPr/>
+      </p:sp>
+      <p:sp>
+        <p:nvSpPr>
+          <p:cNvPr id="3" name="2 Marcador de notas"/>
+          <p:cNvSpPr>
+            <a:spLocks noGrp="1"/>
+          </p:cNvSpPr>
+          <p:nvPr>
+            <p:ph type="body" idx="1"/>
+          </p:nvPr>
+        </p:nvSpPr>
+        <p:spPr/>
+        <p:txBody>
+          <a:bodyPr>
+            <a:normAutofit lnSpcReduction="10000"/>
+          </a:bodyPr>
+          <a:lstStyle/>
+          <a:p>
+            <a:r>
+              <a:rPr lang="es-AR" dirty="0" smtClean="0"/>
+              <a:t>En este ejemplo</a:t>
+            </a:r>
+            <a:r>
+              <a:rPr lang="es-AR" baseline="0" dirty="0" smtClean="0"/>
+              <a:t> se pueden apreciar los problemas que se presentan en aplicaciones tradicionales</a:t>
+            </a:r>
+          </a:p>
+          <a:p>
+            <a:endParaRPr lang="es-AR" baseline="0" dirty="0" smtClean="0"/>
+          </a:p>
+          <a:p>
+            <a:pPr marL="228600" indent="-228600">
+              <a:buFont typeface="+mj-lt"/>
+              <a:buAutoNum type="arabicPeriod"/>
+            </a:pPr>
+            <a:r>
+              <a:rPr lang="es-AR" baseline="0" dirty="0" smtClean="0"/>
+              <a:t>Supongamos que dos usuarios están trabajando con una copia de un documento en el mismo estado inicial.</a:t>
+            </a:r>
+          </a:p>
+          <a:p>
+            <a:pPr marL="228600" indent="-228600">
+              <a:buFont typeface="+mj-lt"/>
+              <a:buAutoNum type="arabicPeriod"/>
+            </a:pPr>
+            <a:r>
+              <a:rPr lang="es-AR" baseline="0" dirty="0" smtClean="0"/>
+              <a:t>Ambas ubicaciones tienen el contenido en “hola”</a:t>
+            </a:r>
+          </a:p>
+          <a:p>
+            <a:pPr marL="228600" indent="-228600">
+              <a:buFont typeface="+mj-lt"/>
+              <a:buAutoNum type="arabicPeriod"/>
+            </a:pPr>
+            <a:r>
+              <a:rPr lang="es-AR" baseline="0" dirty="0" smtClean="0"/>
+              <a:t>El usuario 1 tiene la intención de insertar una letra “c” al inicio del documento.</a:t>
+            </a:r>
+          </a:p>
+          <a:p>
+            <a:pPr marL="228600" indent="-228600">
+              <a:buFont typeface="+mj-lt"/>
+              <a:buAutoNum type="arabicPeriod"/>
+            </a:pPr>
+            <a:r>
+              <a:rPr lang="es-AR" baseline="0" dirty="0" smtClean="0"/>
+              <a:t>El mismo realiza el cambio en su copia local y prepara un mensaje para notificarle al usuario 2 del cambio que produjo.</a:t>
+            </a:r>
+          </a:p>
+          <a:p>
+            <a:pPr marL="228600" indent="-228600">
+              <a:buFont typeface="+mj-lt"/>
+              <a:buAutoNum type="arabicPeriod"/>
+            </a:pPr>
+            <a:r>
+              <a:rPr lang="es-AR" baseline="0" dirty="0" smtClean="0"/>
+              <a:t>El mensaje tiene la forma de “insertar ‘c’ en posición 0”</a:t>
+            </a:r>
+          </a:p>
+          <a:p>
+            <a:pPr marL="228600" indent="-228600">
+              <a:buFont typeface="+mj-lt"/>
+              <a:buAutoNum type="arabicPeriod"/>
+            </a:pPr>
+            <a:r>
+              <a:rPr lang="es-AR" baseline="0" dirty="0" smtClean="0"/>
+              <a:t>El mensaje se envía a través de la red que los comunica, en este caso Internet.</a:t>
+            </a:r>
+          </a:p>
+          <a:p>
+            <a:pPr marL="228600" indent="-228600">
+              <a:buFont typeface="+mj-lt"/>
+              <a:buAutoNum type="arabicPeriod"/>
+            </a:pPr>
+            <a:r>
+              <a:rPr lang="es-AR" baseline="0" dirty="0" smtClean="0"/>
+              <a:t>Éste no llega instantáneamente al otro lado. Existe una demora propia de las comunicaciones que depende de varios factores (distancias, ruteo, congestión).</a:t>
+            </a:r>
+          </a:p>
+          <a:p>
+            <a:pPr marL="228600" indent="-228600">
+              <a:buFont typeface="+mj-lt"/>
+              <a:buAutoNum type="arabicPeriod"/>
+            </a:pPr>
+            <a:r>
+              <a:rPr lang="es-AR" baseline="0" dirty="0" smtClean="0"/>
+              <a:t>Supongamos que mientras el mensaje esta en tránsito, el usuario 2 tiene la intención de borrar la “o” del documento.</a:t>
+            </a:r>
+          </a:p>
+          <a:p>
+            <a:pPr marL="228600" indent="-228600">
+              <a:buFont typeface="+mj-lt"/>
+              <a:buAutoNum type="arabicPeriod"/>
+            </a:pPr>
+            <a:r>
+              <a:rPr lang="es-AR" baseline="0" dirty="0" smtClean="0"/>
+              <a:t>Realiza el cambio en su copia local y envía el mensaje notificando esta situación a la ubicación 1. El mensaje se puede expresar como “eliminar 1 carácter en posición 1”</a:t>
+            </a:r>
+          </a:p>
+          <a:p>
+            <a:pPr marL="228600" indent="-228600">
+              <a:buFont typeface="+mj-lt"/>
+              <a:buAutoNum type="arabicPeriod"/>
+            </a:pPr>
+            <a:r>
+              <a:rPr lang="es-AR" baseline="0" dirty="0" smtClean="0"/>
+              <a:t> Este mensaje también tarda un determinado tiempo en llegar a la otra ubicación.</a:t>
+            </a:r>
+          </a:p>
+          <a:p>
+            <a:pPr marL="228600" indent="-228600">
+              <a:buFont typeface="+mj-lt"/>
+              <a:buAutoNum type="arabicPeriod"/>
+            </a:pPr>
+            <a:r>
+              <a:rPr lang="es-AR" baseline="0" dirty="0" smtClean="0"/>
+              <a:t> Mientras el 2° mensaje esta atravesando la red, el 1° llega a la ubicación 2.</a:t>
+            </a:r>
+          </a:p>
+          <a:p>
+            <a:pPr marL="228600" indent="-228600">
+              <a:buFont typeface="+mj-lt"/>
+              <a:buAutoNum type="arabicPeriod"/>
+            </a:pPr>
+            <a:r>
+              <a:rPr lang="es-AR" baseline="0" dirty="0" smtClean="0"/>
+              <a:t> El usuario 2 analiza el mensaje con los cambios introducidos por el usuario 1 y los aplica localmente llevando el estado de su copia local a “</a:t>
+            </a:r>
+            <a:r>
+              <a:rPr lang="es-AR" baseline="0" dirty="0" err="1" smtClean="0"/>
+              <a:t>chla</a:t>
+            </a:r>
+            <a:r>
+              <a:rPr lang="es-AR" baseline="0" dirty="0" smtClean="0"/>
+              <a:t>”</a:t>
+            </a:r>
+          </a:p>
+          <a:p>
+            <a:pPr marL="228600" indent="-228600">
+              <a:buFont typeface="+mj-lt"/>
+              <a:buAutoNum type="arabicPeriod"/>
+            </a:pPr>
+            <a:r>
+              <a:rPr lang="es-AR" baseline="0" dirty="0" smtClean="0"/>
+              <a:t> A continuación, mensaje con los cambios originados por el usuario 2 arriba a la ubicación del usuario 1.</a:t>
+            </a:r>
+          </a:p>
+          <a:p>
+            <a:pPr marL="228600" indent="-228600">
+              <a:buFont typeface="+mj-lt"/>
+              <a:buAutoNum type="arabicPeriod"/>
+            </a:pPr>
+            <a:r>
+              <a:rPr lang="es-AR" baseline="0" dirty="0" smtClean="0"/>
+              <a:t> Éste también analiza el mensaje aplicando los cambios que le fueron notificados a su copia local del documento. Éste proceso lleva el estado de su copia a “cola”</a:t>
+            </a:r>
+          </a:p>
+          <a:p>
+            <a:r>
+              <a:rPr lang="es-AR" baseline="0" dirty="0" smtClean="0"/>
+              <a:t>15. Al finalizar la edición, podemos ver que ambas copias poseen un estado distinto, es decir, no se ha logrado la convergencia.</a:t>
+            </a:r>
+          </a:p>
+          <a:p>
+            <a:pPr marL="228600" indent="-228600">
+              <a:buFont typeface="+mj-lt"/>
+              <a:buAutoNum type="arabicPeriod"/>
+            </a:pPr>
+            <a:endParaRPr lang="es-ES" dirty="0"/>
+          </a:p>
+        </p:txBody>
+      </p:sp>
+      <p:sp>
+        <p:nvSpPr>
+          <p:cNvPr id="4" name="3 Marcador de número de diapositiva"/>
+          <p:cNvSpPr>
+            <a:spLocks noGrp="1"/>
+          </p:cNvSpPr>
+          <p:nvPr>
+            <p:ph type="sldNum" sz="quarter" idx="10"/>
+          </p:nvPr>
+        </p:nvSpPr>
+        <p:spPr/>
+        <p:txBody>
+          <a:bodyPr/>
+          <a:lstStyle/>
+          <a:p>
+            <a:fld id="{3BCBAC67-084D-419D-A89D-D7FC2C09E238}" type="slidenum">
+              <a:rPr lang="es-AR" smtClean="0"/>
+              <a:pPr/>
+              <a:t>6</a:t>
+            </a:fld>
+            <a:endParaRPr lang="es-AR"/>
+          </a:p>
+        </p:txBody>
+      </p:sp>
+    </p:spTree>
+  </p:cSld>
+  <p:clrMapOvr>
+    <a:masterClrMapping/>
+  </p:clrMapOvr>
+</p:notes>
+</file>
+
+<file path=ppt/notesSlides/notesSlide7.xml><?xml version="1.0" encoding="utf-8"?>
+<p:notes xmlns:a="http://schemas.openxmlformats.org/drawingml/2006/main" xmlns:r="http://schemas.openxmlformats.org/officeDocument/2006/relationships" xmlns:p="http://schemas.openxmlformats.org/presentationml/2006/main">
+  <p:cSld>
+    <p:spTree>
+      <p:nvGrpSpPr>
+        <p:cNvPr id="1" name=""/>
+        <p:cNvGrpSpPr/>
+        <p:nvPr/>
+      </p:nvGrpSpPr>
+      <p:grpSpPr>
+        <a:xfrm>
+          <a:off x="0" y="0"/>
+          <a:ext cx="0" cy="0"/>
+          <a:chOff x="0" y="0"/>
+          <a:chExt cx="0" cy="0"/>
+        </a:xfrm>
+      </p:grpSpPr>
+      <p:sp>
+        <p:nvSpPr>
+          <p:cNvPr id="2" name="1 Marcador de imagen de diapositiva"/>
+          <p:cNvSpPr>
+            <a:spLocks noGrp="1" noRot="1" noChangeAspect="1"/>
+          </p:cNvSpPr>
+          <p:nvPr>
+            <p:ph type="sldImg"/>
+          </p:nvPr>
+        </p:nvSpPr>
+        <p:spPr/>
+      </p:sp>
+      <p:sp>
+        <p:nvSpPr>
+          <p:cNvPr id="3" name="2 Marcador de notas"/>
+          <p:cNvSpPr>
+            <a:spLocks noGrp="1"/>
+          </p:cNvSpPr>
+          <p:nvPr>
+            <p:ph type="body" idx="1"/>
+          </p:nvPr>
+        </p:nvSpPr>
+        <p:spPr/>
+        <p:txBody>
+          <a:bodyPr>
+            <a:normAutofit/>
+          </a:bodyPr>
+          <a:lstStyle/>
+          <a:p>
+            <a:endParaRPr lang="es-ES" dirty="0"/>
+          </a:p>
+        </p:txBody>
+      </p:sp>
+      <p:sp>
+        <p:nvSpPr>
+          <p:cNvPr id="4" name="3 Marcador de número de diapositiva"/>
+          <p:cNvSpPr>
+            <a:spLocks noGrp="1"/>
+          </p:cNvSpPr>
+          <p:nvPr>
+            <p:ph type="sldNum" sz="quarter" idx="10"/>
+          </p:nvPr>
+        </p:nvSpPr>
+        <p:spPr/>
+        <p:txBody>
+          <a:bodyPr/>
+          <a:lstStyle/>
+          <a:p>
+            <a:fld id="{3BCBAC67-084D-419D-A89D-D7FC2C09E238}" type="slidenum">
+              <a:rPr lang="es-AR" smtClean="0"/>
+              <a:pPr/>
+              <a:t>7</a:t>
+            </a:fld>
+            <a:endParaRPr lang="es-AR"/>
+          </a:p>
+        </p:txBody>
+      </p:sp>
+    </p:spTree>
+  </p:cSld>
+  <p:clrMapOvr>
+    <a:masterClrMapping/>
+  </p:clrMapOvr>
+</p:notes>
+</file>
+
+<file path=ppt/notesSlides/notesSlide8.xml><?xml version="1.0" encoding="utf-8"?>
 <p:notes xmlns:a="http://schemas.openxmlformats.org/drawingml/2006/main" xmlns:r="http://schemas.openxmlformats.org/officeDocument/2006/relationships" xmlns:p="http://schemas.openxmlformats.org/presentationml/2006/main">
   <p:cSld>
     <p:spTree>
@@ -10463,7 +11106,7 @@
             <p:nvPr/>
           </p:nvPicPr>
           <p:blipFill>
-            <a:blip r:embed="rId2" cstate="print"/>
+            <a:blip r:embed="rId3" cstate="print"/>
             <a:stretch>
               <a:fillRect/>
             </a:stretch>
@@ -10487,7 +11130,7 @@
             <p:nvPr/>
           </p:nvPicPr>
           <p:blipFill>
-            <a:blip r:embed="rId3"/>
+            <a:blip r:embed="rId4"/>
             <a:srcRect t="12062" b="15563"/>
             <a:stretch>
               <a:fillRect/>
@@ -10617,7 +11260,7 @@
             <p:nvPr/>
           </p:nvPicPr>
           <p:blipFill>
-            <a:blip r:embed="rId2" cstate="print"/>
+            <a:blip r:embed="rId3" cstate="print"/>
             <a:stretch>
               <a:fillRect/>
             </a:stretch>
@@ -10641,7 +11284,7 @@
             <p:nvPr/>
           </p:nvPicPr>
           <p:blipFill>
-            <a:blip r:embed="rId3"/>
+            <a:blip r:embed="rId4"/>
             <a:srcRect t="12062" b="15563"/>
             <a:stretch>
               <a:fillRect/>
@@ -10718,7 +11361,7 @@
             <p:nvPr/>
           </p:nvPicPr>
           <p:blipFill>
-            <a:blip r:embed="rId4"/>
+            <a:blip r:embed="rId5"/>
             <a:stretch>
               <a:fillRect/>
             </a:stretch>
@@ -10952,7 +11595,7 @@
             <p:nvPr/>
           </p:nvPicPr>
           <p:blipFill>
-            <a:blip r:embed="rId4"/>
+            <a:blip r:embed="rId5"/>
             <a:stretch>
               <a:fillRect/>
             </a:stretch>
@@ -11208,7 +11851,7 @@
           <p:nvPr/>
         </p:nvPicPr>
         <p:blipFill>
-          <a:blip r:embed="rId2"/>
+          <a:blip r:embed="rId3"/>
           <a:stretch>
             <a:fillRect/>
           </a:stretch>
@@ -11264,7 +11907,7 @@
           <p:nvPr/>
         </p:nvPicPr>
         <p:blipFill>
-          <a:blip r:embed="rId2"/>
+          <a:blip r:embed="rId3"/>
           <a:stretch>
             <a:fillRect/>
           </a:stretch>
@@ -11411,7 +12054,7 @@
             <p:nvPr/>
           </p:nvPicPr>
           <p:blipFill>
-            <a:blip r:embed="rId3" cstate="print"/>
+            <a:blip r:embed="rId4" cstate="print"/>
             <a:stretch>
               <a:fillRect/>
             </a:stretch>
@@ -11435,7 +12078,7 @@
             <p:nvPr/>
           </p:nvPicPr>
           <p:blipFill>
-            <a:blip r:embed="rId4"/>
+            <a:blip r:embed="rId5"/>
             <a:srcRect t="12062" b="15563"/>
             <a:stretch>
               <a:fillRect/>
@@ -11565,7 +12208,7 @@
             <p:nvPr/>
           </p:nvPicPr>
           <p:blipFill>
-            <a:blip r:embed="rId3" cstate="print"/>
+            <a:blip r:embed="rId4" cstate="print"/>
             <a:stretch>
               <a:fillRect/>
             </a:stretch>
@@ -11589,7 +12232,7 @@
             <p:nvPr/>
           </p:nvPicPr>
           <p:blipFill>
-            <a:blip r:embed="rId4"/>
+            <a:blip r:embed="rId5"/>
             <a:srcRect t="12062" b="15563"/>
             <a:stretch>
               <a:fillRect/>
@@ -11652,7 +12295,7 @@
           <p:nvPr/>
         </p:nvPicPr>
         <p:blipFill>
-          <a:blip r:embed="rId2"/>
+          <a:blip r:embed="rId3"/>
           <a:stretch>
             <a:fillRect/>
           </a:stretch>
@@ -11781,7 +12424,7 @@
           <p:nvPr/>
         </p:nvPicPr>
         <p:blipFill>
-          <a:blip r:embed="rId5" cstate="print"/>
+          <a:blip r:embed="rId6" cstate="print"/>
           <a:stretch>
             <a:fillRect/>
           </a:stretch>
@@ -11847,7 +12490,7 @@
           <p:nvPr/>
         </p:nvPicPr>
         <p:blipFill>
-          <a:blip r:embed="rId6" cstate="print">
+          <a:blip r:embed="rId7" cstate="print">
             <a:duotone>
               <a:prstClr val="black"/>
               <a:schemeClr val="accent4">
@@ -13325,7 +13968,7 @@
           <p:nvPr/>
         </p:nvPicPr>
         <p:blipFill>
-          <a:blip r:embed="rId2"/>
+          <a:blip r:embed="rId3"/>
           <a:stretch>
             <a:fillRect/>
           </a:stretch>
@@ -13352,7 +13995,7 @@
           <p:nvPr/>
         </p:nvPicPr>
         <p:blipFill>
-          <a:blip r:embed="rId3"/>
+          <a:blip r:embed="rId4"/>
           <a:stretch>
             <a:fillRect/>
           </a:stretch>
@@ -13376,7 +14019,7 @@
           <p:nvPr/>
         </p:nvPicPr>
         <p:blipFill>
-          <a:blip r:embed="rId4"/>
+          <a:blip r:embed="rId5"/>
           <a:stretch>
             <a:fillRect/>
           </a:stretch>
@@ -13400,7 +14043,7 @@
           <p:nvPr/>
         </p:nvPicPr>
         <p:blipFill>
-          <a:blip r:embed="rId5" cstate="print"/>
+          <a:blip r:embed="rId6" cstate="print"/>
           <a:stretch>
             <a:fillRect/>
           </a:stretch>

</xml_diff>